<commit_message>
meeting with markus, adedd notes
</commit_message>
<xml_diff>
--- a/output/figures/PP_figure_creation.pptx
+++ b/output/figures/PP_figure_creation.pptx
@@ -200,7 +200,7 @@
           <a:p>
             <a:fld id="{3C1211B4-146C-4B04-87A4-D58028F6A092}" type="datetimeFigureOut">
               <a:rPr lang="en-DE" smtClean="0"/>
-              <a:t>03/06/2025</a:t>
+              <a:t>03/10/2025</a:t>
             </a:fld>
             <a:endParaRPr lang="en-DE"/>
           </a:p>
@@ -746,6 +746,1873 @@
           <a:bodyPr/>
           <a:lstStyle/>
           <a:p>
+            <a:pPr>
+              <a:lnSpc>
+                <a:spcPct val="115000"/>
+              </a:lnSpc>
+              <a:spcAft>
+                <a:spcPts val="800"/>
+              </a:spcAft>
+            </a:pPr>
+            <a:r>
+              <a:rPr lang="de-DE" sz="1800" kern="0" dirty="0">
+                <a:effectLst/>
+                <a:latin typeface="Times New Roman" panose="02020603050405020304" pitchFamily="18" charset="0"/>
+                <a:ea typeface="Times New Roman" panose="02020603050405020304" pitchFamily="18" charset="0"/>
+                <a:cs typeface="Arial" panose="020B0604020202020204" pitchFamily="34" charset="0"/>
+              </a:rPr>
+              <a:t>Wenn in einer Studie der </a:t>
+            </a:r>
+            <a:r>
+              <a:rPr lang="de-DE" sz="1800" b="1" kern="0" dirty="0" err="1">
+                <a:effectLst/>
+                <a:latin typeface="Times New Roman" panose="02020603050405020304" pitchFamily="18" charset="0"/>
+                <a:ea typeface="Times New Roman" panose="02020603050405020304" pitchFamily="18" charset="0"/>
+                <a:cs typeface="Arial" panose="020B0604020202020204" pitchFamily="34" charset="0"/>
+              </a:rPr>
+              <a:t>Fugl</a:t>
+            </a:r>
+            <a:r>
+              <a:rPr lang="de-DE" sz="1800" b="1" kern="0" dirty="0">
+                <a:effectLst/>
+                <a:latin typeface="Times New Roman" panose="02020603050405020304" pitchFamily="18" charset="0"/>
+                <a:ea typeface="Times New Roman" panose="02020603050405020304" pitchFamily="18" charset="0"/>
+                <a:cs typeface="Arial" panose="020B0604020202020204" pitchFamily="34" charset="0"/>
+              </a:rPr>
+              <a:t>-Meyer-Score (FMA)</a:t>
+            </a:r>
+            <a:r>
+              <a:rPr lang="de-DE" sz="1800" kern="0" dirty="0">
+                <a:effectLst/>
+                <a:latin typeface="Times New Roman" panose="02020603050405020304" pitchFamily="18" charset="0"/>
+                <a:ea typeface="Times New Roman" panose="02020603050405020304" pitchFamily="18" charset="0"/>
+                <a:cs typeface="Arial" panose="020B0604020202020204" pitchFamily="34" charset="0"/>
+              </a:rPr>
+              <a:t> zur Klassifikation von </a:t>
+            </a:r>
+            <a:r>
+              <a:rPr lang="de-DE" sz="1800" kern="0" dirty="0" err="1">
+                <a:effectLst/>
+                <a:latin typeface="Times New Roman" panose="02020603050405020304" pitchFamily="18" charset="0"/>
+                <a:ea typeface="Times New Roman" panose="02020603050405020304" pitchFamily="18" charset="0"/>
+                <a:cs typeface="Arial" panose="020B0604020202020204" pitchFamily="34" charset="0"/>
+              </a:rPr>
+              <a:t>Erholer</a:t>
+            </a:r>
+            <a:r>
+              <a:rPr lang="de-DE" sz="1800" kern="0" dirty="0">
+                <a:effectLst/>
+                <a:latin typeface="Times New Roman" panose="02020603050405020304" pitchFamily="18" charset="0"/>
+                <a:ea typeface="Times New Roman" panose="02020603050405020304" pitchFamily="18" charset="0"/>
+                <a:cs typeface="Arial" panose="020B0604020202020204" pitchFamily="34" charset="0"/>
+              </a:rPr>
+              <a:t>-Gruppen genutzt wurde, aber </a:t>
+            </a:r>
+            <a:r>
+              <a:rPr lang="de-DE" sz="1800" b="1" kern="0" dirty="0">
+                <a:effectLst/>
+                <a:latin typeface="Times New Roman" panose="02020603050405020304" pitchFamily="18" charset="0"/>
+                <a:ea typeface="Times New Roman" panose="02020603050405020304" pitchFamily="18" charset="0"/>
+                <a:cs typeface="Arial" panose="020B0604020202020204" pitchFamily="34" charset="0"/>
+              </a:rPr>
+              <a:t>NIHSS und Barthel-Index (BI)</a:t>
+            </a:r>
+            <a:r>
+              <a:rPr lang="de-DE" sz="1800" kern="0" dirty="0">
+                <a:effectLst/>
+                <a:latin typeface="Times New Roman" panose="02020603050405020304" pitchFamily="18" charset="0"/>
+                <a:ea typeface="Times New Roman" panose="02020603050405020304" pitchFamily="18" charset="0"/>
+                <a:cs typeface="Arial" panose="020B0604020202020204" pitchFamily="34" charset="0"/>
+              </a:rPr>
+              <a:t> standardmäßig erhoben werden, möchtest du herausfinden, ob </a:t>
+            </a:r>
+            <a:r>
+              <a:rPr lang="de-DE" sz="1800" b="1" kern="0" dirty="0">
+                <a:effectLst/>
+                <a:latin typeface="Times New Roman" panose="02020603050405020304" pitchFamily="18" charset="0"/>
+                <a:ea typeface="Times New Roman" panose="02020603050405020304" pitchFamily="18" charset="0"/>
+                <a:cs typeface="Arial" panose="020B0604020202020204" pitchFamily="34" charset="0"/>
+              </a:rPr>
+              <a:t>FMA notwendig ist, um den Reha-Effekt zu erkennen</a:t>
+            </a:r>
+            <a:r>
+              <a:rPr lang="de-DE" sz="1800" kern="0" dirty="0">
+                <a:effectLst/>
+                <a:latin typeface="Times New Roman" panose="02020603050405020304" pitchFamily="18" charset="0"/>
+                <a:ea typeface="Times New Roman" panose="02020603050405020304" pitchFamily="18" charset="0"/>
+                <a:cs typeface="Arial" panose="020B0604020202020204" pitchFamily="34" charset="0"/>
+              </a:rPr>
+              <a:t>.</a:t>
+            </a:r>
+            <a:endParaRPr lang="de-DE" sz="1800" kern="100" dirty="0">
+              <a:effectLst/>
+              <a:latin typeface="Calibri" panose="020F0502020204030204" pitchFamily="34" charset="0"/>
+              <a:ea typeface="Calibri" panose="020F0502020204030204" pitchFamily="34" charset="0"/>
+              <a:cs typeface="Arial" panose="020B0604020202020204" pitchFamily="34" charset="0"/>
+            </a:endParaRPr>
+          </a:p>
+          <a:p>
+            <a:pPr>
+              <a:lnSpc>
+                <a:spcPct val="115000"/>
+              </a:lnSpc>
+              <a:spcAft>
+                <a:spcPts val="800"/>
+              </a:spcAft>
+            </a:pPr>
+            <a:r>
+              <a:rPr lang="de-DE" sz="1800" b="1" kern="0" dirty="0">
+                <a:effectLst/>
+                <a:latin typeface="Times New Roman" panose="02020603050405020304" pitchFamily="18" charset="0"/>
+                <a:ea typeface="Times New Roman" panose="02020603050405020304" pitchFamily="18" charset="0"/>
+                <a:cs typeface="Arial" panose="020B0604020202020204" pitchFamily="34" charset="0"/>
+              </a:rPr>
+              <a:t>1. Idee: Kann NIHSS/BI FMA ersetzen?</a:t>
+            </a:r>
+            <a:endParaRPr lang="de-DE" sz="1800" kern="100" dirty="0">
+              <a:effectLst/>
+              <a:latin typeface="Calibri" panose="020F0502020204030204" pitchFamily="34" charset="0"/>
+              <a:ea typeface="Calibri" panose="020F0502020204030204" pitchFamily="34" charset="0"/>
+              <a:cs typeface="Arial" panose="020B0604020202020204" pitchFamily="34" charset="0"/>
+            </a:endParaRPr>
+          </a:p>
+          <a:p>
+            <a:pPr>
+              <a:lnSpc>
+                <a:spcPct val="115000"/>
+              </a:lnSpc>
+              <a:spcAft>
+                <a:spcPts val="800"/>
+              </a:spcAft>
+            </a:pPr>
+            <a:r>
+              <a:rPr lang="de-DE" sz="1800" kern="0" dirty="0">
+                <a:effectLst/>
+                <a:latin typeface="Times New Roman" panose="02020603050405020304" pitchFamily="18" charset="0"/>
+                <a:ea typeface="Times New Roman" panose="02020603050405020304" pitchFamily="18" charset="0"/>
+                <a:cs typeface="Arial" panose="020B0604020202020204" pitchFamily="34" charset="0"/>
+              </a:rPr>
+              <a:t>Die zentrale Frage ist: </a:t>
+            </a:r>
+            <a:r>
+              <a:rPr lang="de-DE" sz="1800" b="1" kern="0" dirty="0">
+                <a:effectLst/>
+                <a:latin typeface="Times New Roman" panose="02020603050405020304" pitchFamily="18" charset="0"/>
+                <a:ea typeface="Times New Roman" panose="02020603050405020304" pitchFamily="18" charset="0"/>
+                <a:cs typeface="Arial" panose="020B0604020202020204" pitchFamily="34" charset="0"/>
+              </a:rPr>
+              <a:t>Können NIHSS und BI alleine die Erholung genauso gut vorhersagen wie FMA?</a:t>
+            </a:r>
+            <a:endParaRPr lang="de-DE" sz="1800" kern="100" dirty="0">
+              <a:effectLst/>
+              <a:latin typeface="Calibri" panose="020F0502020204030204" pitchFamily="34" charset="0"/>
+              <a:ea typeface="Calibri" panose="020F0502020204030204" pitchFamily="34" charset="0"/>
+              <a:cs typeface="Arial" panose="020B0604020202020204" pitchFamily="34" charset="0"/>
+            </a:endParaRPr>
+          </a:p>
+          <a:p>
+            <a:pPr marL="342900" lvl="0" indent="-342900">
+              <a:lnSpc>
+                <a:spcPct val="115000"/>
+              </a:lnSpc>
+              <a:spcAft>
+                <a:spcPts val="800"/>
+              </a:spcAft>
+              <a:buSzPts val="1000"/>
+              <a:buFont typeface="Symbol" panose="05050102010706020507" pitchFamily="18" charset="2"/>
+              <a:buChar char=""/>
+              <a:tabLst>
+                <a:tab pos="457200" algn="l"/>
+              </a:tabLst>
+            </a:pPr>
+            <a:r>
+              <a:rPr lang="de-DE" sz="1800" kern="0" dirty="0">
+                <a:effectLst/>
+                <a:latin typeface="Times New Roman" panose="02020603050405020304" pitchFamily="18" charset="0"/>
+                <a:ea typeface="Times New Roman" panose="02020603050405020304" pitchFamily="18" charset="0"/>
+                <a:cs typeface="Arial" panose="020B0604020202020204" pitchFamily="34" charset="0"/>
+              </a:rPr>
+              <a:t>Falls ja → FMA ist überflüssig.</a:t>
+            </a:r>
+            <a:endParaRPr lang="de-DE" sz="1800" kern="100" dirty="0">
+              <a:effectLst/>
+              <a:latin typeface="Calibri" panose="020F0502020204030204" pitchFamily="34" charset="0"/>
+              <a:ea typeface="Calibri" panose="020F0502020204030204" pitchFamily="34" charset="0"/>
+              <a:cs typeface="Arial" panose="020B0604020202020204" pitchFamily="34" charset="0"/>
+            </a:endParaRPr>
+          </a:p>
+          <a:p>
+            <a:pPr marL="342900" lvl="0" indent="-342900">
+              <a:lnSpc>
+                <a:spcPct val="115000"/>
+              </a:lnSpc>
+              <a:spcAft>
+                <a:spcPts val="800"/>
+              </a:spcAft>
+              <a:buSzPts val="1000"/>
+              <a:buFont typeface="Symbol" panose="05050102010706020507" pitchFamily="18" charset="2"/>
+              <a:buChar char=""/>
+              <a:tabLst>
+                <a:tab pos="457200" algn="l"/>
+              </a:tabLst>
+            </a:pPr>
+            <a:r>
+              <a:rPr lang="de-DE" sz="1800" kern="0" dirty="0">
+                <a:effectLst/>
+                <a:latin typeface="Times New Roman" panose="02020603050405020304" pitchFamily="18" charset="0"/>
+                <a:ea typeface="Times New Roman" panose="02020603050405020304" pitchFamily="18" charset="0"/>
+                <a:cs typeface="Arial" panose="020B0604020202020204" pitchFamily="34" charset="0"/>
+              </a:rPr>
+              <a:t>Falls nein → FMA liefert einzigartige Informationen.</a:t>
+            </a:r>
+            <a:endParaRPr lang="de-DE" sz="1800" kern="100" dirty="0">
+              <a:effectLst/>
+              <a:latin typeface="Calibri" panose="020F0502020204030204" pitchFamily="34" charset="0"/>
+              <a:ea typeface="Calibri" panose="020F0502020204030204" pitchFamily="34" charset="0"/>
+              <a:cs typeface="Arial" panose="020B0604020202020204" pitchFamily="34" charset="0"/>
+            </a:endParaRPr>
+          </a:p>
+          <a:p>
+            <a:pPr>
+              <a:lnSpc>
+                <a:spcPct val="115000"/>
+              </a:lnSpc>
+              <a:spcAft>
+                <a:spcPts val="800"/>
+              </a:spcAft>
+            </a:pPr>
+            <a:r>
+              <a:rPr lang="de-DE" sz="1800" b="1" kern="0" dirty="0">
+                <a:effectLst/>
+                <a:latin typeface="Times New Roman" panose="02020603050405020304" pitchFamily="18" charset="0"/>
+                <a:ea typeface="Times New Roman" panose="02020603050405020304" pitchFamily="18" charset="0"/>
+                <a:cs typeface="Arial" panose="020B0604020202020204" pitchFamily="34" charset="0"/>
+              </a:rPr>
+              <a:t>2. Methodischer Ansatz</a:t>
+            </a:r>
+            <a:endParaRPr lang="de-DE" sz="1800" kern="100" dirty="0">
+              <a:effectLst/>
+              <a:latin typeface="Calibri" panose="020F0502020204030204" pitchFamily="34" charset="0"/>
+              <a:ea typeface="Calibri" panose="020F0502020204030204" pitchFamily="34" charset="0"/>
+              <a:cs typeface="Arial" panose="020B0604020202020204" pitchFamily="34" charset="0"/>
+            </a:endParaRPr>
+          </a:p>
+          <a:p>
+            <a:pPr>
+              <a:lnSpc>
+                <a:spcPct val="115000"/>
+              </a:lnSpc>
+              <a:spcAft>
+                <a:spcPts val="800"/>
+              </a:spcAft>
+            </a:pPr>
+            <a:r>
+              <a:rPr lang="de-DE" sz="1800" kern="0" dirty="0">
+                <a:effectLst/>
+                <a:latin typeface="Times New Roman" panose="02020603050405020304" pitchFamily="18" charset="0"/>
+                <a:ea typeface="Times New Roman" panose="02020603050405020304" pitchFamily="18" charset="0"/>
+                <a:cs typeface="Arial" panose="020B0604020202020204" pitchFamily="34" charset="0"/>
+              </a:rPr>
+              <a:t>Es gibt mehrere Möglichkeiten, das zu prüfen:</a:t>
+            </a:r>
+            <a:endParaRPr lang="de-DE" sz="1800" kern="100" dirty="0">
+              <a:effectLst/>
+              <a:latin typeface="Calibri" panose="020F0502020204030204" pitchFamily="34" charset="0"/>
+              <a:ea typeface="Calibri" panose="020F0502020204030204" pitchFamily="34" charset="0"/>
+              <a:cs typeface="Arial" panose="020B0604020202020204" pitchFamily="34" charset="0"/>
+            </a:endParaRPr>
+          </a:p>
+          <a:p>
+            <a:pPr>
+              <a:lnSpc>
+                <a:spcPct val="115000"/>
+              </a:lnSpc>
+              <a:spcAft>
+                <a:spcPts val="800"/>
+              </a:spcAft>
+            </a:pPr>
+            <a:r>
+              <a:rPr lang="de-DE" sz="1800" b="1" kern="0" dirty="0">
+                <a:effectLst/>
+                <a:latin typeface="Times New Roman" panose="02020603050405020304" pitchFamily="18" charset="0"/>
+                <a:ea typeface="Times New Roman" panose="02020603050405020304" pitchFamily="18" charset="0"/>
+                <a:cs typeface="Arial" panose="020B0604020202020204" pitchFamily="34" charset="0"/>
+              </a:rPr>
+              <a:t>A) Multiple Regression mit und ohne FMA</a:t>
+            </a:r>
+            <a:endParaRPr lang="de-DE" sz="1800" kern="100" dirty="0">
+              <a:effectLst/>
+              <a:latin typeface="Calibri" panose="020F0502020204030204" pitchFamily="34" charset="0"/>
+              <a:ea typeface="Calibri" panose="020F0502020204030204" pitchFamily="34" charset="0"/>
+              <a:cs typeface="Arial" panose="020B0604020202020204" pitchFamily="34" charset="0"/>
+            </a:endParaRPr>
+          </a:p>
+          <a:p>
+            <a:pPr>
+              <a:lnSpc>
+                <a:spcPct val="115000"/>
+              </a:lnSpc>
+              <a:spcAft>
+                <a:spcPts val="800"/>
+              </a:spcAft>
+            </a:pPr>
+            <a:r>
+              <a:rPr lang="de-DE" sz="1800" kern="0" dirty="0">
+                <a:effectLst/>
+                <a:latin typeface="Times New Roman" panose="02020603050405020304" pitchFamily="18" charset="0"/>
+                <a:ea typeface="Times New Roman" panose="02020603050405020304" pitchFamily="18" charset="0"/>
+                <a:cs typeface="Arial" panose="020B0604020202020204" pitchFamily="34" charset="0"/>
+              </a:rPr>
+              <a:t>Du kannst zwei Modelle vergleichen:</a:t>
+            </a:r>
+            <a:endParaRPr lang="de-DE" sz="1800" kern="100" dirty="0">
+              <a:effectLst/>
+              <a:latin typeface="Calibri" panose="020F0502020204030204" pitchFamily="34" charset="0"/>
+              <a:ea typeface="Calibri" panose="020F0502020204030204" pitchFamily="34" charset="0"/>
+              <a:cs typeface="Arial" panose="020B0604020202020204" pitchFamily="34" charset="0"/>
+            </a:endParaRPr>
+          </a:p>
+          <a:p>
+            <a:pPr marL="342900" lvl="0" indent="-342900">
+              <a:lnSpc>
+                <a:spcPct val="115000"/>
+              </a:lnSpc>
+              <a:spcAft>
+                <a:spcPts val="800"/>
+              </a:spcAft>
+              <a:buSzPts val="1000"/>
+              <a:buFont typeface="Symbol" panose="05050102010706020507" pitchFamily="18" charset="2"/>
+              <a:buChar char=""/>
+              <a:tabLst>
+                <a:tab pos="457200" algn="l"/>
+              </a:tabLst>
+            </a:pPr>
+            <a:r>
+              <a:rPr lang="de-DE" sz="1800" b="1" kern="0" dirty="0">
+                <a:effectLst/>
+                <a:latin typeface="Times New Roman" panose="02020603050405020304" pitchFamily="18" charset="0"/>
+                <a:ea typeface="Times New Roman" panose="02020603050405020304" pitchFamily="18" charset="0"/>
+                <a:cs typeface="Arial" panose="020B0604020202020204" pitchFamily="34" charset="0"/>
+              </a:rPr>
+              <a:t>Modell 1 (mit FMA)</a:t>
+            </a:r>
+            <a:endParaRPr lang="de-DE" sz="1800" kern="100" dirty="0">
+              <a:effectLst/>
+              <a:latin typeface="Calibri" panose="020F0502020204030204" pitchFamily="34" charset="0"/>
+              <a:ea typeface="Calibri" panose="020F0502020204030204" pitchFamily="34" charset="0"/>
+              <a:cs typeface="Arial" panose="020B0604020202020204" pitchFamily="34" charset="0"/>
+            </a:endParaRPr>
+          </a:p>
+          <a:p>
+            <a:pPr>
+              <a:lnSpc>
+                <a:spcPct val="115000"/>
+              </a:lnSpc>
+              <a:spcAft>
+                <a:spcPts val="800"/>
+              </a:spcAft>
+            </a:pPr>
+            <a:r>
+              <a:rPr lang="de-DE" sz="1800" kern="0" dirty="0">
+                <a:effectLst/>
+                <a:latin typeface="Times New Roman" panose="02020603050405020304" pitchFamily="18" charset="0"/>
+                <a:ea typeface="Times New Roman" panose="02020603050405020304" pitchFamily="18" charset="0"/>
+                <a:cs typeface="Arial" panose="020B0604020202020204" pitchFamily="34" charset="0"/>
+              </a:rPr>
+              <a:t>Erholung=β0+β1</a:t>
+            </a:r>
+            <a:r>
+              <a:rPr lang="de-DE" sz="1800" kern="0" dirty="0">
+                <a:effectLst/>
+                <a:latin typeface="Cambria Math" panose="02040503050406030204" pitchFamily="18" charset="0"/>
+                <a:ea typeface="Times New Roman" panose="02020603050405020304" pitchFamily="18" charset="0"/>
+                <a:cs typeface="Cambria Math" panose="02040503050406030204" pitchFamily="18" charset="0"/>
+              </a:rPr>
+              <a:t>⋅</a:t>
+            </a:r>
+            <a:r>
+              <a:rPr lang="de-DE" sz="1800" kern="0" dirty="0">
+                <a:effectLst/>
+                <a:latin typeface="Times New Roman" panose="02020603050405020304" pitchFamily="18" charset="0"/>
+                <a:ea typeface="Times New Roman" panose="02020603050405020304" pitchFamily="18" charset="0"/>
+                <a:cs typeface="Arial" panose="020B0604020202020204" pitchFamily="34" charset="0"/>
+              </a:rPr>
+              <a:t>FMA+β2</a:t>
+            </a:r>
+            <a:r>
+              <a:rPr lang="de-DE" sz="1800" kern="0" dirty="0">
+                <a:effectLst/>
+                <a:latin typeface="Cambria Math" panose="02040503050406030204" pitchFamily="18" charset="0"/>
+                <a:ea typeface="Times New Roman" panose="02020603050405020304" pitchFamily="18" charset="0"/>
+                <a:cs typeface="Cambria Math" panose="02040503050406030204" pitchFamily="18" charset="0"/>
+              </a:rPr>
+              <a:t>⋅</a:t>
+            </a:r>
+            <a:r>
+              <a:rPr lang="de-DE" sz="1800" kern="0" dirty="0">
+                <a:effectLst/>
+                <a:latin typeface="Times New Roman" panose="02020603050405020304" pitchFamily="18" charset="0"/>
+                <a:ea typeface="Times New Roman" panose="02020603050405020304" pitchFamily="18" charset="0"/>
+                <a:cs typeface="Arial" panose="020B0604020202020204" pitchFamily="34" charset="0"/>
+              </a:rPr>
+              <a:t>NIHSS+β3</a:t>
+            </a:r>
+            <a:r>
+              <a:rPr lang="de-DE" sz="1800" kern="0" dirty="0">
+                <a:effectLst/>
+                <a:latin typeface="Cambria Math" panose="02040503050406030204" pitchFamily="18" charset="0"/>
+                <a:ea typeface="Times New Roman" panose="02020603050405020304" pitchFamily="18" charset="0"/>
+                <a:cs typeface="Cambria Math" panose="02040503050406030204" pitchFamily="18" charset="0"/>
+              </a:rPr>
+              <a:t>⋅</a:t>
+            </a:r>
+            <a:r>
+              <a:rPr lang="de-DE" sz="1800" kern="0" dirty="0">
+                <a:effectLst/>
+                <a:latin typeface="Times New Roman" panose="02020603050405020304" pitchFamily="18" charset="0"/>
+                <a:ea typeface="Times New Roman" panose="02020603050405020304" pitchFamily="18" charset="0"/>
+                <a:cs typeface="Arial" panose="020B0604020202020204" pitchFamily="34" charset="0"/>
+              </a:rPr>
+              <a:t>BI+ϵ\</a:t>
+            </a:r>
+            <a:r>
+              <a:rPr lang="de-DE" sz="1800" kern="0" dirty="0" err="1">
+                <a:effectLst/>
+                <a:latin typeface="Times New Roman" panose="02020603050405020304" pitchFamily="18" charset="0"/>
+                <a:ea typeface="Times New Roman" panose="02020603050405020304" pitchFamily="18" charset="0"/>
+                <a:cs typeface="Arial" panose="020B0604020202020204" pitchFamily="34" charset="0"/>
+              </a:rPr>
+              <a:t>text</a:t>
+            </a:r>
+            <a:r>
+              <a:rPr lang="de-DE" sz="1800" kern="0" dirty="0">
+                <a:effectLst/>
+                <a:latin typeface="Times New Roman" panose="02020603050405020304" pitchFamily="18" charset="0"/>
+                <a:ea typeface="Times New Roman" panose="02020603050405020304" pitchFamily="18" charset="0"/>
+                <a:cs typeface="Arial" panose="020B0604020202020204" pitchFamily="34" charset="0"/>
+              </a:rPr>
+              <a:t>{Erholung} = \beta_0 + \beta_1 \</a:t>
+            </a:r>
+            <a:r>
+              <a:rPr lang="de-DE" sz="1800" kern="0" dirty="0" err="1">
+                <a:effectLst/>
+                <a:latin typeface="Times New Roman" panose="02020603050405020304" pitchFamily="18" charset="0"/>
+                <a:ea typeface="Times New Roman" panose="02020603050405020304" pitchFamily="18" charset="0"/>
+                <a:cs typeface="Arial" panose="020B0604020202020204" pitchFamily="34" charset="0"/>
+              </a:rPr>
+              <a:t>cdot</a:t>
+            </a:r>
+            <a:r>
+              <a:rPr lang="de-DE" sz="1800" kern="0" dirty="0">
+                <a:effectLst/>
+                <a:latin typeface="Times New Roman" panose="02020603050405020304" pitchFamily="18" charset="0"/>
+                <a:ea typeface="Times New Roman" panose="02020603050405020304" pitchFamily="18" charset="0"/>
+                <a:cs typeface="Arial" panose="020B0604020202020204" pitchFamily="34" charset="0"/>
+              </a:rPr>
+              <a:t> \</a:t>
+            </a:r>
+            <a:r>
+              <a:rPr lang="de-DE" sz="1800" kern="0" dirty="0" err="1">
+                <a:effectLst/>
+                <a:latin typeface="Times New Roman" panose="02020603050405020304" pitchFamily="18" charset="0"/>
+                <a:ea typeface="Times New Roman" panose="02020603050405020304" pitchFamily="18" charset="0"/>
+                <a:cs typeface="Arial" panose="020B0604020202020204" pitchFamily="34" charset="0"/>
+              </a:rPr>
+              <a:t>text</a:t>
+            </a:r>
+            <a:r>
+              <a:rPr lang="de-DE" sz="1800" kern="0" dirty="0">
+                <a:effectLst/>
+                <a:latin typeface="Times New Roman" panose="02020603050405020304" pitchFamily="18" charset="0"/>
+                <a:ea typeface="Times New Roman" panose="02020603050405020304" pitchFamily="18" charset="0"/>
+                <a:cs typeface="Arial" panose="020B0604020202020204" pitchFamily="34" charset="0"/>
+              </a:rPr>
+              <a:t>{FMA} + \beta_2 \</a:t>
+            </a:r>
+            <a:r>
+              <a:rPr lang="de-DE" sz="1800" kern="0" dirty="0" err="1">
+                <a:effectLst/>
+                <a:latin typeface="Times New Roman" panose="02020603050405020304" pitchFamily="18" charset="0"/>
+                <a:ea typeface="Times New Roman" panose="02020603050405020304" pitchFamily="18" charset="0"/>
+                <a:cs typeface="Arial" panose="020B0604020202020204" pitchFamily="34" charset="0"/>
+              </a:rPr>
+              <a:t>cdot</a:t>
+            </a:r>
+            <a:r>
+              <a:rPr lang="de-DE" sz="1800" kern="0" dirty="0">
+                <a:effectLst/>
+                <a:latin typeface="Times New Roman" panose="02020603050405020304" pitchFamily="18" charset="0"/>
+                <a:ea typeface="Times New Roman" panose="02020603050405020304" pitchFamily="18" charset="0"/>
+                <a:cs typeface="Arial" panose="020B0604020202020204" pitchFamily="34" charset="0"/>
+              </a:rPr>
+              <a:t> \</a:t>
+            </a:r>
+            <a:r>
+              <a:rPr lang="de-DE" sz="1800" kern="0" dirty="0" err="1">
+                <a:effectLst/>
+                <a:latin typeface="Times New Roman" panose="02020603050405020304" pitchFamily="18" charset="0"/>
+                <a:ea typeface="Times New Roman" panose="02020603050405020304" pitchFamily="18" charset="0"/>
+                <a:cs typeface="Arial" panose="020B0604020202020204" pitchFamily="34" charset="0"/>
+              </a:rPr>
+              <a:t>text</a:t>
+            </a:r>
+            <a:r>
+              <a:rPr lang="de-DE" sz="1800" kern="0" dirty="0">
+                <a:effectLst/>
+                <a:latin typeface="Times New Roman" panose="02020603050405020304" pitchFamily="18" charset="0"/>
+                <a:ea typeface="Times New Roman" panose="02020603050405020304" pitchFamily="18" charset="0"/>
+                <a:cs typeface="Arial" panose="020B0604020202020204" pitchFamily="34" charset="0"/>
+              </a:rPr>
+              <a:t>{NIHSS} + \beta_3 \</a:t>
+            </a:r>
+            <a:r>
+              <a:rPr lang="de-DE" sz="1800" kern="0" dirty="0" err="1">
+                <a:effectLst/>
+                <a:latin typeface="Times New Roman" panose="02020603050405020304" pitchFamily="18" charset="0"/>
+                <a:ea typeface="Times New Roman" panose="02020603050405020304" pitchFamily="18" charset="0"/>
+                <a:cs typeface="Arial" panose="020B0604020202020204" pitchFamily="34" charset="0"/>
+              </a:rPr>
+              <a:t>cdot</a:t>
+            </a:r>
+            <a:r>
+              <a:rPr lang="de-DE" sz="1800" kern="0" dirty="0">
+                <a:effectLst/>
+                <a:latin typeface="Times New Roman" panose="02020603050405020304" pitchFamily="18" charset="0"/>
+                <a:ea typeface="Times New Roman" panose="02020603050405020304" pitchFamily="18" charset="0"/>
+                <a:cs typeface="Arial" panose="020B0604020202020204" pitchFamily="34" charset="0"/>
+              </a:rPr>
+              <a:t> \</a:t>
+            </a:r>
+            <a:r>
+              <a:rPr lang="de-DE" sz="1800" kern="0" dirty="0" err="1">
+                <a:effectLst/>
+                <a:latin typeface="Times New Roman" panose="02020603050405020304" pitchFamily="18" charset="0"/>
+                <a:ea typeface="Times New Roman" panose="02020603050405020304" pitchFamily="18" charset="0"/>
+                <a:cs typeface="Arial" panose="020B0604020202020204" pitchFamily="34" charset="0"/>
+              </a:rPr>
+              <a:t>text</a:t>
+            </a:r>
+            <a:r>
+              <a:rPr lang="de-DE" sz="1800" kern="0" dirty="0">
+                <a:effectLst/>
+                <a:latin typeface="Times New Roman" panose="02020603050405020304" pitchFamily="18" charset="0"/>
+                <a:ea typeface="Times New Roman" panose="02020603050405020304" pitchFamily="18" charset="0"/>
+                <a:cs typeface="Arial" panose="020B0604020202020204" pitchFamily="34" charset="0"/>
+              </a:rPr>
+              <a:t>{BI} + \</a:t>
+            </a:r>
+            <a:r>
+              <a:rPr lang="de-DE" sz="1800" kern="0" dirty="0" err="1">
+                <a:effectLst/>
+                <a:latin typeface="Times New Roman" panose="02020603050405020304" pitchFamily="18" charset="0"/>
+                <a:ea typeface="Times New Roman" panose="02020603050405020304" pitchFamily="18" charset="0"/>
+                <a:cs typeface="Arial" panose="020B0604020202020204" pitchFamily="34" charset="0"/>
+              </a:rPr>
+              <a:t>epsilonErholung</a:t>
+            </a:r>
+            <a:r>
+              <a:rPr lang="de-DE" sz="1800" kern="0" dirty="0">
+                <a:effectLst/>
+                <a:latin typeface="Times New Roman" panose="02020603050405020304" pitchFamily="18" charset="0"/>
+                <a:ea typeface="Times New Roman" panose="02020603050405020304" pitchFamily="18" charset="0"/>
+                <a:cs typeface="Arial" panose="020B0604020202020204" pitchFamily="34" charset="0"/>
+              </a:rPr>
+              <a:t>=β0​+β1​</a:t>
+            </a:r>
+            <a:r>
+              <a:rPr lang="de-DE" sz="1800" kern="0" dirty="0">
+                <a:effectLst/>
+                <a:latin typeface="Cambria Math" panose="02040503050406030204" pitchFamily="18" charset="0"/>
+                <a:ea typeface="Times New Roman" panose="02020603050405020304" pitchFamily="18" charset="0"/>
+                <a:cs typeface="Cambria Math" panose="02040503050406030204" pitchFamily="18" charset="0"/>
+              </a:rPr>
+              <a:t>⋅</a:t>
+            </a:r>
+            <a:r>
+              <a:rPr lang="de-DE" sz="1800" kern="0" dirty="0">
+                <a:effectLst/>
+                <a:latin typeface="Times New Roman" panose="02020603050405020304" pitchFamily="18" charset="0"/>
+                <a:ea typeface="Times New Roman" panose="02020603050405020304" pitchFamily="18" charset="0"/>
+                <a:cs typeface="Arial" panose="020B0604020202020204" pitchFamily="34" charset="0"/>
+              </a:rPr>
+              <a:t>FMA+β2​</a:t>
+            </a:r>
+            <a:r>
+              <a:rPr lang="de-DE" sz="1800" kern="0" dirty="0">
+                <a:effectLst/>
+                <a:latin typeface="Cambria Math" panose="02040503050406030204" pitchFamily="18" charset="0"/>
+                <a:ea typeface="Times New Roman" panose="02020603050405020304" pitchFamily="18" charset="0"/>
+                <a:cs typeface="Cambria Math" panose="02040503050406030204" pitchFamily="18" charset="0"/>
+              </a:rPr>
+              <a:t>⋅</a:t>
+            </a:r>
+            <a:r>
+              <a:rPr lang="de-DE" sz="1800" kern="0" dirty="0">
+                <a:effectLst/>
+                <a:latin typeface="Times New Roman" panose="02020603050405020304" pitchFamily="18" charset="0"/>
+                <a:ea typeface="Times New Roman" panose="02020603050405020304" pitchFamily="18" charset="0"/>
+                <a:cs typeface="Arial" panose="020B0604020202020204" pitchFamily="34" charset="0"/>
+              </a:rPr>
+              <a:t>NIHSS+β3​</a:t>
+            </a:r>
+            <a:r>
+              <a:rPr lang="de-DE" sz="1800" kern="0" dirty="0">
+                <a:effectLst/>
+                <a:latin typeface="Cambria Math" panose="02040503050406030204" pitchFamily="18" charset="0"/>
+                <a:ea typeface="Times New Roman" panose="02020603050405020304" pitchFamily="18" charset="0"/>
+                <a:cs typeface="Cambria Math" panose="02040503050406030204" pitchFamily="18" charset="0"/>
+              </a:rPr>
+              <a:t>⋅</a:t>
+            </a:r>
+            <a:r>
+              <a:rPr lang="de-DE" sz="1800" kern="0" dirty="0">
+                <a:effectLst/>
+                <a:latin typeface="Times New Roman" panose="02020603050405020304" pitchFamily="18" charset="0"/>
+                <a:ea typeface="Times New Roman" panose="02020603050405020304" pitchFamily="18" charset="0"/>
+                <a:cs typeface="Arial" panose="020B0604020202020204" pitchFamily="34" charset="0"/>
+              </a:rPr>
+              <a:t>BI+ϵ </a:t>
+            </a:r>
+            <a:endParaRPr lang="de-DE" sz="1800" kern="100" dirty="0">
+              <a:effectLst/>
+              <a:latin typeface="Calibri" panose="020F0502020204030204" pitchFamily="34" charset="0"/>
+              <a:ea typeface="Calibri" panose="020F0502020204030204" pitchFamily="34" charset="0"/>
+              <a:cs typeface="Arial" panose="020B0604020202020204" pitchFamily="34" charset="0"/>
+            </a:endParaRPr>
+          </a:p>
+          <a:p>
+            <a:pPr marL="342900" lvl="0" indent="-342900">
+              <a:lnSpc>
+                <a:spcPct val="115000"/>
+              </a:lnSpc>
+              <a:spcAft>
+                <a:spcPts val="800"/>
+              </a:spcAft>
+              <a:buSzPts val="1000"/>
+              <a:buFont typeface="Symbol" panose="05050102010706020507" pitchFamily="18" charset="2"/>
+              <a:buChar char=""/>
+              <a:tabLst>
+                <a:tab pos="457200" algn="l"/>
+              </a:tabLst>
+            </a:pPr>
+            <a:r>
+              <a:rPr lang="de-DE" sz="1800" b="1" kern="0" dirty="0">
+                <a:effectLst/>
+                <a:latin typeface="Times New Roman" panose="02020603050405020304" pitchFamily="18" charset="0"/>
+                <a:ea typeface="Times New Roman" panose="02020603050405020304" pitchFamily="18" charset="0"/>
+                <a:cs typeface="Arial" panose="020B0604020202020204" pitchFamily="34" charset="0"/>
+              </a:rPr>
+              <a:t>Modell 2 (ohne FMA)</a:t>
+            </a:r>
+            <a:endParaRPr lang="de-DE" sz="1800" kern="100" dirty="0">
+              <a:effectLst/>
+              <a:latin typeface="Calibri" panose="020F0502020204030204" pitchFamily="34" charset="0"/>
+              <a:ea typeface="Calibri" panose="020F0502020204030204" pitchFamily="34" charset="0"/>
+              <a:cs typeface="Arial" panose="020B0604020202020204" pitchFamily="34" charset="0"/>
+            </a:endParaRPr>
+          </a:p>
+          <a:p>
+            <a:pPr>
+              <a:lnSpc>
+                <a:spcPct val="115000"/>
+              </a:lnSpc>
+              <a:spcAft>
+                <a:spcPts val="800"/>
+              </a:spcAft>
+            </a:pPr>
+            <a:r>
+              <a:rPr lang="de-DE" sz="1800" kern="0" dirty="0">
+                <a:effectLst/>
+                <a:latin typeface="Times New Roman" panose="02020603050405020304" pitchFamily="18" charset="0"/>
+                <a:ea typeface="Times New Roman" panose="02020603050405020304" pitchFamily="18" charset="0"/>
+                <a:cs typeface="Arial" panose="020B0604020202020204" pitchFamily="34" charset="0"/>
+              </a:rPr>
+              <a:t>Erholung=β0+β2</a:t>
+            </a:r>
+            <a:r>
+              <a:rPr lang="de-DE" sz="1800" kern="0" dirty="0">
+                <a:effectLst/>
+                <a:latin typeface="Cambria Math" panose="02040503050406030204" pitchFamily="18" charset="0"/>
+                <a:ea typeface="Times New Roman" panose="02020603050405020304" pitchFamily="18" charset="0"/>
+                <a:cs typeface="Cambria Math" panose="02040503050406030204" pitchFamily="18" charset="0"/>
+              </a:rPr>
+              <a:t>⋅</a:t>
+            </a:r>
+            <a:r>
+              <a:rPr lang="de-DE" sz="1800" kern="0" dirty="0">
+                <a:effectLst/>
+                <a:latin typeface="Times New Roman" panose="02020603050405020304" pitchFamily="18" charset="0"/>
+                <a:ea typeface="Times New Roman" panose="02020603050405020304" pitchFamily="18" charset="0"/>
+                <a:cs typeface="Arial" panose="020B0604020202020204" pitchFamily="34" charset="0"/>
+              </a:rPr>
+              <a:t>NIHSS+β3</a:t>
+            </a:r>
+            <a:r>
+              <a:rPr lang="de-DE" sz="1800" kern="0" dirty="0">
+                <a:effectLst/>
+                <a:latin typeface="Cambria Math" panose="02040503050406030204" pitchFamily="18" charset="0"/>
+                <a:ea typeface="Times New Roman" panose="02020603050405020304" pitchFamily="18" charset="0"/>
+                <a:cs typeface="Cambria Math" panose="02040503050406030204" pitchFamily="18" charset="0"/>
+              </a:rPr>
+              <a:t>⋅</a:t>
+            </a:r>
+            <a:r>
+              <a:rPr lang="de-DE" sz="1800" kern="0" dirty="0">
+                <a:effectLst/>
+                <a:latin typeface="Times New Roman" panose="02020603050405020304" pitchFamily="18" charset="0"/>
+                <a:ea typeface="Times New Roman" panose="02020603050405020304" pitchFamily="18" charset="0"/>
+                <a:cs typeface="Arial" panose="020B0604020202020204" pitchFamily="34" charset="0"/>
+              </a:rPr>
+              <a:t>BI+ϵ\</a:t>
+            </a:r>
+            <a:r>
+              <a:rPr lang="de-DE" sz="1800" kern="0" dirty="0" err="1">
+                <a:effectLst/>
+                <a:latin typeface="Times New Roman" panose="02020603050405020304" pitchFamily="18" charset="0"/>
+                <a:ea typeface="Times New Roman" panose="02020603050405020304" pitchFamily="18" charset="0"/>
+                <a:cs typeface="Arial" panose="020B0604020202020204" pitchFamily="34" charset="0"/>
+              </a:rPr>
+              <a:t>text</a:t>
+            </a:r>
+            <a:r>
+              <a:rPr lang="de-DE" sz="1800" kern="0" dirty="0">
+                <a:effectLst/>
+                <a:latin typeface="Times New Roman" panose="02020603050405020304" pitchFamily="18" charset="0"/>
+                <a:ea typeface="Times New Roman" panose="02020603050405020304" pitchFamily="18" charset="0"/>
+                <a:cs typeface="Arial" panose="020B0604020202020204" pitchFamily="34" charset="0"/>
+              </a:rPr>
+              <a:t>{Erholung} = \beta_0 + \beta_2 \</a:t>
+            </a:r>
+            <a:r>
+              <a:rPr lang="de-DE" sz="1800" kern="0" dirty="0" err="1">
+                <a:effectLst/>
+                <a:latin typeface="Times New Roman" panose="02020603050405020304" pitchFamily="18" charset="0"/>
+                <a:ea typeface="Times New Roman" panose="02020603050405020304" pitchFamily="18" charset="0"/>
+                <a:cs typeface="Arial" panose="020B0604020202020204" pitchFamily="34" charset="0"/>
+              </a:rPr>
+              <a:t>cdot</a:t>
+            </a:r>
+            <a:r>
+              <a:rPr lang="de-DE" sz="1800" kern="0" dirty="0">
+                <a:effectLst/>
+                <a:latin typeface="Times New Roman" panose="02020603050405020304" pitchFamily="18" charset="0"/>
+                <a:ea typeface="Times New Roman" panose="02020603050405020304" pitchFamily="18" charset="0"/>
+                <a:cs typeface="Arial" panose="020B0604020202020204" pitchFamily="34" charset="0"/>
+              </a:rPr>
+              <a:t> \</a:t>
+            </a:r>
+            <a:r>
+              <a:rPr lang="de-DE" sz="1800" kern="0" dirty="0" err="1">
+                <a:effectLst/>
+                <a:latin typeface="Times New Roman" panose="02020603050405020304" pitchFamily="18" charset="0"/>
+                <a:ea typeface="Times New Roman" panose="02020603050405020304" pitchFamily="18" charset="0"/>
+                <a:cs typeface="Arial" panose="020B0604020202020204" pitchFamily="34" charset="0"/>
+              </a:rPr>
+              <a:t>text</a:t>
+            </a:r>
+            <a:r>
+              <a:rPr lang="de-DE" sz="1800" kern="0" dirty="0">
+                <a:effectLst/>
+                <a:latin typeface="Times New Roman" panose="02020603050405020304" pitchFamily="18" charset="0"/>
+                <a:ea typeface="Times New Roman" panose="02020603050405020304" pitchFamily="18" charset="0"/>
+                <a:cs typeface="Arial" panose="020B0604020202020204" pitchFamily="34" charset="0"/>
+              </a:rPr>
+              <a:t>{NIHSS} + \beta_3 \</a:t>
+            </a:r>
+            <a:r>
+              <a:rPr lang="de-DE" sz="1800" kern="0" dirty="0" err="1">
+                <a:effectLst/>
+                <a:latin typeface="Times New Roman" panose="02020603050405020304" pitchFamily="18" charset="0"/>
+                <a:ea typeface="Times New Roman" panose="02020603050405020304" pitchFamily="18" charset="0"/>
+                <a:cs typeface="Arial" panose="020B0604020202020204" pitchFamily="34" charset="0"/>
+              </a:rPr>
+              <a:t>cdot</a:t>
+            </a:r>
+            <a:r>
+              <a:rPr lang="de-DE" sz="1800" kern="0" dirty="0">
+                <a:effectLst/>
+                <a:latin typeface="Times New Roman" panose="02020603050405020304" pitchFamily="18" charset="0"/>
+                <a:ea typeface="Times New Roman" panose="02020603050405020304" pitchFamily="18" charset="0"/>
+                <a:cs typeface="Arial" panose="020B0604020202020204" pitchFamily="34" charset="0"/>
+              </a:rPr>
+              <a:t> \</a:t>
+            </a:r>
+            <a:r>
+              <a:rPr lang="de-DE" sz="1800" kern="0" dirty="0" err="1">
+                <a:effectLst/>
+                <a:latin typeface="Times New Roman" panose="02020603050405020304" pitchFamily="18" charset="0"/>
+                <a:ea typeface="Times New Roman" panose="02020603050405020304" pitchFamily="18" charset="0"/>
+                <a:cs typeface="Arial" panose="020B0604020202020204" pitchFamily="34" charset="0"/>
+              </a:rPr>
+              <a:t>text</a:t>
+            </a:r>
+            <a:r>
+              <a:rPr lang="de-DE" sz="1800" kern="0" dirty="0">
+                <a:effectLst/>
+                <a:latin typeface="Times New Roman" panose="02020603050405020304" pitchFamily="18" charset="0"/>
+                <a:ea typeface="Times New Roman" panose="02020603050405020304" pitchFamily="18" charset="0"/>
+                <a:cs typeface="Arial" panose="020B0604020202020204" pitchFamily="34" charset="0"/>
+              </a:rPr>
+              <a:t>{BI} + \</a:t>
+            </a:r>
+            <a:r>
+              <a:rPr lang="de-DE" sz="1800" kern="0" dirty="0" err="1">
+                <a:effectLst/>
+                <a:latin typeface="Times New Roman" panose="02020603050405020304" pitchFamily="18" charset="0"/>
+                <a:ea typeface="Times New Roman" panose="02020603050405020304" pitchFamily="18" charset="0"/>
+                <a:cs typeface="Arial" panose="020B0604020202020204" pitchFamily="34" charset="0"/>
+              </a:rPr>
+              <a:t>epsilonErholung</a:t>
+            </a:r>
+            <a:r>
+              <a:rPr lang="de-DE" sz="1800" kern="0" dirty="0">
+                <a:effectLst/>
+                <a:latin typeface="Times New Roman" panose="02020603050405020304" pitchFamily="18" charset="0"/>
+                <a:ea typeface="Times New Roman" panose="02020603050405020304" pitchFamily="18" charset="0"/>
+                <a:cs typeface="Arial" panose="020B0604020202020204" pitchFamily="34" charset="0"/>
+              </a:rPr>
+              <a:t>=β0​+β2​</a:t>
+            </a:r>
+            <a:r>
+              <a:rPr lang="de-DE" sz="1800" kern="0" dirty="0">
+                <a:effectLst/>
+                <a:latin typeface="Cambria Math" panose="02040503050406030204" pitchFamily="18" charset="0"/>
+                <a:ea typeface="Times New Roman" panose="02020603050405020304" pitchFamily="18" charset="0"/>
+                <a:cs typeface="Cambria Math" panose="02040503050406030204" pitchFamily="18" charset="0"/>
+              </a:rPr>
+              <a:t>⋅</a:t>
+            </a:r>
+            <a:r>
+              <a:rPr lang="de-DE" sz="1800" kern="0" dirty="0">
+                <a:effectLst/>
+                <a:latin typeface="Times New Roman" panose="02020603050405020304" pitchFamily="18" charset="0"/>
+                <a:ea typeface="Times New Roman" panose="02020603050405020304" pitchFamily="18" charset="0"/>
+                <a:cs typeface="Arial" panose="020B0604020202020204" pitchFamily="34" charset="0"/>
+              </a:rPr>
+              <a:t>NIHSS+β3​</a:t>
+            </a:r>
+            <a:r>
+              <a:rPr lang="de-DE" sz="1800" kern="0" dirty="0">
+                <a:effectLst/>
+                <a:latin typeface="Cambria Math" panose="02040503050406030204" pitchFamily="18" charset="0"/>
+                <a:ea typeface="Times New Roman" panose="02020603050405020304" pitchFamily="18" charset="0"/>
+                <a:cs typeface="Cambria Math" panose="02040503050406030204" pitchFamily="18" charset="0"/>
+              </a:rPr>
+              <a:t>⋅</a:t>
+            </a:r>
+            <a:r>
+              <a:rPr lang="de-DE" sz="1800" kern="0" dirty="0">
+                <a:effectLst/>
+                <a:latin typeface="Times New Roman" panose="02020603050405020304" pitchFamily="18" charset="0"/>
+                <a:ea typeface="Times New Roman" panose="02020603050405020304" pitchFamily="18" charset="0"/>
+                <a:cs typeface="Arial" panose="020B0604020202020204" pitchFamily="34" charset="0"/>
+              </a:rPr>
+              <a:t>BI+ϵ </a:t>
+            </a:r>
+            <a:endParaRPr lang="de-DE" sz="1800" kern="100" dirty="0">
+              <a:effectLst/>
+              <a:latin typeface="Calibri" panose="020F0502020204030204" pitchFamily="34" charset="0"/>
+              <a:ea typeface="Calibri" panose="020F0502020204030204" pitchFamily="34" charset="0"/>
+              <a:cs typeface="Arial" panose="020B0604020202020204" pitchFamily="34" charset="0"/>
+            </a:endParaRPr>
+          </a:p>
+          <a:p>
+            <a:pPr>
+              <a:lnSpc>
+                <a:spcPct val="115000"/>
+              </a:lnSpc>
+              <a:spcAft>
+                <a:spcPts val="800"/>
+              </a:spcAft>
+            </a:pPr>
+            <a:r>
+              <a:rPr lang="de-DE" sz="1800" kern="0" dirty="0">
+                <a:effectLst/>
+                <a:latin typeface="Apple Color Emoji"/>
+                <a:ea typeface="Times New Roman" panose="02020603050405020304" pitchFamily="18" charset="0"/>
+                <a:cs typeface="Apple Color Emoji"/>
+              </a:rPr>
+              <a:t>👉</a:t>
+            </a:r>
+            <a:r>
+              <a:rPr lang="de-DE" sz="1800" kern="0" dirty="0">
+                <a:effectLst/>
+                <a:latin typeface="Times New Roman" panose="02020603050405020304" pitchFamily="18" charset="0"/>
+                <a:ea typeface="Times New Roman" panose="02020603050405020304" pitchFamily="18" charset="0"/>
+                <a:cs typeface="Arial" panose="020B0604020202020204" pitchFamily="34" charset="0"/>
+              </a:rPr>
+              <a:t> </a:t>
+            </a:r>
+            <a:r>
+              <a:rPr lang="de-DE" sz="1800" b="1" kern="0" dirty="0">
+                <a:effectLst/>
+                <a:latin typeface="Times New Roman" panose="02020603050405020304" pitchFamily="18" charset="0"/>
+                <a:ea typeface="Times New Roman" panose="02020603050405020304" pitchFamily="18" charset="0"/>
+                <a:cs typeface="Arial" panose="020B0604020202020204" pitchFamily="34" charset="0"/>
+              </a:rPr>
+              <a:t>Vergleich der Modelle</a:t>
+            </a:r>
+            <a:r>
+              <a:rPr lang="de-DE" sz="1800" kern="0" dirty="0">
+                <a:effectLst/>
+                <a:latin typeface="Times New Roman" panose="02020603050405020304" pitchFamily="18" charset="0"/>
+                <a:ea typeface="Times New Roman" panose="02020603050405020304" pitchFamily="18" charset="0"/>
+                <a:cs typeface="Arial" panose="020B0604020202020204" pitchFamily="34" charset="0"/>
+              </a:rPr>
+              <a:t>:</a:t>
+            </a:r>
+            <a:endParaRPr lang="de-DE" sz="1800" kern="100" dirty="0">
+              <a:effectLst/>
+              <a:latin typeface="Calibri" panose="020F0502020204030204" pitchFamily="34" charset="0"/>
+              <a:ea typeface="Calibri" panose="020F0502020204030204" pitchFamily="34" charset="0"/>
+              <a:cs typeface="Arial" panose="020B0604020202020204" pitchFamily="34" charset="0"/>
+            </a:endParaRPr>
+          </a:p>
+          <a:p>
+            <a:pPr marL="342900" lvl="0" indent="-342900">
+              <a:lnSpc>
+                <a:spcPct val="115000"/>
+              </a:lnSpc>
+              <a:spcAft>
+                <a:spcPts val="800"/>
+              </a:spcAft>
+              <a:buSzPts val="1000"/>
+              <a:buFont typeface="Symbol" panose="05050102010706020507" pitchFamily="18" charset="2"/>
+              <a:buChar char=""/>
+              <a:tabLst>
+                <a:tab pos="457200" algn="l"/>
+              </a:tabLst>
+            </a:pPr>
+            <a:r>
+              <a:rPr lang="de-DE" sz="1800" kern="0" dirty="0">
+                <a:effectLst/>
+                <a:latin typeface="Times New Roman" panose="02020603050405020304" pitchFamily="18" charset="0"/>
+                <a:ea typeface="Times New Roman" panose="02020603050405020304" pitchFamily="18" charset="0"/>
+                <a:cs typeface="Arial" panose="020B0604020202020204" pitchFamily="34" charset="0"/>
+              </a:rPr>
+              <a:t>Falls </a:t>
+            </a:r>
+            <a:r>
+              <a:rPr lang="de-DE" sz="1800" b="1" kern="0" dirty="0">
+                <a:effectLst/>
+                <a:latin typeface="Times New Roman" panose="02020603050405020304" pitchFamily="18" charset="0"/>
+                <a:ea typeface="Times New Roman" panose="02020603050405020304" pitchFamily="18" charset="0"/>
+                <a:cs typeface="Arial" panose="020B0604020202020204" pitchFamily="34" charset="0"/>
+              </a:rPr>
+              <a:t>R² stark sinkt</a:t>
+            </a:r>
+            <a:r>
+              <a:rPr lang="de-DE" sz="1800" kern="0" dirty="0">
+                <a:effectLst/>
+                <a:latin typeface="Times New Roman" panose="02020603050405020304" pitchFamily="18" charset="0"/>
+                <a:ea typeface="Times New Roman" panose="02020603050405020304" pitchFamily="18" charset="0"/>
+                <a:cs typeface="Arial" panose="020B0604020202020204" pitchFamily="34" charset="0"/>
+              </a:rPr>
+              <a:t>, liefert FMA zusätzliche Erklärungsleistung.</a:t>
+            </a:r>
+            <a:endParaRPr lang="de-DE" sz="1800" kern="100" dirty="0">
+              <a:effectLst/>
+              <a:latin typeface="Calibri" panose="020F0502020204030204" pitchFamily="34" charset="0"/>
+              <a:ea typeface="Calibri" panose="020F0502020204030204" pitchFamily="34" charset="0"/>
+              <a:cs typeface="Arial" panose="020B0604020202020204" pitchFamily="34" charset="0"/>
+            </a:endParaRPr>
+          </a:p>
+          <a:p>
+            <a:pPr marL="342900" lvl="0" indent="-342900">
+              <a:lnSpc>
+                <a:spcPct val="115000"/>
+              </a:lnSpc>
+              <a:spcAft>
+                <a:spcPts val="800"/>
+              </a:spcAft>
+              <a:buSzPts val="1000"/>
+              <a:buFont typeface="Symbol" panose="05050102010706020507" pitchFamily="18" charset="2"/>
+              <a:buChar char=""/>
+              <a:tabLst>
+                <a:tab pos="457200" algn="l"/>
+              </a:tabLst>
+            </a:pPr>
+            <a:r>
+              <a:rPr lang="de-DE" sz="1800" kern="0" dirty="0">
+                <a:effectLst/>
+                <a:latin typeface="Times New Roman" panose="02020603050405020304" pitchFamily="18" charset="0"/>
+                <a:ea typeface="Times New Roman" panose="02020603050405020304" pitchFamily="18" charset="0"/>
+                <a:cs typeface="Arial" panose="020B0604020202020204" pitchFamily="34" charset="0"/>
+              </a:rPr>
+              <a:t>Falls </a:t>
+            </a:r>
+            <a:r>
+              <a:rPr lang="de-DE" sz="1800" b="1" kern="0" dirty="0">
+                <a:effectLst/>
+                <a:latin typeface="Times New Roman" panose="02020603050405020304" pitchFamily="18" charset="0"/>
+                <a:ea typeface="Times New Roman" panose="02020603050405020304" pitchFamily="18" charset="0"/>
+                <a:cs typeface="Arial" panose="020B0604020202020204" pitchFamily="34" charset="0"/>
+              </a:rPr>
+              <a:t>die Vorhersage fast gleich bleibt</a:t>
+            </a:r>
+            <a:r>
+              <a:rPr lang="de-DE" sz="1800" kern="0" dirty="0">
+                <a:effectLst/>
+                <a:latin typeface="Times New Roman" panose="02020603050405020304" pitchFamily="18" charset="0"/>
+                <a:ea typeface="Times New Roman" panose="02020603050405020304" pitchFamily="18" charset="0"/>
+                <a:cs typeface="Arial" panose="020B0604020202020204" pitchFamily="34" charset="0"/>
+              </a:rPr>
+              <a:t>, ist FMA nicht notwendig.</a:t>
+            </a:r>
+            <a:endParaRPr lang="de-DE" sz="1800" kern="100" dirty="0">
+              <a:effectLst/>
+              <a:latin typeface="Calibri" panose="020F0502020204030204" pitchFamily="34" charset="0"/>
+              <a:ea typeface="Calibri" panose="020F0502020204030204" pitchFamily="34" charset="0"/>
+              <a:cs typeface="Arial" panose="020B0604020202020204" pitchFamily="34" charset="0"/>
+            </a:endParaRPr>
+          </a:p>
+          <a:p>
+            <a:pPr marL="342900" lvl="0" indent="-342900">
+              <a:lnSpc>
+                <a:spcPct val="115000"/>
+              </a:lnSpc>
+              <a:spcAft>
+                <a:spcPts val="800"/>
+              </a:spcAft>
+              <a:buSzPts val="1000"/>
+              <a:buFont typeface="Symbol" panose="05050102010706020507" pitchFamily="18" charset="2"/>
+              <a:buChar char=""/>
+              <a:tabLst>
+                <a:tab pos="457200" algn="l"/>
+              </a:tabLst>
+            </a:pPr>
+            <a:r>
+              <a:rPr lang="de-DE" sz="1800" b="1" kern="0" dirty="0">
+                <a:effectLst/>
+                <a:latin typeface="Times New Roman" panose="02020603050405020304" pitchFamily="18" charset="0"/>
+                <a:ea typeface="Times New Roman" panose="02020603050405020304" pitchFamily="18" charset="0"/>
+                <a:cs typeface="Arial" panose="020B0604020202020204" pitchFamily="34" charset="0"/>
+              </a:rPr>
+              <a:t>ANOVA-Modellvergleich</a:t>
+            </a:r>
+            <a:r>
+              <a:rPr lang="de-DE" sz="1800" kern="0" dirty="0">
+                <a:effectLst/>
+                <a:latin typeface="Times New Roman" panose="02020603050405020304" pitchFamily="18" charset="0"/>
+                <a:ea typeface="Times New Roman" panose="02020603050405020304" pitchFamily="18" charset="0"/>
+                <a:cs typeface="Arial" panose="020B0604020202020204" pitchFamily="34" charset="0"/>
+              </a:rPr>
+              <a:t> kann statistisch testen, ob Modell 1 signifikant besser ist als Modell 2.</a:t>
+            </a:r>
+            <a:endParaRPr lang="de-DE" sz="1800" kern="100" dirty="0">
+              <a:effectLst/>
+              <a:latin typeface="Calibri" panose="020F0502020204030204" pitchFamily="34" charset="0"/>
+              <a:ea typeface="Calibri" panose="020F0502020204030204" pitchFamily="34" charset="0"/>
+              <a:cs typeface="Arial" panose="020B0604020202020204" pitchFamily="34" charset="0"/>
+            </a:endParaRPr>
+          </a:p>
+          <a:p>
+            <a:pPr>
+              <a:lnSpc>
+                <a:spcPct val="115000"/>
+              </a:lnSpc>
+              <a:spcAft>
+                <a:spcPts val="800"/>
+              </a:spcAft>
+            </a:pPr>
+            <a:r>
+              <a:rPr lang="de-DE" sz="1800" b="1" kern="0" dirty="0">
+                <a:effectLst/>
+                <a:latin typeface="Times New Roman" panose="02020603050405020304" pitchFamily="18" charset="0"/>
+                <a:ea typeface="Times New Roman" panose="02020603050405020304" pitchFamily="18" charset="0"/>
+                <a:cs typeface="Arial" panose="020B0604020202020204" pitchFamily="34" charset="0"/>
+              </a:rPr>
+              <a:t>B) Gruppenklassifikation: Kann NIHSS/BI die gleichen </a:t>
+            </a:r>
+            <a:r>
+              <a:rPr lang="de-DE" sz="1800" b="1" kern="0" dirty="0" err="1">
+                <a:effectLst/>
+                <a:latin typeface="Times New Roman" panose="02020603050405020304" pitchFamily="18" charset="0"/>
+                <a:ea typeface="Times New Roman" panose="02020603050405020304" pitchFamily="18" charset="0"/>
+                <a:cs typeface="Arial" panose="020B0604020202020204" pitchFamily="34" charset="0"/>
+              </a:rPr>
+              <a:t>Erholer</a:t>
+            </a:r>
+            <a:r>
+              <a:rPr lang="de-DE" sz="1800" b="1" kern="0" dirty="0">
+                <a:effectLst/>
+                <a:latin typeface="Times New Roman" panose="02020603050405020304" pitchFamily="18" charset="0"/>
+                <a:ea typeface="Times New Roman" panose="02020603050405020304" pitchFamily="18" charset="0"/>
+                <a:cs typeface="Arial" panose="020B0604020202020204" pitchFamily="34" charset="0"/>
+              </a:rPr>
+              <a:t>-Gruppen identifizieren?</a:t>
+            </a:r>
+            <a:endParaRPr lang="de-DE" sz="1800" kern="100" dirty="0">
+              <a:effectLst/>
+              <a:latin typeface="Calibri" panose="020F0502020204030204" pitchFamily="34" charset="0"/>
+              <a:ea typeface="Calibri" panose="020F0502020204030204" pitchFamily="34" charset="0"/>
+              <a:cs typeface="Arial" panose="020B0604020202020204" pitchFamily="34" charset="0"/>
+            </a:endParaRPr>
+          </a:p>
+          <a:p>
+            <a:pPr>
+              <a:lnSpc>
+                <a:spcPct val="115000"/>
+              </a:lnSpc>
+              <a:spcAft>
+                <a:spcPts val="800"/>
+              </a:spcAft>
+            </a:pPr>
+            <a:r>
+              <a:rPr lang="de-DE" sz="1800" kern="0" dirty="0">
+                <a:effectLst/>
+                <a:latin typeface="Times New Roman" panose="02020603050405020304" pitchFamily="18" charset="0"/>
+                <a:ea typeface="Times New Roman" panose="02020603050405020304" pitchFamily="18" charset="0"/>
+                <a:cs typeface="Arial" panose="020B0604020202020204" pitchFamily="34" charset="0"/>
+              </a:rPr>
+              <a:t>Falls FMA zur Bildung von </a:t>
+            </a:r>
+            <a:r>
+              <a:rPr lang="de-DE" sz="1800" b="1" kern="0" dirty="0" err="1">
+                <a:effectLst/>
+                <a:latin typeface="Times New Roman" panose="02020603050405020304" pitchFamily="18" charset="0"/>
+                <a:ea typeface="Times New Roman" panose="02020603050405020304" pitchFamily="18" charset="0"/>
+                <a:cs typeface="Arial" panose="020B0604020202020204" pitchFamily="34" charset="0"/>
+              </a:rPr>
+              <a:t>Erholer</a:t>
+            </a:r>
+            <a:r>
+              <a:rPr lang="de-DE" sz="1800" b="1" kern="0" dirty="0">
+                <a:effectLst/>
+                <a:latin typeface="Times New Roman" panose="02020603050405020304" pitchFamily="18" charset="0"/>
+                <a:ea typeface="Times New Roman" panose="02020603050405020304" pitchFamily="18" charset="0"/>
+                <a:cs typeface="Arial" panose="020B0604020202020204" pitchFamily="34" charset="0"/>
+              </a:rPr>
+              <a:t>-Gruppen</a:t>
+            </a:r>
+            <a:r>
+              <a:rPr lang="de-DE" sz="1800" kern="0" dirty="0">
+                <a:effectLst/>
+                <a:latin typeface="Times New Roman" panose="02020603050405020304" pitchFamily="18" charset="0"/>
+                <a:ea typeface="Times New Roman" panose="02020603050405020304" pitchFamily="18" charset="0"/>
+                <a:cs typeface="Arial" panose="020B0604020202020204" pitchFamily="34" charset="0"/>
+              </a:rPr>
+              <a:t> genutzt wurde, prüfe:</a:t>
+            </a:r>
+            <a:endParaRPr lang="de-DE" sz="1800" kern="100" dirty="0">
+              <a:effectLst/>
+              <a:latin typeface="Calibri" panose="020F0502020204030204" pitchFamily="34" charset="0"/>
+              <a:ea typeface="Calibri" panose="020F0502020204030204" pitchFamily="34" charset="0"/>
+              <a:cs typeface="Arial" panose="020B0604020202020204" pitchFamily="34" charset="0"/>
+            </a:endParaRPr>
+          </a:p>
+          <a:p>
+            <a:pPr marL="342900" lvl="0" indent="-342900">
+              <a:lnSpc>
+                <a:spcPct val="115000"/>
+              </a:lnSpc>
+              <a:spcAft>
+                <a:spcPts val="800"/>
+              </a:spcAft>
+              <a:buSzPts val="1000"/>
+              <a:buFont typeface="Symbol" panose="05050102010706020507" pitchFamily="18" charset="2"/>
+              <a:buChar char=""/>
+              <a:tabLst>
+                <a:tab pos="457200" algn="l"/>
+              </a:tabLst>
+            </a:pPr>
+            <a:r>
+              <a:rPr lang="de-DE" sz="1800" b="1" kern="0" dirty="0">
+                <a:effectLst/>
+                <a:latin typeface="Times New Roman" panose="02020603050405020304" pitchFamily="18" charset="0"/>
+                <a:ea typeface="Times New Roman" panose="02020603050405020304" pitchFamily="18" charset="0"/>
+                <a:cs typeface="Arial" panose="020B0604020202020204" pitchFamily="34" charset="0"/>
+              </a:rPr>
+              <a:t>Kann NIHSS und BI alleine die gleiche Gruppenzuordnung reproduzieren?</a:t>
+            </a:r>
+            <a:endParaRPr lang="de-DE" sz="1800" kern="100" dirty="0">
+              <a:effectLst/>
+              <a:latin typeface="Calibri" panose="020F0502020204030204" pitchFamily="34" charset="0"/>
+              <a:ea typeface="Calibri" panose="020F0502020204030204" pitchFamily="34" charset="0"/>
+              <a:cs typeface="Arial" panose="020B0604020202020204" pitchFamily="34" charset="0"/>
+            </a:endParaRPr>
+          </a:p>
+          <a:p>
+            <a:pPr marL="342900" lvl="0" indent="-342900">
+              <a:lnSpc>
+                <a:spcPct val="115000"/>
+              </a:lnSpc>
+              <a:spcAft>
+                <a:spcPts val="800"/>
+              </a:spcAft>
+              <a:buSzPts val="1000"/>
+              <a:buFont typeface="Symbol" panose="05050102010706020507" pitchFamily="18" charset="2"/>
+              <a:buChar char=""/>
+              <a:tabLst>
+                <a:tab pos="457200" algn="l"/>
+              </a:tabLst>
+            </a:pPr>
+            <a:r>
+              <a:rPr lang="de-DE" sz="1800" kern="0" dirty="0">
+                <a:effectLst/>
+                <a:latin typeface="Times New Roman" panose="02020603050405020304" pitchFamily="18" charset="0"/>
+                <a:ea typeface="Times New Roman" panose="02020603050405020304" pitchFamily="18" charset="0"/>
+                <a:cs typeface="Arial" panose="020B0604020202020204" pitchFamily="34" charset="0"/>
+              </a:rPr>
+              <a:t>Nutze dazu </a:t>
+            </a:r>
+            <a:r>
+              <a:rPr lang="de-DE" sz="1800" b="1" kern="0" dirty="0">
+                <a:effectLst/>
+                <a:latin typeface="Times New Roman" panose="02020603050405020304" pitchFamily="18" charset="0"/>
+                <a:ea typeface="Times New Roman" panose="02020603050405020304" pitchFamily="18" charset="0"/>
+                <a:cs typeface="Arial" panose="020B0604020202020204" pitchFamily="34" charset="0"/>
+              </a:rPr>
+              <a:t>logistische Regression oder maschinelles Lernen (z. B. Random Forest)</a:t>
+            </a:r>
+            <a:r>
+              <a:rPr lang="de-DE" sz="1800" kern="0" dirty="0">
+                <a:effectLst/>
+                <a:latin typeface="Times New Roman" panose="02020603050405020304" pitchFamily="18" charset="0"/>
+                <a:ea typeface="Times New Roman" panose="02020603050405020304" pitchFamily="18" charset="0"/>
+                <a:cs typeface="Arial" panose="020B0604020202020204" pitchFamily="34" charset="0"/>
+              </a:rPr>
+              <a:t>, um zu testen, ob sich Gruppen auch </a:t>
+            </a:r>
+            <a:r>
+              <a:rPr lang="de-DE" sz="1800" b="1" kern="0" dirty="0">
+                <a:effectLst/>
+                <a:latin typeface="Times New Roman" panose="02020603050405020304" pitchFamily="18" charset="0"/>
+                <a:ea typeface="Times New Roman" panose="02020603050405020304" pitchFamily="18" charset="0"/>
+                <a:cs typeface="Arial" panose="020B0604020202020204" pitchFamily="34" charset="0"/>
+              </a:rPr>
+              <a:t>ohne FMA</a:t>
+            </a:r>
+            <a:r>
+              <a:rPr lang="de-DE" sz="1800" kern="0" dirty="0">
+                <a:effectLst/>
+                <a:latin typeface="Times New Roman" panose="02020603050405020304" pitchFamily="18" charset="0"/>
+                <a:ea typeface="Times New Roman" panose="02020603050405020304" pitchFamily="18" charset="0"/>
+                <a:cs typeface="Arial" panose="020B0604020202020204" pitchFamily="34" charset="0"/>
+              </a:rPr>
+              <a:t> gut trennen lassen.</a:t>
+            </a:r>
+            <a:endParaRPr lang="de-DE" sz="1800" kern="100" dirty="0">
+              <a:effectLst/>
+              <a:latin typeface="Calibri" panose="020F0502020204030204" pitchFamily="34" charset="0"/>
+              <a:ea typeface="Calibri" panose="020F0502020204030204" pitchFamily="34" charset="0"/>
+              <a:cs typeface="Arial" panose="020B0604020202020204" pitchFamily="34" charset="0"/>
+            </a:endParaRPr>
+          </a:p>
+          <a:p>
+            <a:pPr>
+              <a:lnSpc>
+                <a:spcPct val="115000"/>
+              </a:lnSpc>
+              <a:spcAft>
+                <a:spcPts val="800"/>
+              </a:spcAft>
+            </a:pPr>
+            <a:r>
+              <a:rPr lang="de-DE" sz="1800" b="1" kern="0" dirty="0">
+                <a:effectLst/>
+                <a:latin typeface="Times New Roman" panose="02020603050405020304" pitchFamily="18" charset="0"/>
+                <a:ea typeface="Times New Roman" panose="02020603050405020304" pitchFamily="18" charset="0"/>
+                <a:cs typeface="Arial" panose="020B0604020202020204" pitchFamily="34" charset="0"/>
+              </a:rPr>
+              <a:t>Statistischer Test:</a:t>
+            </a:r>
+            <a:endParaRPr lang="de-DE" sz="1800" kern="100" dirty="0">
+              <a:effectLst/>
+              <a:latin typeface="Calibri" panose="020F0502020204030204" pitchFamily="34" charset="0"/>
+              <a:ea typeface="Calibri" panose="020F0502020204030204" pitchFamily="34" charset="0"/>
+              <a:cs typeface="Arial" panose="020B0604020202020204" pitchFamily="34" charset="0"/>
+            </a:endParaRPr>
+          </a:p>
+          <a:p>
+            <a:pPr marL="342900" lvl="0" indent="-342900">
+              <a:lnSpc>
+                <a:spcPct val="115000"/>
+              </a:lnSpc>
+              <a:spcAft>
+                <a:spcPts val="800"/>
+              </a:spcAft>
+              <a:buSzPts val="1000"/>
+              <a:buFont typeface="Symbol" panose="05050102010706020507" pitchFamily="18" charset="2"/>
+              <a:buChar char=""/>
+              <a:tabLst>
+                <a:tab pos="457200" algn="l"/>
+              </a:tabLst>
+            </a:pPr>
+            <a:r>
+              <a:rPr lang="de-DE" sz="1800" b="1" kern="0" dirty="0" err="1">
+                <a:effectLst/>
+                <a:latin typeface="Times New Roman" panose="02020603050405020304" pitchFamily="18" charset="0"/>
+                <a:ea typeface="Times New Roman" panose="02020603050405020304" pitchFamily="18" charset="0"/>
+                <a:cs typeface="Arial" panose="020B0604020202020204" pitchFamily="34" charset="0"/>
+              </a:rPr>
+              <a:t>Cohen’s</a:t>
+            </a:r>
+            <a:r>
+              <a:rPr lang="de-DE" sz="1800" b="1" kern="0" dirty="0">
+                <a:effectLst/>
+                <a:latin typeface="Times New Roman" panose="02020603050405020304" pitchFamily="18" charset="0"/>
+                <a:ea typeface="Times New Roman" panose="02020603050405020304" pitchFamily="18" charset="0"/>
+                <a:cs typeface="Arial" panose="020B0604020202020204" pitchFamily="34" charset="0"/>
+              </a:rPr>
+              <a:t> Kappa</a:t>
+            </a:r>
+            <a:r>
+              <a:rPr lang="de-DE" sz="1800" kern="0" dirty="0">
+                <a:effectLst/>
+                <a:latin typeface="Times New Roman" panose="02020603050405020304" pitchFamily="18" charset="0"/>
+                <a:ea typeface="Times New Roman" panose="02020603050405020304" pitchFamily="18" charset="0"/>
+                <a:cs typeface="Arial" panose="020B0604020202020204" pitchFamily="34" charset="0"/>
+              </a:rPr>
+              <a:t> oder </a:t>
+            </a:r>
+            <a:r>
+              <a:rPr lang="de-DE" sz="1800" b="1" kern="0" dirty="0">
+                <a:effectLst/>
+                <a:latin typeface="Times New Roman" panose="02020603050405020304" pitchFamily="18" charset="0"/>
+                <a:ea typeface="Times New Roman" panose="02020603050405020304" pitchFamily="18" charset="0"/>
+                <a:cs typeface="Arial" panose="020B0604020202020204" pitchFamily="34" charset="0"/>
+              </a:rPr>
+              <a:t>AUC (Area Under </a:t>
+            </a:r>
+            <a:r>
+              <a:rPr lang="de-DE" sz="1800" b="1" kern="0" dirty="0" err="1">
+                <a:effectLst/>
+                <a:latin typeface="Times New Roman" panose="02020603050405020304" pitchFamily="18" charset="0"/>
+                <a:ea typeface="Times New Roman" panose="02020603050405020304" pitchFamily="18" charset="0"/>
+                <a:cs typeface="Arial" panose="020B0604020202020204" pitchFamily="34" charset="0"/>
+              </a:rPr>
+              <a:t>Curve</a:t>
+            </a:r>
+            <a:r>
+              <a:rPr lang="de-DE" sz="1800" b="1" kern="0" dirty="0">
+                <a:effectLst/>
+                <a:latin typeface="Times New Roman" panose="02020603050405020304" pitchFamily="18" charset="0"/>
+                <a:ea typeface="Times New Roman" panose="02020603050405020304" pitchFamily="18" charset="0"/>
+                <a:cs typeface="Arial" panose="020B0604020202020204" pitchFamily="34" charset="0"/>
+              </a:rPr>
+              <a:t>)</a:t>
+            </a:r>
+            <a:r>
+              <a:rPr lang="de-DE" sz="1800" kern="0" dirty="0">
+                <a:effectLst/>
+                <a:latin typeface="Times New Roman" panose="02020603050405020304" pitchFamily="18" charset="0"/>
+                <a:ea typeface="Times New Roman" panose="02020603050405020304" pitchFamily="18" charset="0"/>
+                <a:cs typeface="Arial" panose="020B0604020202020204" pitchFamily="34" charset="0"/>
+              </a:rPr>
+              <a:t> zeigt, wie gut eine Gruppenzuordnung auf Basis von NIHSS/BI alleine funktioniert.</a:t>
+            </a:r>
+            <a:endParaRPr lang="de-DE" sz="1800" kern="100" dirty="0">
+              <a:effectLst/>
+              <a:latin typeface="Calibri" panose="020F0502020204030204" pitchFamily="34" charset="0"/>
+              <a:ea typeface="Calibri" panose="020F0502020204030204" pitchFamily="34" charset="0"/>
+              <a:cs typeface="Arial" panose="020B0604020202020204" pitchFamily="34" charset="0"/>
+            </a:endParaRPr>
+          </a:p>
+          <a:p>
+            <a:pPr marL="342900" lvl="0" indent="-342900">
+              <a:lnSpc>
+                <a:spcPct val="115000"/>
+              </a:lnSpc>
+              <a:spcAft>
+                <a:spcPts val="800"/>
+              </a:spcAft>
+              <a:buSzPts val="1000"/>
+              <a:buFont typeface="Symbol" panose="05050102010706020507" pitchFamily="18" charset="2"/>
+              <a:buChar char=""/>
+              <a:tabLst>
+                <a:tab pos="457200" algn="l"/>
+              </a:tabLst>
+            </a:pPr>
+            <a:r>
+              <a:rPr lang="de-DE" sz="1800" kern="0" dirty="0">
+                <a:effectLst/>
+                <a:latin typeface="Times New Roman" panose="02020603050405020304" pitchFamily="18" charset="0"/>
+                <a:ea typeface="Times New Roman" panose="02020603050405020304" pitchFamily="18" charset="0"/>
+                <a:cs typeface="Arial" panose="020B0604020202020204" pitchFamily="34" charset="0"/>
+              </a:rPr>
+              <a:t>Falls die Klassifikation ohne FMA schlecht ist → </a:t>
+            </a:r>
+            <a:r>
+              <a:rPr lang="de-DE" sz="1800" b="1" kern="0" dirty="0">
+                <a:effectLst/>
+                <a:latin typeface="Times New Roman" panose="02020603050405020304" pitchFamily="18" charset="0"/>
+                <a:ea typeface="Times New Roman" panose="02020603050405020304" pitchFamily="18" charset="0"/>
+                <a:cs typeface="Arial" panose="020B0604020202020204" pitchFamily="34" charset="0"/>
+              </a:rPr>
+              <a:t>FMA ist wichtig</a:t>
+            </a:r>
+            <a:r>
+              <a:rPr lang="de-DE" sz="1800" kern="0" dirty="0">
+                <a:effectLst/>
+                <a:latin typeface="Times New Roman" panose="02020603050405020304" pitchFamily="18" charset="0"/>
+                <a:ea typeface="Times New Roman" panose="02020603050405020304" pitchFamily="18" charset="0"/>
+                <a:cs typeface="Arial" panose="020B0604020202020204" pitchFamily="34" charset="0"/>
+              </a:rPr>
+              <a:t>.</a:t>
+            </a:r>
+            <a:endParaRPr lang="de-DE" sz="1800" kern="100" dirty="0">
+              <a:effectLst/>
+              <a:latin typeface="Calibri" panose="020F0502020204030204" pitchFamily="34" charset="0"/>
+              <a:ea typeface="Calibri" panose="020F0502020204030204" pitchFamily="34" charset="0"/>
+              <a:cs typeface="Arial" panose="020B0604020202020204" pitchFamily="34" charset="0"/>
+            </a:endParaRPr>
+          </a:p>
+          <a:p>
+            <a:pPr>
+              <a:lnSpc>
+                <a:spcPct val="115000"/>
+              </a:lnSpc>
+              <a:spcAft>
+                <a:spcPts val="800"/>
+              </a:spcAft>
+            </a:pPr>
+            <a:r>
+              <a:rPr lang="de-DE" sz="1800" b="1" kern="0" dirty="0">
+                <a:effectLst/>
+                <a:latin typeface="Times New Roman" panose="02020603050405020304" pitchFamily="18" charset="0"/>
+                <a:ea typeface="Times New Roman" panose="02020603050405020304" pitchFamily="18" charset="0"/>
+                <a:cs typeface="Arial" panose="020B0604020202020204" pitchFamily="34" charset="0"/>
+              </a:rPr>
+              <a:t>C) Mediation: Ist der Reha-Effekt durch FMA vermittelt?</a:t>
+            </a:r>
+            <a:endParaRPr lang="de-DE" sz="1800" kern="100" dirty="0">
+              <a:effectLst/>
+              <a:latin typeface="Calibri" panose="020F0502020204030204" pitchFamily="34" charset="0"/>
+              <a:ea typeface="Calibri" panose="020F0502020204030204" pitchFamily="34" charset="0"/>
+              <a:cs typeface="Arial" panose="020B0604020202020204" pitchFamily="34" charset="0"/>
+            </a:endParaRPr>
+          </a:p>
+          <a:p>
+            <a:pPr>
+              <a:lnSpc>
+                <a:spcPct val="115000"/>
+              </a:lnSpc>
+              <a:spcAft>
+                <a:spcPts val="800"/>
+              </a:spcAft>
+            </a:pPr>
+            <a:r>
+              <a:rPr lang="de-DE" sz="1800" kern="0" dirty="0">
+                <a:effectLst/>
+                <a:latin typeface="Times New Roman" panose="02020603050405020304" pitchFamily="18" charset="0"/>
+                <a:ea typeface="Times New Roman" panose="02020603050405020304" pitchFamily="18" charset="0"/>
+                <a:cs typeface="Arial" panose="020B0604020202020204" pitchFamily="34" charset="0"/>
+              </a:rPr>
+              <a:t>Falls NIHSS und BI mit Erholung korrelieren, aber nur, wenn FMA im Modell ist, könnte FMA ein </a:t>
+            </a:r>
+            <a:r>
+              <a:rPr lang="de-DE" sz="1800" b="1" kern="0" dirty="0">
+                <a:effectLst/>
+                <a:latin typeface="Times New Roman" panose="02020603050405020304" pitchFamily="18" charset="0"/>
+                <a:ea typeface="Times New Roman" panose="02020603050405020304" pitchFamily="18" charset="0"/>
+                <a:cs typeface="Arial" panose="020B0604020202020204" pitchFamily="34" charset="0"/>
+              </a:rPr>
+              <a:t>vermittelnder Faktor (Mediator)</a:t>
+            </a:r>
+            <a:r>
+              <a:rPr lang="de-DE" sz="1800" kern="0" dirty="0">
+                <a:effectLst/>
+                <a:latin typeface="Times New Roman" panose="02020603050405020304" pitchFamily="18" charset="0"/>
+                <a:ea typeface="Times New Roman" panose="02020603050405020304" pitchFamily="18" charset="0"/>
+                <a:cs typeface="Arial" panose="020B0604020202020204" pitchFamily="34" charset="0"/>
+              </a:rPr>
+              <a:t> sein. Ein </a:t>
+            </a:r>
+            <a:r>
+              <a:rPr lang="de-DE" sz="1800" b="1" kern="0" dirty="0">
+                <a:effectLst/>
+                <a:latin typeface="Times New Roman" panose="02020603050405020304" pitchFamily="18" charset="0"/>
+                <a:ea typeface="Times New Roman" panose="02020603050405020304" pitchFamily="18" charset="0"/>
+                <a:cs typeface="Arial" panose="020B0604020202020204" pitchFamily="34" charset="0"/>
+              </a:rPr>
+              <a:t>Mediationsmodell</a:t>
+            </a:r>
+            <a:r>
+              <a:rPr lang="de-DE" sz="1800" kern="0" dirty="0">
+                <a:effectLst/>
+                <a:latin typeface="Times New Roman" panose="02020603050405020304" pitchFamily="18" charset="0"/>
+                <a:ea typeface="Times New Roman" panose="02020603050405020304" pitchFamily="18" charset="0"/>
+                <a:cs typeface="Arial" panose="020B0604020202020204" pitchFamily="34" charset="0"/>
+              </a:rPr>
+              <a:t> könnte zeigen:</a:t>
+            </a:r>
+            <a:endParaRPr lang="de-DE" sz="1800" kern="100" dirty="0">
+              <a:effectLst/>
+              <a:latin typeface="Calibri" panose="020F0502020204030204" pitchFamily="34" charset="0"/>
+              <a:ea typeface="Calibri" panose="020F0502020204030204" pitchFamily="34" charset="0"/>
+              <a:cs typeface="Arial" panose="020B0604020202020204" pitchFamily="34" charset="0"/>
+            </a:endParaRPr>
+          </a:p>
+          <a:p>
+            <a:pPr>
+              <a:lnSpc>
+                <a:spcPct val="115000"/>
+              </a:lnSpc>
+              <a:spcAft>
+                <a:spcPts val="800"/>
+              </a:spcAft>
+            </a:pPr>
+            <a:r>
+              <a:rPr lang="de-DE" sz="1800" kern="0" dirty="0">
+                <a:effectLst/>
+                <a:latin typeface="Times New Roman" panose="02020603050405020304" pitchFamily="18" charset="0"/>
+                <a:ea typeface="Times New Roman" panose="02020603050405020304" pitchFamily="18" charset="0"/>
+                <a:cs typeface="Arial" panose="020B0604020202020204" pitchFamily="34" charset="0"/>
+              </a:rPr>
+              <a:t>Reha-Erfolg=NIHSS+BI+(FMA als Mediator)\</a:t>
+            </a:r>
+            <a:r>
+              <a:rPr lang="de-DE" sz="1800" kern="0" dirty="0" err="1">
+                <a:effectLst/>
+                <a:latin typeface="Times New Roman" panose="02020603050405020304" pitchFamily="18" charset="0"/>
+                <a:ea typeface="Times New Roman" panose="02020603050405020304" pitchFamily="18" charset="0"/>
+                <a:cs typeface="Arial" panose="020B0604020202020204" pitchFamily="34" charset="0"/>
+              </a:rPr>
+              <a:t>text</a:t>
+            </a:r>
+            <a:r>
+              <a:rPr lang="de-DE" sz="1800" kern="0" dirty="0">
+                <a:effectLst/>
+                <a:latin typeface="Times New Roman" panose="02020603050405020304" pitchFamily="18" charset="0"/>
+                <a:ea typeface="Times New Roman" panose="02020603050405020304" pitchFamily="18" charset="0"/>
+                <a:cs typeface="Arial" panose="020B0604020202020204" pitchFamily="34" charset="0"/>
+              </a:rPr>
+              <a:t>{Reha-Erfolg} = \</a:t>
+            </a:r>
+            <a:r>
+              <a:rPr lang="de-DE" sz="1800" kern="0" dirty="0" err="1">
+                <a:effectLst/>
+                <a:latin typeface="Times New Roman" panose="02020603050405020304" pitchFamily="18" charset="0"/>
+                <a:ea typeface="Times New Roman" panose="02020603050405020304" pitchFamily="18" charset="0"/>
+                <a:cs typeface="Arial" panose="020B0604020202020204" pitchFamily="34" charset="0"/>
+              </a:rPr>
+              <a:t>text</a:t>
+            </a:r>
+            <a:r>
+              <a:rPr lang="de-DE" sz="1800" kern="0" dirty="0">
+                <a:effectLst/>
+                <a:latin typeface="Times New Roman" panose="02020603050405020304" pitchFamily="18" charset="0"/>
+                <a:ea typeface="Times New Roman" panose="02020603050405020304" pitchFamily="18" charset="0"/>
+                <a:cs typeface="Arial" panose="020B0604020202020204" pitchFamily="34" charset="0"/>
+              </a:rPr>
+              <a:t>{NIHSS} + \</a:t>
+            </a:r>
+            <a:r>
+              <a:rPr lang="de-DE" sz="1800" kern="0" dirty="0" err="1">
+                <a:effectLst/>
+                <a:latin typeface="Times New Roman" panose="02020603050405020304" pitchFamily="18" charset="0"/>
+                <a:ea typeface="Times New Roman" panose="02020603050405020304" pitchFamily="18" charset="0"/>
+                <a:cs typeface="Arial" panose="020B0604020202020204" pitchFamily="34" charset="0"/>
+              </a:rPr>
+              <a:t>text</a:t>
+            </a:r>
+            <a:r>
+              <a:rPr lang="de-DE" sz="1800" kern="0" dirty="0">
+                <a:effectLst/>
+                <a:latin typeface="Times New Roman" panose="02020603050405020304" pitchFamily="18" charset="0"/>
+                <a:ea typeface="Times New Roman" panose="02020603050405020304" pitchFamily="18" charset="0"/>
+                <a:cs typeface="Arial" panose="020B0604020202020204" pitchFamily="34" charset="0"/>
+              </a:rPr>
+              <a:t>{BI} + (\</a:t>
+            </a:r>
+            <a:r>
+              <a:rPr lang="de-DE" sz="1800" kern="0" dirty="0" err="1">
+                <a:effectLst/>
+                <a:latin typeface="Times New Roman" panose="02020603050405020304" pitchFamily="18" charset="0"/>
+                <a:ea typeface="Times New Roman" panose="02020603050405020304" pitchFamily="18" charset="0"/>
+                <a:cs typeface="Arial" panose="020B0604020202020204" pitchFamily="34" charset="0"/>
+              </a:rPr>
+              <a:t>text</a:t>
+            </a:r>
+            <a:r>
+              <a:rPr lang="de-DE" sz="1800" kern="0" dirty="0">
+                <a:effectLst/>
+                <a:latin typeface="Times New Roman" panose="02020603050405020304" pitchFamily="18" charset="0"/>
+                <a:ea typeface="Times New Roman" panose="02020603050405020304" pitchFamily="18" charset="0"/>
+                <a:cs typeface="Arial" panose="020B0604020202020204" pitchFamily="34" charset="0"/>
+              </a:rPr>
+              <a:t>{FMA als Mediator})Reha-Erfolg=NIHSS+BI+(FMA als Mediator) </a:t>
+            </a:r>
+            <a:endParaRPr lang="de-DE" sz="1800" kern="100" dirty="0">
+              <a:effectLst/>
+              <a:latin typeface="Calibri" panose="020F0502020204030204" pitchFamily="34" charset="0"/>
+              <a:ea typeface="Calibri" panose="020F0502020204030204" pitchFamily="34" charset="0"/>
+              <a:cs typeface="Arial" panose="020B0604020202020204" pitchFamily="34" charset="0"/>
+            </a:endParaRPr>
+          </a:p>
+          <a:p>
+            <a:pPr>
+              <a:lnSpc>
+                <a:spcPct val="115000"/>
+              </a:lnSpc>
+              <a:spcAft>
+                <a:spcPts val="800"/>
+              </a:spcAft>
+            </a:pPr>
+            <a:r>
+              <a:rPr lang="de-DE" sz="1800" kern="0" dirty="0">
+                <a:effectLst/>
+                <a:latin typeface="Times New Roman" panose="02020603050405020304" pitchFamily="18" charset="0"/>
+                <a:ea typeface="Times New Roman" panose="02020603050405020304" pitchFamily="18" charset="0"/>
+                <a:cs typeface="Arial" panose="020B0604020202020204" pitchFamily="34" charset="0"/>
+              </a:rPr>
+              <a:t>Falls FMA einen starken </a:t>
+            </a:r>
+            <a:r>
+              <a:rPr lang="de-DE" sz="1800" b="1" kern="0" dirty="0">
+                <a:effectLst/>
+                <a:latin typeface="Times New Roman" panose="02020603050405020304" pitchFamily="18" charset="0"/>
+                <a:ea typeface="Times New Roman" panose="02020603050405020304" pitchFamily="18" charset="0"/>
+                <a:cs typeface="Arial" panose="020B0604020202020204" pitchFamily="34" charset="0"/>
+              </a:rPr>
+              <a:t>indirekten Effekt</a:t>
+            </a:r>
+            <a:r>
+              <a:rPr lang="de-DE" sz="1800" kern="0" dirty="0">
+                <a:effectLst/>
+                <a:latin typeface="Times New Roman" panose="02020603050405020304" pitchFamily="18" charset="0"/>
+                <a:ea typeface="Times New Roman" panose="02020603050405020304" pitchFamily="18" charset="0"/>
+                <a:cs typeface="Arial" panose="020B0604020202020204" pitchFamily="34" charset="0"/>
+              </a:rPr>
+              <a:t> hat, zeigt das, dass es </a:t>
+            </a:r>
+            <a:r>
+              <a:rPr lang="de-DE" sz="1800" b="1" kern="0" dirty="0">
+                <a:effectLst/>
+                <a:latin typeface="Times New Roman" panose="02020603050405020304" pitchFamily="18" charset="0"/>
+                <a:ea typeface="Times New Roman" panose="02020603050405020304" pitchFamily="18" charset="0"/>
+                <a:cs typeface="Arial" panose="020B0604020202020204" pitchFamily="34" charset="0"/>
+              </a:rPr>
+              <a:t>einen wichtigen Mechanismus erfasst, den NIHSS/BI alleine nicht abbilden</a:t>
+            </a:r>
+            <a:r>
+              <a:rPr lang="de-DE" sz="1800" kern="0" dirty="0">
+                <a:effectLst/>
+                <a:latin typeface="Times New Roman" panose="02020603050405020304" pitchFamily="18" charset="0"/>
+                <a:ea typeface="Times New Roman" panose="02020603050405020304" pitchFamily="18" charset="0"/>
+                <a:cs typeface="Arial" panose="020B0604020202020204" pitchFamily="34" charset="0"/>
+              </a:rPr>
+              <a:t>.</a:t>
+            </a:r>
+            <a:endParaRPr lang="de-DE" sz="1800" kern="100" dirty="0">
+              <a:effectLst/>
+              <a:latin typeface="Calibri" panose="020F0502020204030204" pitchFamily="34" charset="0"/>
+              <a:ea typeface="Calibri" panose="020F0502020204030204" pitchFamily="34" charset="0"/>
+              <a:cs typeface="Arial" panose="020B0604020202020204" pitchFamily="34" charset="0"/>
+            </a:endParaRPr>
+          </a:p>
+          <a:p>
+            <a:pPr>
+              <a:lnSpc>
+                <a:spcPct val="115000"/>
+              </a:lnSpc>
+              <a:spcAft>
+                <a:spcPts val="800"/>
+              </a:spcAft>
+            </a:pPr>
+            <a:r>
+              <a:rPr lang="de-DE" sz="1800" b="1" kern="0" dirty="0">
+                <a:effectLst/>
+                <a:latin typeface="Times New Roman" panose="02020603050405020304" pitchFamily="18" charset="0"/>
+                <a:ea typeface="Times New Roman" panose="02020603050405020304" pitchFamily="18" charset="0"/>
+                <a:cs typeface="Arial" panose="020B0604020202020204" pitchFamily="34" charset="0"/>
+              </a:rPr>
+              <a:t>3. Fazit</a:t>
+            </a:r>
+            <a:endParaRPr lang="de-DE" sz="1800" kern="100" dirty="0">
+              <a:effectLst/>
+              <a:latin typeface="Calibri" panose="020F0502020204030204" pitchFamily="34" charset="0"/>
+              <a:ea typeface="Calibri" panose="020F0502020204030204" pitchFamily="34" charset="0"/>
+              <a:cs typeface="Arial" panose="020B0604020202020204" pitchFamily="34" charset="0"/>
+            </a:endParaRPr>
+          </a:p>
+          <a:p>
+            <a:pPr>
+              <a:lnSpc>
+                <a:spcPct val="115000"/>
+              </a:lnSpc>
+              <a:spcAft>
+                <a:spcPts val="800"/>
+              </a:spcAft>
+            </a:pPr>
+            <a:r>
+              <a:rPr lang="de-DE" sz="1800" kern="0" dirty="0">
+                <a:effectLst/>
+                <a:latin typeface="Apple Color Emoji"/>
+                <a:ea typeface="Times New Roman" panose="02020603050405020304" pitchFamily="18" charset="0"/>
+                <a:cs typeface="Apple Color Emoji"/>
+              </a:rPr>
+              <a:t>📌</a:t>
+            </a:r>
+            <a:r>
+              <a:rPr lang="de-DE" sz="1800" kern="0" dirty="0">
+                <a:effectLst/>
+                <a:latin typeface="Times New Roman" panose="02020603050405020304" pitchFamily="18" charset="0"/>
+                <a:ea typeface="Times New Roman" panose="02020603050405020304" pitchFamily="18" charset="0"/>
+                <a:cs typeface="Arial" panose="020B0604020202020204" pitchFamily="34" charset="0"/>
+              </a:rPr>
+              <a:t> </a:t>
+            </a:r>
+            <a:r>
+              <a:rPr lang="de-DE" sz="1800" b="1" kern="0" dirty="0">
+                <a:effectLst/>
+                <a:latin typeface="Times New Roman" panose="02020603050405020304" pitchFamily="18" charset="0"/>
+                <a:ea typeface="Times New Roman" panose="02020603050405020304" pitchFamily="18" charset="0"/>
+                <a:cs typeface="Arial" panose="020B0604020202020204" pitchFamily="34" charset="0"/>
+              </a:rPr>
+              <a:t>Falls NIHSS/BI das gleiche erklären können → FMA nicht notwendig.</a:t>
+            </a:r>
+            <a:br>
+              <a:rPr lang="de-DE" sz="1800" kern="0" dirty="0">
+                <a:effectLst/>
+                <a:latin typeface="Times New Roman" panose="02020603050405020304" pitchFamily="18" charset="0"/>
+                <a:ea typeface="Times New Roman" panose="02020603050405020304" pitchFamily="18" charset="0"/>
+                <a:cs typeface="Arial" panose="020B0604020202020204" pitchFamily="34" charset="0"/>
+              </a:rPr>
+            </a:br>
+            <a:r>
+              <a:rPr lang="de-DE" sz="1800" kern="0" dirty="0">
+                <a:effectLst/>
+                <a:latin typeface="Apple Color Emoji"/>
+                <a:ea typeface="Times New Roman" panose="02020603050405020304" pitchFamily="18" charset="0"/>
+                <a:cs typeface="Apple Color Emoji"/>
+              </a:rPr>
+              <a:t>📌</a:t>
+            </a:r>
+            <a:r>
+              <a:rPr lang="de-DE" sz="1800" kern="0" dirty="0">
+                <a:effectLst/>
+                <a:latin typeface="Times New Roman" panose="02020603050405020304" pitchFamily="18" charset="0"/>
+                <a:ea typeface="Times New Roman" panose="02020603050405020304" pitchFamily="18" charset="0"/>
+                <a:cs typeface="Arial" panose="020B0604020202020204" pitchFamily="34" charset="0"/>
+              </a:rPr>
+              <a:t> </a:t>
+            </a:r>
+            <a:r>
+              <a:rPr lang="de-DE" sz="1800" b="1" kern="0" dirty="0">
+                <a:effectLst/>
+                <a:latin typeface="Times New Roman" panose="02020603050405020304" pitchFamily="18" charset="0"/>
+                <a:ea typeface="Times New Roman" panose="02020603050405020304" pitchFamily="18" charset="0"/>
+                <a:cs typeface="Arial" panose="020B0604020202020204" pitchFamily="34" charset="0"/>
+              </a:rPr>
+              <a:t>Falls Modelle ohne FMA schlechtere Vorhersagen liefern → FMA ist einzigartig.</a:t>
+            </a:r>
+            <a:br>
+              <a:rPr lang="de-DE" sz="1800" kern="0" dirty="0">
+                <a:effectLst/>
+                <a:latin typeface="Times New Roman" panose="02020603050405020304" pitchFamily="18" charset="0"/>
+                <a:ea typeface="Times New Roman" panose="02020603050405020304" pitchFamily="18" charset="0"/>
+                <a:cs typeface="Arial" panose="020B0604020202020204" pitchFamily="34" charset="0"/>
+              </a:rPr>
+            </a:br>
+            <a:r>
+              <a:rPr lang="de-DE" sz="1800" kern="0" dirty="0">
+                <a:effectLst/>
+                <a:latin typeface="Apple Color Emoji"/>
+                <a:ea typeface="Times New Roman" panose="02020603050405020304" pitchFamily="18" charset="0"/>
+                <a:cs typeface="Apple Color Emoji"/>
+              </a:rPr>
+              <a:t>📌</a:t>
+            </a:r>
+            <a:r>
+              <a:rPr lang="de-DE" sz="1800" kern="0" dirty="0">
+                <a:effectLst/>
+                <a:latin typeface="Times New Roman" panose="02020603050405020304" pitchFamily="18" charset="0"/>
+                <a:ea typeface="Times New Roman" panose="02020603050405020304" pitchFamily="18" charset="0"/>
+                <a:cs typeface="Arial" panose="020B0604020202020204" pitchFamily="34" charset="0"/>
+              </a:rPr>
+              <a:t> </a:t>
+            </a:r>
+            <a:r>
+              <a:rPr lang="de-DE" sz="1800" b="1" kern="0" dirty="0">
+                <a:effectLst/>
+                <a:latin typeface="Times New Roman" panose="02020603050405020304" pitchFamily="18" charset="0"/>
+                <a:ea typeface="Times New Roman" panose="02020603050405020304" pitchFamily="18" charset="0"/>
+                <a:cs typeface="Arial" panose="020B0604020202020204" pitchFamily="34" charset="0"/>
+              </a:rPr>
+              <a:t>Falls </a:t>
+            </a:r>
+            <a:r>
+              <a:rPr lang="de-DE" sz="1800" b="1" kern="0" dirty="0" err="1">
+                <a:effectLst/>
+                <a:latin typeface="Times New Roman" panose="02020603050405020304" pitchFamily="18" charset="0"/>
+                <a:ea typeface="Times New Roman" panose="02020603050405020304" pitchFamily="18" charset="0"/>
+                <a:cs typeface="Arial" panose="020B0604020202020204" pitchFamily="34" charset="0"/>
+              </a:rPr>
+              <a:t>Erholer</a:t>
+            </a:r>
+            <a:r>
+              <a:rPr lang="de-DE" sz="1800" b="1" kern="0" dirty="0">
+                <a:effectLst/>
+                <a:latin typeface="Times New Roman" panose="02020603050405020304" pitchFamily="18" charset="0"/>
+                <a:ea typeface="Times New Roman" panose="02020603050405020304" pitchFamily="18" charset="0"/>
+                <a:cs typeface="Arial" panose="020B0604020202020204" pitchFamily="34" charset="0"/>
+              </a:rPr>
+              <a:t>-Gruppen ohne FMA nicht gut klassifizierbar sind → FMA ist relevant.</a:t>
+            </a:r>
+            <a:br>
+              <a:rPr lang="de-DE" sz="1800" kern="0" dirty="0">
+                <a:effectLst/>
+                <a:latin typeface="Times New Roman" panose="02020603050405020304" pitchFamily="18" charset="0"/>
+                <a:ea typeface="Times New Roman" panose="02020603050405020304" pitchFamily="18" charset="0"/>
+                <a:cs typeface="Arial" panose="020B0604020202020204" pitchFamily="34" charset="0"/>
+              </a:rPr>
+            </a:br>
+            <a:r>
+              <a:rPr lang="de-DE" sz="1800" kern="0" dirty="0">
+                <a:effectLst/>
+                <a:latin typeface="Apple Color Emoji"/>
+                <a:ea typeface="Times New Roman" panose="02020603050405020304" pitchFamily="18" charset="0"/>
+                <a:cs typeface="Apple Color Emoji"/>
+              </a:rPr>
+              <a:t>📌</a:t>
+            </a:r>
+            <a:r>
+              <a:rPr lang="de-DE" sz="1800" kern="0" dirty="0">
+                <a:effectLst/>
+                <a:latin typeface="Times New Roman" panose="02020603050405020304" pitchFamily="18" charset="0"/>
+                <a:ea typeface="Times New Roman" panose="02020603050405020304" pitchFamily="18" charset="0"/>
+                <a:cs typeface="Arial" panose="020B0604020202020204" pitchFamily="34" charset="0"/>
+              </a:rPr>
+              <a:t> </a:t>
+            </a:r>
+            <a:r>
+              <a:rPr lang="de-DE" sz="1800" b="1" kern="0" dirty="0">
+                <a:effectLst/>
+                <a:latin typeface="Times New Roman" panose="02020603050405020304" pitchFamily="18" charset="0"/>
+                <a:ea typeface="Times New Roman" panose="02020603050405020304" pitchFamily="18" charset="0"/>
+                <a:cs typeface="Arial" panose="020B0604020202020204" pitchFamily="34" charset="0"/>
+              </a:rPr>
+              <a:t>Falls Mediation zeigt, dass FMA eine zentrale Rolle hat → FMA sollte genutzt werden</a:t>
+            </a:r>
+            <a:endParaRPr lang="de-DE" sz="1800" kern="100" dirty="0">
+              <a:effectLst/>
+              <a:latin typeface="Calibri" panose="020F0502020204030204" pitchFamily="34" charset="0"/>
+              <a:ea typeface="Calibri" panose="020F0502020204030204" pitchFamily="34" charset="0"/>
+              <a:cs typeface="Arial" panose="020B0604020202020204" pitchFamily="34" charset="0"/>
+            </a:endParaRPr>
+          </a:p>
+          <a:p>
+            <a:pPr>
+              <a:lnSpc>
+                <a:spcPct val="115000"/>
+              </a:lnSpc>
+              <a:spcAft>
+                <a:spcPts val="800"/>
+              </a:spcAft>
+            </a:pPr>
+            <a:r>
+              <a:rPr lang="de-DE" sz="1800" kern="100" dirty="0">
+                <a:effectLst/>
+                <a:latin typeface="Calibri" panose="020F0502020204030204" pitchFamily="34" charset="0"/>
+                <a:ea typeface="Calibri" panose="020F0502020204030204" pitchFamily="34" charset="0"/>
+                <a:cs typeface="Arial" panose="020B0604020202020204" pitchFamily="34" charset="0"/>
+              </a:rPr>
+              <a:t> </a:t>
+            </a:r>
+          </a:p>
+          <a:p>
             <a:endParaRPr lang="de-DE" dirty="0"/>
           </a:p>
         </p:txBody>
@@ -1049,7 +2916,7 @@
           <a:p>
             <a:fld id="{5C4FE0DD-1D2D-421C-AE33-F119FAA9DCC7}" type="datetimeFigureOut">
               <a:rPr lang="en-DE" smtClean="0"/>
-              <a:t>03/06/2025</a:t>
+              <a:t>03/10/2025</a:t>
             </a:fld>
             <a:endParaRPr lang="en-DE"/>
           </a:p>
@@ -1249,7 +3116,7 @@
           <a:p>
             <a:fld id="{5C4FE0DD-1D2D-421C-AE33-F119FAA9DCC7}" type="datetimeFigureOut">
               <a:rPr lang="en-DE" smtClean="0"/>
-              <a:t>03/06/2025</a:t>
+              <a:t>03/10/2025</a:t>
             </a:fld>
             <a:endParaRPr lang="en-DE"/>
           </a:p>
@@ -1459,7 +3326,7 @@
           <a:p>
             <a:fld id="{5C4FE0DD-1D2D-421C-AE33-F119FAA9DCC7}" type="datetimeFigureOut">
               <a:rPr lang="en-DE" smtClean="0"/>
-              <a:t>03/06/2025</a:t>
+              <a:t>03/10/2025</a:t>
             </a:fld>
             <a:endParaRPr lang="en-DE"/>
           </a:p>
@@ -1659,7 +3526,7 @@
           <a:p>
             <a:fld id="{5C4FE0DD-1D2D-421C-AE33-F119FAA9DCC7}" type="datetimeFigureOut">
               <a:rPr lang="en-DE" smtClean="0"/>
-              <a:t>03/06/2025</a:t>
+              <a:t>03/10/2025</a:t>
             </a:fld>
             <a:endParaRPr lang="en-DE"/>
           </a:p>
@@ -1935,7 +3802,7 @@
           <a:p>
             <a:fld id="{5C4FE0DD-1D2D-421C-AE33-F119FAA9DCC7}" type="datetimeFigureOut">
               <a:rPr lang="en-DE" smtClean="0"/>
-              <a:t>03/06/2025</a:t>
+              <a:t>03/10/2025</a:t>
             </a:fld>
             <a:endParaRPr lang="en-DE"/>
           </a:p>
@@ -2203,7 +4070,7 @@
           <a:p>
             <a:fld id="{5C4FE0DD-1D2D-421C-AE33-F119FAA9DCC7}" type="datetimeFigureOut">
               <a:rPr lang="en-DE" smtClean="0"/>
-              <a:t>03/06/2025</a:t>
+              <a:t>03/10/2025</a:t>
             </a:fld>
             <a:endParaRPr lang="en-DE"/>
           </a:p>
@@ -2618,7 +4485,7 @@
           <a:p>
             <a:fld id="{5C4FE0DD-1D2D-421C-AE33-F119FAA9DCC7}" type="datetimeFigureOut">
               <a:rPr lang="en-DE" smtClean="0"/>
-              <a:t>03/06/2025</a:t>
+              <a:t>03/10/2025</a:t>
             </a:fld>
             <a:endParaRPr lang="en-DE"/>
           </a:p>
@@ -2760,7 +4627,7 @@
           <a:p>
             <a:fld id="{5C4FE0DD-1D2D-421C-AE33-F119FAA9DCC7}" type="datetimeFigureOut">
               <a:rPr lang="en-DE" smtClean="0"/>
-              <a:t>03/06/2025</a:t>
+              <a:t>03/10/2025</a:t>
             </a:fld>
             <a:endParaRPr lang="en-DE"/>
           </a:p>
@@ -2873,7 +4740,7 @@
           <a:p>
             <a:fld id="{5C4FE0DD-1D2D-421C-AE33-F119FAA9DCC7}" type="datetimeFigureOut">
               <a:rPr lang="en-DE" smtClean="0"/>
-              <a:t>03/06/2025</a:t>
+              <a:t>03/10/2025</a:t>
             </a:fld>
             <a:endParaRPr lang="en-DE"/>
           </a:p>
@@ -3186,7 +5053,7 @@
           <a:p>
             <a:fld id="{5C4FE0DD-1D2D-421C-AE33-F119FAA9DCC7}" type="datetimeFigureOut">
               <a:rPr lang="en-DE" smtClean="0"/>
-              <a:t>03/06/2025</a:t>
+              <a:t>03/10/2025</a:t>
             </a:fld>
             <a:endParaRPr lang="en-DE"/>
           </a:p>
@@ -3475,7 +5342,7 @@
           <a:p>
             <a:fld id="{5C4FE0DD-1D2D-421C-AE33-F119FAA9DCC7}" type="datetimeFigureOut">
               <a:rPr lang="en-DE" smtClean="0"/>
-              <a:t>03/06/2025</a:t>
+              <a:t>03/10/2025</a:t>
             </a:fld>
             <a:endParaRPr lang="en-DE"/>
           </a:p>
@@ -3718,7 +5585,7 @@
           <a:p>
             <a:fld id="{5C4FE0DD-1D2D-421C-AE33-F119FAA9DCC7}" type="datetimeFigureOut">
               <a:rPr lang="en-DE" smtClean="0"/>
-              <a:t>03/06/2025</a:t>
+              <a:t>03/10/2025</a:t>
             </a:fld>
             <a:endParaRPr lang="en-DE"/>
           </a:p>
@@ -5000,8 +6867,8 @@
         </p:blipFill>
         <p:spPr>
           <a:xfrm>
-            <a:off x="2836097" y="1059760"/>
-            <a:ext cx="1932660" cy="1932660"/>
+            <a:off x="2904659" y="1121853"/>
+            <a:ext cx="1720681" cy="1720681"/>
           </a:xfrm>
           <a:prstGeom prst="rect">
             <a:avLst/>
@@ -5095,7 +6962,7 @@
         </p:blipFill>
         <p:spPr>
           <a:xfrm>
-            <a:off x="7871012" y="183776"/>
+            <a:off x="7566662" y="170899"/>
             <a:ext cx="2001931" cy="3245421"/>
           </a:xfrm>
           <a:prstGeom prst="rect">
@@ -5131,7 +6998,7 @@
         </p:blipFill>
         <p:spPr>
           <a:xfrm>
-            <a:off x="10031069" y="183776"/>
+            <a:off x="9843260" y="59643"/>
             <a:ext cx="1975474" cy="3245422"/>
           </a:xfrm>
           <a:prstGeom prst="rect">
@@ -5153,7 +7020,7 @@
         </p:nvSpPr>
         <p:spPr>
           <a:xfrm>
-            <a:off x="8095813" y="3794719"/>
+            <a:off x="7831681" y="3441680"/>
             <a:ext cx="3870512" cy="2123658"/>
           </a:xfrm>
           <a:prstGeom prst="rect">
@@ -5168,7 +7035,7 @@
           <a:lstStyle/>
           <a:p>
             <a:r>
-              <a:rPr lang="en-GB" sz="1100" noProof="0"/>
+              <a:rPr lang="en-GB" sz="1100" noProof="0" dirty="0"/>
               <a:t>Recovery Type Percentages by </a:t>
             </a:r>
             <a:r>
@@ -5668,12 +7535,59 @@
           <a:p>
             <a:r>
               <a:rPr lang="en-GB" sz="1800" noProof="0" dirty="0"/>
-              <a:t>Good only</a:t>
+              <a:t>Bad only</a:t>
             </a:r>
             <a:endParaRPr lang="de-DE" dirty="0"/>
           </a:p>
         </p:txBody>
       </p:sp>
+      <p:pic>
+        <p:nvPicPr>
+          <p:cNvPr id="1026" name="Picture 2" descr="Fig. 2">
+            <a:extLst>
+              <a:ext uri="{FF2B5EF4-FFF2-40B4-BE49-F238E27FC236}">
+                <a16:creationId xmlns:a16="http://schemas.microsoft.com/office/drawing/2014/main" id="{493DCFD9-9EB3-371D-09F3-0BBC77C1A870}"/>
+              </a:ext>
+            </a:extLst>
+          </p:cNvPr>
+          <p:cNvPicPr>
+            <a:picLocks noChangeAspect="1" noChangeArrowheads="1"/>
+          </p:cNvPicPr>
+          <p:nvPr/>
+        </p:nvPicPr>
+        <p:blipFill>
+          <a:blip r:embed="rId9">
+            <a:extLst>
+              <a:ext uri="{28A0092B-C50C-407E-A947-70E740481C1C}">
+                <a14:useLocalDpi xmlns:a14="http://schemas.microsoft.com/office/drawing/2010/main" val="0"/>
+              </a:ext>
+            </a:extLst>
+          </a:blip>
+          <a:srcRect/>
+          <a:stretch>
+            <a:fillRect/>
+          </a:stretch>
+        </p:blipFill>
+        <p:spPr bwMode="auto">
+          <a:xfrm>
+            <a:off x="-639936" y="3156685"/>
+            <a:ext cx="6924675" cy="3552825"/>
+          </a:xfrm>
+          <a:prstGeom prst="rect">
+            <a:avLst/>
+          </a:prstGeom>
+          <a:noFill/>
+          <a:extLst>
+            <a:ext uri="{909E8E84-426E-40DD-AFC4-6F175D3DCCD1}">
+              <a14:hiddenFill xmlns:a14="http://schemas.microsoft.com/office/drawing/2010/main">
+                <a:solidFill>
+                  <a:srgbClr val="FFFFFF"/>
+                </a:solidFill>
+              </a14:hiddenFill>
+            </a:ext>
+          </a:extLst>
+        </p:spPr>
+      </p:pic>
     </p:spTree>
     <p:extLst>
       <p:ext uri="{BB962C8B-B14F-4D97-AF65-F5344CB8AC3E}">

</xml_diff>

<commit_message>
added figure 3 and corrected legend
</commit_message>
<xml_diff>
--- a/output/figures/PP_figure_creation.pptx
+++ b/output/figures/PP_figure_creation.pptx
@@ -5,14 +5,15 @@
     <p:sldMasterId id="2147483648" r:id="rId1"/>
   </p:sldMasterIdLst>
   <p:notesMasterIdLst>
-    <p:notesMasterId r:id="rId7"/>
+    <p:notesMasterId r:id="rId8"/>
   </p:notesMasterIdLst>
   <p:sldIdLst>
     <p:sldId id="295" r:id="rId2"/>
     <p:sldId id="294" r:id="rId3"/>
-    <p:sldId id="296" r:id="rId4"/>
-    <p:sldId id="291" r:id="rId5"/>
-    <p:sldId id="297" r:id="rId6"/>
+    <p:sldId id="298" r:id="rId4"/>
+    <p:sldId id="296" r:id="rId5"/>
+    <p:sldId id="291" r:id="rId6"/>
+    <p:sldId id="297" r:id="rId7"/>
   </p:sldIdLst>
   <p:sldSz cx="12192000" cy="6858000"/>
   <p:notesSz cx="7010400" cy="9236075"/>
@@ -201,7 +202,7 @@
           <a:p>
             <a:fld id="{3C1211B4-146C-4B04-87A4-D58028F6A092}" type="datetimeFigureOut">
               <a:rPr lang="en-DE" smtClean="0"/>
-              <a:t>04/11/2025</a:t>
+              <a:t>05/20/2025</a:t>
             </a:fld>
             <a:endParaRPr lang="en-DE"/>
           </a:p>
@@ -693,6 +694,114 @@
         <p:cNvPr id="1" name="">
           <a:extLst>
             <a:ext uri="{FF2B5EF4-FFF2-40B4-BE49-F238E27FC236}">
+              <a16:creationId xmlns:a16="http://schemas.microsoft.com/office/drawing/2014/main" id="{A5EAFC9C-3BC3-D6E3-4B30-60013B39D83B}"/>
+            </a:ext>
+          </a:extLst>
+        </p:cNvPr>
+        <p:cNvGrpSpPr/>
+        <p:nvPr/>
+      </p:nvGrpSpPr>
+      <p:grpSpPr>
+        <a:xfrm>
+          <a:off x="0" y="0"/>
+          <a:ext cx="0" cy="0"/>
+          <a:chOff x="0" y="0"/>
+          <a:chExt cx="0" cy="0"/>
+        </a:xfrm>
+      </p:grpSpPr>
+      <p:sp>
+        <p:nvSpPr>
+          <p:cNvPr id="2" name="Slide Image Placeholder 1">
+            <a:extLst>
+              <a:ext uri="{FF2B5EF4-FFF2-40B4-BE49-F238E27FC236}">
+                <a16:creationId xmlns:a16="http://schemas.microsoft.com/office/drawing/2014/main" id="{DA916345-1E0D-92AD-0FE6-70D9606AFD99}"/>
+              </a:ext>
+            </a:extLst>
+          </p:cNvPr>
+          <p:cNvSpPr>
+            <a:spLocks noGrp="1" noRot="1" noChangeAspect="1"/>
+          </p:cNvSpPr>
+          <p:nvPr>
+            <p:ph type="sldImg"/>
+          </p:nvPr>
+        </p:nvSpPr>
+        <p:spPr/>
+      </p:sp>
+      <p:sp>
+        <p:nvSpPr>
+          <p:cNvPr id="3" name="Notes Placeholder 2">
+            <a:extLst>
+              <a:ext uri="{FF2B5EF4-FFF2-40B4-BE49-F238E27FC236}">
+                <a16:creationId xmlns:a16="http://schemas.microsoft.com/office/drawing/2014/main" id="{FFBF03D0-153B-2296-2DA7-F3948995E666}"/>
+              </a:ext>
+            </a:extLst>
+          </p:cNvPr>
+          <p:cNvSpPr>
+            <a:spLocks noGrp="1"/>
+          </p:cNvSpPr>
+          <p:nvPr>
+            <p:ph type="body" idx="1"/>
+          </p:nvPr>
+        </p:nvSpPr>
+        <p:spPr/>
+        <p:txBody>
+          <a:bodyPr/>
+          <a:lstStyle/>
+          <a:p>
+            <a:endParaRPr lang="de-DE" dirty="0"/>
+          </a:p>
+        </p:txBody>
+      </p:sp>
+      <p:sp>
+        <p:nvSpPr>
+          <p:cNvPr id="4" name="Slide Number Placeholder 3">
+            <a:extLst>
+              <a:ext uri="{FF2B5EF4-FFF2-40B4-BE49-F238E27FC236}">
+                <a16:creationId xmlns:a16="http://schemas.microsoft.com/office/drawing/2014/main" id="{6F0A36D6-05A5-CE33-7F38-714F53CFC35B}"/>
+              </a:ext>
+            </a:extLst>
+          </p:cNvPr>
+          <p:cNvSpPr>
+            <a:spLocks noGrp="1"/>
+          </p:cNvSpPr>
+          <p:nvPr>
+            <p:ph type="sldNum" sz="quarter" idx="5"/>
+          </p:nvPr>
+        </p:nvSpPr>
+        <p:spPr/>
+        <p:txBody>
+          <a:bodyPr/>
+          <a:lstStyle/>
+          <a:p>
+            <a:fld id="{784CA93B-B8DE-44F2-B679-09BA34A8793C}" type="slidenum">
+              <a:rPr lang="en-DE" smtClean="0"/>
+              <a:t>3</a:t>
+            </a:fld>
+            <a:endParaRPr lang="en-DE"/>
+          </a:p>
+        </p:txBody>
+      </p:sp>
+    </p:spTree>
+    <p:extLst>
+      <p:ext uri="{BB962C8B-B14F-4D97-AF65-F5344CB8AC3E}">
+        <p14:creationId xmlns:p14="http://schemas.microsoft.com/office/powerpoint/2010/main" val="4245832842"/>
+      </p:ext>
+    </p:extLst>
+  </p:cSld>
+  <p:clrMapOvr>
+    <a:masterClrMapping/>
+  </p:clrMapOvr>
+</p:notes>
+</file>
+
+<file path=ppt/notesSlides/notesSlide4.xml><?xml version="1.0" encoding="utf-8"?>
+<p:notes xmlns:a="http://schemas.openxmlformats.org/drawingml/2006/main" xmlns:r="http://schemas.openxmlformats.org/officeDocument/2006/relationships" xmlns:p="http://schemas.openxmlformats.org/presentationml/2006/main">
+  <p:cSld>
+    <p:spTree>
+      <p:nvGrpSpPr>
+        <p:cNvPr id="1" name="">
+          <a:extLst>
+            <a:ext uri="{FF2B5EF4-FFF2-40B4-BE49-F238E27FC236}">
               <a16:creationId xmlns:a16="http://schemas.microsoft.com/office/drawing/2014/main" id="{6324C05F-47BD-48CB-3A71-6307F9CB7688}"/>
             </a:ext>
           </a:extLst>
@@ -774,7 +883,7 @@
           <a:p>
             <a:fld id="{784CA93B-B8DE-44F2-B679-09BA34A8793C}" type="slidenum">
               <a:rPr lang="en-DE" smtClean="0"/>
-              <a:t>3</a:t>
+              <a:t>4</a:t>
             </a:fld>
             <a:endParaRPr lang="en-DE"/>
           </a:p>
@@ -793,7 +902,7 @@
 </p:notes>
 </file>
 
-<file path=ppt/notesSlides/notesSlide4.xml><?xml version="1.0" encoding="utf-8"?>
+<file path=ppt/notesSlides/notesSlide5.xml><?xml version="1.0" encoding="utf-8"?>
 <p:notes xmlns:a="http://schemas.openxmlformats.org/drawingml/2006/main" xmlns:r="http://schemas.openxmlformats.org/officeDocument/2006/relationships" xmlns:p="http://schemas.openxmlformats.org/presentationml/2006/main">
   <p:cSld>
     <p:spTree>
@@ -882,7 +991,7 @@
           <a:p>
             <a:fld id="{784CA93B-B8DE-44F2-B679-09BA34A8793C}" type="slidenum">
               <a:rPr lang="en-DE" smtClean="0"/>
-              <a:t>4</a:t>
+              <a:t>5</a:t>
             </a:fld>
             <a:endParaRPr lang="en-DE"/>
           </a:p>
@@ -901,7 +1010,7 @@
 </p:notes>
 </file>
 
-<file path=ppt/notesSlides/notesSlide5.xml><?xml version="1.0" encoding="utf-8"?>
+<file path=ppt/notesSlides/notesSlide6.xml><?xml version="1.0" encoding="utf-8"?>
 <p:notes xmlns:a="http://schemas.openxmlformats.org/drawingml/2006/main" xmlns:r="http://schemas.openxmlformats.org/officeDocument/2006/relationships" xmlns:p="http://schemas.openxmlformats.org/presentationml/2006/main">
   <p:cSld>
     <p:spTree>
@@ -990,7 +1099,7 @@
           <a:p>
             <a:fld id="{784CA93B-B8DE-44F2-B679-09BA34A8793C}" type="slidenum">
               <a:rPr lang="en-DE" smtClean="0"/>
-              <a:t>5</a:t>
+              <a:t>6</a:t>
             </a:fld>
             <a:endParaRPr lang="en-DE"/>
           </a:p>
@@ -1158,7 +1267,7 @@
           <a:p>
             <a:fld id="{5C4FE0DD-1D2D-421C-AE33-F119FAA9DCC7}" type="datetimeFigureOut">
               <a:rPr lang="en-DE" smtClean="0"/>
-              <a:t>04/11/2025</a:t>
+              <a:t>05/20/2025</a:t>
             </a:fld>
             <a:endParaRPr lang="en-DE"/>
           </a:p>
@@ -1358,7 +1467,7 @@
           <a:p>
             <a:fld id="{5C4FE0DD-1D2D-421C-AE33-F119FAA9DCC7}" type="datetimeFigureOut">
               <a:rPr lang="en-DE" smtClean="0"/>
-              <a:t>04/11/2025</a:t>
+              <a:t>05/20/2025</a:t>
             </a:fld>
             <a:endParaRPr lang="en-DE"/>
           </a:p>
@@ -1568,7 +1677,7 @@
           <a:p>
             <a:fld id="{5C4FE0DD-1D2D-421C-AE33-F119FAA9DCC7}" type="datetimeFigureOut">
               <a:rPr lang="en-DE" smtClean="0"/>
-              <a:t>04/11/2025</a:t>
+              <a:t>05/20/2025</a:t>
             </a:fld>
             <a:endParaRPr lang="en-DE"/>
           </a:p>
@@ -1768,7 +1877,7 @@
           <a:p>
             <a:fld id="{5C4FE0DD-1D2D-421C-AE33-F119FAA9DCC7}" type="datetimeFigureOut">
               <a:rPr lang="en-DE" smtClean="0"/>
-              <a:t>04/11/2025</a:t>
+              <a:t>05/20/2025</a:t>
             </a:fld>
             <a:endParaRPr lang="en-DE"/>
           </a:p>
@@ -2044,7 +2153,7 @@
           <a:p>
             <a:fld id="{5C4FE0DD-1D2D-421C-AE33-F119FAA9DCC7}" type="datetimeFigureOut">
               <a:rPr lang="en-DE" smtClean="0"/>
-              <a:t>04/11/2025</a:t>
+              <a:t>05/20/2025</a:t>
             </a:fld>
             <a:endParaRPr lang="en-DE"/>
           </a:p>
@@ -2312,7 +2421,7 @@
           <a:p>
             <a:fld id="{5C4FE0DD-1D2D-421C-AE33-F119FAA9DCC7}" type="datetimeFigureOut">
               <a:rPr lang="en-DE" smtClean="0"/>
-              <a:t>04/11/2025</a:t>
+              <a:t>05/20/2025</a:t>
             </a:fld>
             <a:endParaRPr lang="en-DE"/>
           </a:p>
@@ -2727,7 +2836,7 @@
           <a:p>
             <a:fld id="{5C4FE0DD-1D2D-421C-AE33-F119FAA9DCC7}" type="datetimeFigureOut">
               <a:rPr lang="en-DE" smtClean="0"/>
-              <a:t>04/11/2025</a:t>
+              <a:t>05/20/2025</a:t>
             </a:fld>
             <a:endParaRPr lang="en-DE"/>
           </a:p>
@@ -2869,7 +2978,7 @@
           <a:p>
             <a:fld id="{5C4FE0DD-1D2D-421C-AE33-F119FAA9DCC7}" type="datetimeFigureOut">
               <a:rPr lang="en-DE" smtClean="0"/>
-              <a:t>04/11/2025</a:t>
+              <a:t>05/20/2025</a:t>
             </a:fld>
             <a:endParaRPr lang="en-DE"/>
           </a:p>
@@ -2982,7 +3091,7 @@
           <a:p>
             <a:fld id="{5C4FE0DD-1D2D-421C-AE33-F119FAA9DCC7}" type="datetimeFigureOut">
               <a:rPr lang="en-DE" smtClean="0"/>
-              <a:t>04/11/2025</a:t>
+              <a:t>05/20/2025</a:t>
             </a:fld>
             <a:endParaRPr lang="en-DE"/>
           </a:p>
@@ -3295,7 +3404,7 @@
           <a:p>
             <a:fld id="{5C4FE0DD-1D2D-421C-AE33-F119FAA9DCC7}" type="datetimeFigureOut">
               <a:rPr lang="en-DE" smtClean="0"/>
-              <a:t>04/11/2025</a:t>
+              <a:t>05/20/2025</a:t>
             </a:fld>
             <a:endParaRPr lang="en-DE"/>
           </a:p>
@@ -3584,7 +3693,7 @@
           <a:p>
             <a:fld id="{5C4FE0DD-1D2D-421C-AE33-F119FAA9DCC7}" type="datetimeFigureOut">
               <a:rPr lang="en-DE" smtClean="0"/>
-              <a:t>04/11/2025</a:t>
+              <a:t>05/20/2025</a:t>
             </a:fld>
             <a:endParaRPr lang="en-DE"/>
           </a:p>
@@ -3827,7 +3936,7 @@
           <a:p>
             <a:fld id="{5C4FE0DD-1D2D-421C-AE33-F119FAA9DCC7}" type="datetimeFigureOut">
               <a:rPr lang="en-DE" smtClean="0"/>
-              <a:t>04/11/2025</a:t>
+              <a:t>05/20/2025</a:t>
             </a:fld>
             <a:endParaRPr lang="en-DE"/>
           </a:p>
@@ -8845,10 +8954,10 @@
       </p:sp>
       <p:grpSp>
         <p:nvGrpSpPr>
-          <p:cNvPr id="22" name="Group 21">
+          <p:cNvPr id="2" name="Group 1">
             <a:extLst>
               <a:ext uri="{FF2B5EF4-FFF2-40B4-BE49-F238E27FC236}">
-                <a16:creationId xmlns:a16="http://schemas.microsoft.com/office/drawing/2014/main" id="{1A97A4ED-E47F-5A3B-F25D-3B0E50D0F3B9}"/>
+                <a16:creationId xmlns:a16="http://schemas.microsoft.com/office/drawing/2014/main" id="{D21704DC-B2D3-A142-FF5D-49D375F2A87A}"/>
               </a:ext>
             </a:extLst>
           </p:cNvPr>
@@ -8915,521 +9024,500 @@
             </a:p>
           </p:txBody>
         </p:sp>
-        <p:grpSp>
-          <p:nvGrpSpPr>
-            <p:cNvPr id="16" name="Group 15">
+        <p:sp>
+          <p:nvSpPr>
+            <p:cNvPr id="114" name="TextBox 113">
               <a:extLst>
                 <a:ext uri="{FF2B5EF4-FFF2-40B4-BE49-F238E27FC236}">
-                  <a16:creationId xmlns:a16="http://schemas.microsoft.com/office/drawing/2014/main" id="{10D945D7-3684-46D5-BE6F-B94AB6EB63CB}"/>
+                  <a16:creationId xmlns:a16="http://schemas.microsoft.com/office/drawing/2014/main" id="{D0C5C569-489C-96CD-FE67-BFECCA024FBA}"/>
                 </a:ext>
               </a:extLst>
             </p:cNvPr>
-            <p:cNvGrpSpPr/>
+            <p:cNvSpPr txBox="1"/>
             <p:nvPr/>
-          </p:nvGrpSpPr>
-          <p:grpSpPr>
+          </p:nvSpPr>
+          <p:spPr>
             <a:xfrm>
-              <a:off x="93739" y="4507740"/>
-              <a:ext cx="4576671" cy="246221"/>
-              <a:chOff x="93739" y="3226090"/>
-              <a:chExt cx="4576671" cy="246221"/>
+              <a:off x="4638946" y="4507740"/>
+              <a:ext cx="196451" cy="246221"/>
             </a:xfrm>
-          </p:grpSpPr>
-          <p:sp>
-            <p:nvSpPr>
-              <p:cNvPr id="114" name="TextBox 113">
-                <a:extLst>
-                  <a:ext uri="{FF2B5EF4-FFF2-40B4-BE49-F238E27FC236}">
-                    <a16:creationId xmlns:a16="http://schemas.microsoft.com/office/drawing/2014/main" id="{D0C5C569-489C-96CD-FE67-BFECCA024FBA}"/>
-                  </a:ext>
-                </a:extLst>
-              </p:cNvPr>
-              <p:cNvSpPr txBox="1"/>
-              <p:nvPr/>
-            </p:nvSpPr>
-            <p:spPr>
-              <a:xfrm>
-                <a:off x="3479450" y="3226090"/>
-                <a:ext cx="196451" cy="246221"/>
-              </a:xfrm>
-              <a:prstGeom prst="rect">
-                <a:avLst/>
-              </a:prstGeom>
+            <a:prstGeom prst="rect">
+              <a:avLst/>
+            </a:prstGeom>
+            <a:noFill/>
+          </p:spPr>
+          <p:txBody>
+            <a:bodyPr wrap="square" lIns="0" tIns="0" rIns="0" bIns="0" rtlCol="0">
+              <a:spAutoFit/>
+            </a:bodyPr>
+            <a:lstStyle/>
+            <a:p>
+              <a:r>
+                <a:rPr lang="en-US" sz="1600" dirty="0">
+                  <a:solidFill>
+                    <a:srgbClr val="FF0000"/>
+                  </a:solidFill>
+                </a:rPr>
+                <a:t>x</a:t>
+              </a:r>
+            </a:p>
+          </p:txBody>
+        </p:sp>
+        <p:cxnSp>
+          <p:nvCxnSpPr>
+            <p:cNvPr id="66" name="Straight Connector 65">
+              <a:extLst>
+                <a:ext uri="{FF2B5EF4-FFF2-40B4-BE49-F238E27FC236}">
+                  <a16:creationId xmlns:a16="http://schemas.microsoft.com/office/drawing/2014/main" id="{B5B99A9F-1200-1649-3C33-2C6AC10C38F4}"/>
+                </a:ext>
+              </a:extLst>
+            </p:cNvPr>
+            <p:cNvCxnSpPr>
+              <a:cxnSpLocks/>
+            </p:cNvCxnSpPr>
+            <p:nvPr/>
+          </p:nvCxnSpPr>
+          <p:spPr>
+            <a:xfrm>
+              <a:off x="783270" y="4653042"/>
+              <a:ext cx="196451" cy="0"/>
+            </a:xfrm>
+            <a:prstGeom prst="line">
+              <a:avLst/>
+            </a:prstGeom>
+            <a:ln w="19050">
+              <a:solidFill>
+                <a:schemeClr val="tx1"/>
+              </a:solidFill>
+            </a:ln>
+          </p:spPr>
+          <p:style>
+            <a:lnRef idx="1">
+              <a:schemeClr val="dk1"/>
+            </a:lnRef>
+            <a:fillRef idx="0">
+              <a:schemeClr val="dk1"/>
+            </a:fillRef>
+            <a:effectRef idx="0">
+              <a:schemeClr val="dk1"/>
+            </a:effectRef>
+            <a:fontRef idx="minor">
+              <a:schemeClr val="tx1"/>
+            </a:fontRef>
+          </p:style>
+        </p:cxnSp>
+        <p:sp>
+          <p:nvSpPr>
+            <p:cNvPr id="85" name="TextBox 84">
+              <a:extLst>
+                <a:ext uri="{FF2B5EF4-FFF2-40B4-BE49-F238E27FC236}">
+                  <a16:creationId xmlns:a16="http://schemas.microsoft.com/office/drawing/2014/main" id="{F4E6D7CC-3464-0109-737A-9B5E19CEDEDA}"/>
+                </a:ext>
+              </a:extLst>
+            </p:cNvPr>
+            <p:cNvSpPr txBox="1"/>
+            <p:nvPr/>
+          </p:nvSpPr>
+          <p:spPr>
+            <a:xfrm>
+              <a:off x="1018372" y="4569222"/>
+              <a:ext cx="742890" cy="138499"/>
+            </a:xfrm>
+            <a:prstGeom prst="rect">
+              <a:avLst/>
+            </a:prstGeom>
+            <a:noFill/>
+          </p:spPr>
+          <p:txBody>
+            <a:bodyPr wrap="square" lIns="0" tIns="0" rIns="0" bIns="0" rtlCol="0">
+              <a:spAutoFit/>
+            </a:bodyPr>
+            <a:lstStyle/>
+            <a:p>
+              <a:r>
+                <a:rPr lang="en-US" sz="900" dirty="0"/>
+                <a:t>Best slope fit</a:t>
+              </a:r>
+            </a:p>
+          </p:txBody>
+        </p:sp>
+        <p:sp>
+          <p:nvSpPr>
+            <p:cNvPr id="113" name="TextBox 112">
+              <a:extLst>
+                <a:ext uri="{FF2B5EF4-FFF2-40B4-BE49-F238E27FC236}">
+                  <a16:creationId xmlns:a16="http://schemas.microsoft.com/office/drawing/2014/main" id="{CCA39659-EE67-44CB-CFE6-B493A8A99305}"/>
+                </a:ext>
+              </a:extLst>
+            </p:cNvPr>
+            <p:cNvSpPr txBox="1"/>
+            <p:nvPr/>
+          </p:nvSpPr>
+          <p:spPr>
+            <a:xfrm>
+              <a:off x="4801812" y="4571029"/>
+              <a:ext cx="1028094" cy="138499"/>
+            </a:xfrm>
+            <a:prstGeom prst="rect">
+              <a:avLst/>
+            </a:prstGeom>
+            <a:noFill/>
+          </p:spPr>
+          <p:txBody>
+            <a:bodyPr wrap="square" lIns="0" tIns="0" rIns="0" bIns="0" rtlCol="0">
+              <a:spAutoFit/>
+            </a:bodyPr>
+            <a:lstStyle/>
+            <a:p>
+              <a:r>
+                <a:rPr lang="en-US" sz="900" dirty="0"/>
+                <a:t>Non-fitter (outlier)</a:t>
+              </a:r>
+            </a:p>
+          </p:txBody>
+        </p:sp>
+        <p:cxnSp>
+          <p:nvCxnSpPr>
+            <p:cNvPr id="116" name="Straight Connector 115">
+              <a:extLst>
+                <a:ext uri="{FF2B5EF4-FFF2-40B4-BE49-F238E27FC236}">
+                  <a16:creationId xmlns:a16="http://schemas.microsoft.com/office/drawing/2014/main" id="{21B399A3-064C-82D0-2FF6-3B7D2164754A}"/>
+                </a:ext>
+              </a:extLst>
+            </p:cNvPr>
+            <p:cNvCxnSpPr>
+              <a:cxnSpLocks/>
+            </p:cNvCxnSpPr>
+            <p:nvPr/>
+          </p:nvCxnSpPr>
+          <p:spPr>
+            <a:xfrm>
+              <a:off x="93739" y="4653042"/>
+              <a:ext cx="196451" cy="0"/>
+            </a:xfrm>
+            <a:prstGeom prst="line">
+              <a:avLst/>
+            </a:prstGeom>
+            <a:ln w="19050">
+              <a:solidFill>
+                <a:schemeClr val="tx1"/>
+              </a:solidFill>
+              <a:prstDash val="sysDash"/>
+            </a:ln>
+          </p:spPr>
+          <p:style>
+            <a:lnRef idx="1">
+              <a:schemeClr val="dk1"/>
+            </a:lnRef>
+            <a:fillRef idx="0">
+              <a:schemeClr val="dk1"/>
+            </a:fillRef>
+            <a:effectRef idx="0">
+              <a:schemeClr val="dk1"/>
+            </a:effectRef>
+            <a:fontRef idx="minor">
+              <a:schemeClr val="tx1"/>
+            </a:fontRef>
+          </p:style>
+        </p:cxnSp>
+        <p:sp>
+          <p:nvSpPr>
+            <p:cNvPr id="118" name="TextBox 117">
+              <a:extLst>
+                <a:ext uri="{FF2B5EF4-FFF2-40B4-BE49-F238E27FC236}">
+                  <a16:creationId xmlns:a16="http://schemas.microsoft.com/office/drawing/2014/main" id="{881B507E-3D6C-60BB-976D-D46DF8A1E07A}"/>
+                </a:ext>
+              </a:extLst>
+            </p:cNvPr>
+            <p:cNvSpPr txBox="1"/>
+            <p:nvPr/>
+          </p:nvSpPr>
+          <p:spPr>
+            <a:xfrm>
+              <a:off x="316935" y="4569222"/>
+              <a:ext cx="1212482" cy="138499"/>
+            </a:xfrm>
+            <a:prstGeom prst="rect">
+              <a:avLst/>
+            </a:prstGeom>
+            <a:noFill/>
+          </p:spPr>
+          <p:txBody>
+            <a:bodyPr wrap="square" lIns="0" tIns="0" rIns="0" bIns="0" rtlCol="0">
+              <a:spAutoFit/>
+            </a:bodyPr>
+            <a:lstStyle/>
+            <a:p>
+              <a:r>
+                <a:rPr lang="en-US" sz="900" dirty="0"/>
+                <a:t>PRR fit</a:t>
+              </a:r>
+            </a:p>
+          </p:txBody>
+        </p:sp>
+        <p:sp>
+          <p:nvSpPr>
+            <p:cNvPr id="27" name="TextBox 26">
+              <a:extLst>
+                <a:ext uri="{FF2B5EF4-FFF2-40B4-BE49-F238E27FC236}">
+                  <a16:creationId xmlns:a16="http://schemas.microsoft.com/office/drawing/2014/main" id="{210F750C-7C56-5D3D-ABB5-373B3795FDD2}"/>
+                </a:ext>
+              </a:extLst>
+            </p:cNvPr>
+            <p:cNvSpPr txBox="1"/>
+            <p:nvPr/>
+          </p:nvSpPr>
+          <p:spPr>
+            <a:xfrm>
+              <a:off x="3661090" y="4561602"/>
+              <a:ext cx="903971" cy="138499"/>
+            </a:xfrm>
+            <a:prstGeom prst="rect">
+              <a:avLst/>
+            </a:prstGeom>
+            <a:noFill/>
+          </p:spPr>
+          <p:txBody>
+            <a:bodyPr wrap="square" lIns="0" tIns="0" rIns="0" bIns="0" rtlCol="0">
+              <a:spAutoFit/>
+            </a:bodyPr>
+            <a:lstStyle/>
+            <a:p>
+              <a:r>
+                <a:rPr lang="en-US" sz="900" dirty="0"/>
+                <a:t>High initial deficit</a:t>
+              </a:r>
+            </a:p>
+          </p:txBody>
+        </p:sp>
+        <p:sp>
+          <p:nvSpPr>
+            <p:cNvPr id="28" name="TextBox 27">
+              <a:extLst>
+                <a:ext uri="{FF2B5EF4-FFF2-40B4-BE49-F238E27FC236}">
+                  <a16:creationId xmlns:a16="http://schemas.microsoft.com/office/drawing/2014/main" id="{317C8BE0-6CAF-DC1F-270A-E641A4346857}"/>
+                </a:ext>
+              </a:extLst>
+            </p:cNvPr>
+            <p:cNvSpPr txBox="1"/>
+            <p:nvPr/>
+          </p:nvSpPr>
+          <p:spPr>
+            <a:xfrm>
+              <a:off x="1912576" y="4561602"/>
+              <a:ext cx="426764" cy="138499"/>
+            </a:xfrm>
+            <a:prstGeom prst="rect">
+              <a:avLst/>
+            </a:prstGeom>
+            <a:noFill/>
+          </p:spPr>
+          <p:txBody>
+            <a:bodyPr wrap="square" lIns="0" tIns="0" rIns="0" bIns="0" rtlCol="0">
+              <a:spAutoFit/>
+            </a:bodyPr>
+            <a:lstStyle/>
+            <a:p>
+              <a:r>
+                <a:rPr lang="en-US" sz="900" dirty="0"/>
+                <a:t>General</a:t>
+              </a:r>
+            </a:p>
+          </p:txBody>
+        </p:sp>
+        <p:sp>
+          <p:nvSpPr>
+            <p:cNvPr id="29" name="Oval 28">
+              <a:extLst>
+                <a:ext uri="{FF2B5EF4-FFF2-40B4-BE49-F238E27FC236}">
+                  <a16:creationId xmlns:a16="http://schemas.microsoft.com/office/drawing/2014/main" id="{6D1D30C5-24FB-BA7C-3636-4B4653B6D461}"/>
+                </a:ext>
+              </a:extLst>
+            </p:cNvPr>
+            <p:cNvSpPr/>
+            <p:nvPr/>
+          </p:nvSpPr>
+          <p:spPr>
+            <a:xfrm>
+              <a:off x="3490627" y="4597241"/>
+              <a:ext cx="79645" cy="80441"/>
+            </a:xfrm>
+            <a:prstGeom prst="ellipse">
+              <a:avLst/>
+            </a:prstGeom>
+            <a:solidFill>
+              <a:srgbClr val="CC79A7"/>
+            </a:solidFill>
+            <a:ln>
               <a:noFill/>
-            </p:spPr>
-            <p:txBody>
-              <a:bodyPr wrap="square" lIns="0" tIns="0" rIns="0" bIns="0" rtlCol="0">
-                <a:spAutoFit/>
-              </a:bodyPr>
-              <a:lstStyle/>
-              <a:p>
-                <a:r>
-                  <a:rPr lang="en-US" sz="1600" dirty="0">
-                    <a:solidFill>
-                      <a:srgbClr val="FF0000"/>
-                    </a:solidFill>
-                  </a:rPr>
-                  <a:t>x</a:t>
-                </a:r>
-              </a:p>
-            </p:txBody>
-          </p:sp>
-          <p:cxnSp>
-            <p:nvCxnSpPr>
-              <p:cNvPr id="66" name="Straight Connector 65">
-                <a:extLst>
-                  <a:ext uri="{FF2B5EF4-FFF2-40B4-BE49-F238E27FC236}">
-                    <a16:creationId xmlns:a16="http://schemas.microsoft.com/office/drawing/2014/main" id="{B5B99A9F-1200-1649-3C33-2C6AC10C38F4}"/>
-                  </a:ext>
-                </a:extLst>
-              </p:cNvPr>
-              <p:cNvCxnSpPr>
-                <a:cxnSpLocks/>
-              </p:cNvCxnSpPr>
-              <p:nvPr/>
-            </p:nvCxnSpPr>
-            <p:spPr>
-              <a:xfrm>
-                <a:off x="783270" y="3371392"/>
-                <a:ext cx="196451" cy="0"/>
-              </a:xfrm>
-              <a:prstGeom prst="line">
-                <a:avLst/>
-              </a:prstGeom>
-              <a:ln w="19050">
-                <a:solidFill>
-                  <a:schemeClr val="tx1"/>
-                </a:solidFill>
-              </a:ln>
-            </p:spPr>
-            <p:style>
-              <a:lnRef idx="1">
-                <a:schemeClr val="dk1"/>
-              </a:lnRef>
-              <a:fillRef idx="0">
-                <a:schemeClr val="dk1"/>
-              </a:fillRef>
-              <a:effectRef idx="0">
-                <a:schemeClr val="dk1"/>
-              </a:effectRef>
-              <a:fontRef idx="minor">
-                <a:schemeClr val="tx1"/>
-              </a:fontRef>
-            </p:style>
-          </p:cxnSp>
-          <p:sp>
-            <p:nvSpPr>
-              <p:cNvPr id="85" name="TextBox 84">
-                <a:extLst>
-                  <a:ext uri="{FF2B5EF4-FFF2-40B4-BE49-F238E27FC236}">
-                    <a16:creationId xmlns:a16="http://schemas.microsoft.com/office/drawing/2014/main" id="{F4E6D7CC-3464-0109-737A-9B5E19CEDEDA}"/>
-                  </a:ext>
-                </a:extLst>
-              </p:cNvPr>
-              <p:cNvSpPr txBox="1"/>
-              <p:nvPr/>
-            </p:nvSpPr>
-            <p:spPr>
-              <a:xfrm>
-                <a:off x="1018372" y="3287572"/>
-                <a:ext cx="742890" cy="138499"/>
-              </a:xfrm>
-              <a:prstGeom prst="rect">
-                <a:avLst/>
-              </a:prstGeom>
+            </a:ln>
+          </p:spPr>
+          <p:style>
+            <a:lnRef idx="2">
+              <a:schemeClr val="accent1">
+                <a:shade val="15000"/>
+              </a:schemeClr>
+            </a:lnRef>
+            <a:fillRef idx="1">
+              <a:schemeClr val="accent1"/>
+            </a:fillRef>
+            <a:effectRef idx="0">
+              <a:schemeClr val="accent1"/>
+            </a:effectRef>
+            <a:fontRef idx="minor">
+              <a:schemeClr val="lt1"/>
+            </a:fontRef>
+          </p:style>
+          <p:txBody>
+            <a:bodyPr rtlCol="0" anchor="ctr"/>
+            <a:lstStyle/>
+            <a:p>
+              <a:pPr algn="ctr"/>
+              <a:endParaRPr lang="de-DE"/>
+            </a:p>
+          </p:txBody>
+        </p:sp>
+        <p:sp>
+          <p:nvSpPr>
+            <p:cNvPr id="30" name="Oval 29">
+              <a:extLst>
+                <a:ext uri="{FF2B5EF4-FFF2-40B4-BE49-F238E27FC236}">
+                  <a16:creationId xmlns:a16="http://schemas.microsoft.com/office/drawing/2014/main" id="{959D7A6D-17AF-986F-8050-B7A29540F45F}"/>
+                </a:ext>
+              </a:extLst>
+            </p:cNvPr>
+            <p:cNvSpPr/>
+            <p:nvPr/>
+          </p:nvSpPr>
+          <p:spPr>
+            <a:xfrm>
+              <a:off x="1798499" y="4598810"/>
+              <a:ext cx="73550" cy="77302"/>
+            </a:xfrm>
+            <a:prstGeom prst="ellipse">
+              <a:avLst/>
+            </a:prstGeom>
+            <a:solidFill>
+              <a:srgbClr val="6BADD2"/>
+            </a:solidFill>
+            <a:ln>
+              <a:solidFill>
+                <a:srgbClr val="002060"/>
+              </a:solidFill>
+            </a:ln>
+          </p:spPr>
+          <p:style>
+            <a:lnRef idx="2">
+              <a:schemeClr val="accent1">
+                <a:shade val="15000"/>
+              </a:schemeClr>
+            </a:lnRef>
+            <a:fillRef idx="1">
+              <a:schemeClr val="accent1"/>
+            </a:fillRef>
+            <a:effectRef idx="0">
+              <a:schemeClr val="accent1"/>
+            </a:effectRef>
+            <a:fontRef idx="minor">
+              <a:schemeClr val="lt1"/>
+            </a:fontRef>
+          </p:style>
+          <p:txBody>
+            <a:bodyPr rtlCol="0" anchor="ctr"/>
+            <a:lstStyle/>
+            <a:p>
+              <a:pPr algn="ctr"/>
+              <a:endParaRPr lang="de-DE"/>
+            </a:p>
+          </p:txBody>
+        </p:sp>
+        <p:sp>
+          <p:nvSpPr>
+            <p:cNvPr id="11" name="TextBox 10">
+              <a:extLst>
+                <a:ext uri="{FF2B5EF4-FFF2-40B4-BE49-F238E27FC236}">
+                  <a16:creationId xmlns:a16="http://schemas.microsoft.com/office/drawing/2014/main" id="{6AAD429A-EBFD-90FB-75B6-ECF9CFA2D43F}"/>
+                </a:ext>
+              </a:extLst>
+            </p:cNvPr>
+            <p:cNvSpPr txBox="1"/>
+            <p:nvPr/>
+          </p:nvSpPr>
+          <p:spPr>
+            <a:xfrm>
+              <a:off x="2545035" y="4561602"/>
+              <a:ext cx="847656" cy="138499"/>
+            </a:xfrm>
+            <a:prstGeom prst="rect">
+              <a:avLst/>
+            </a:prstGeom>
+            <a:noFill/>
+          </p:spPr>
+          <p:txBody>
+            <a:bodyPr wrap="square" lIns="0" tIns="0" rIns="0" bIns="0" rtlCol="0">
+              <a:spAutoFit/>
+            </a:bodyPr>
+            <a:lstStyle/>
+            <a:p>
+              <a:r>
+                <a:rPr lang="en-US" sz="900" dirty="0"/>
+                <a:t>Low initial deficit</a:t>
+              </a:r>
+            </a:p>
+          </p:txBody>
+        </p:sp>
+        <p:sp>
+          <p:nvSpPr>
+            <p:cNvPr id="12" name="Oval 11">
+              <a:extLst>
+                <a:ext uri="{FF2B5EF4-FFF2-40B4-BE49-F238E27FC236}">
+                  <a16:creationId xmlns:a16="http://schemas.microsoft.com/office/drawing/2014/main" id="{7949E87D-099F-7639-6B2A-ED253C745ACA}"/>
+                </a:ext>
+              </a:extLst>
+            </p:cNvPr>
+            <p:cNvSpPr/>
+            <p:nvPr/>
+          </p:nvSpPr>
+          <p:spPr>
+            <a:xfrm>
+              <a:off x="2427514" y="4597241"/>
+              <a:ext cx="80441" cy="80441"/>
+            </a:xfrm>
+            <a:prstGeom prst="ellipse">
+              <a:avLst/>
+            </a:prstGeom>
+            <a:solidFill>
+              <a:srgbClr val="E69F00"/>
+            </a:solidFill>
+            <a:ln>
               <a:noFill/>
-            </p:spPr>
-            <p:txBody>
-              <a:bodyPr wrap="square" lIns="0" tIns="0" rIns="0" bIns="0" rtlCol="0">
-                <a:spAutoFit/>
-              </a:bodyPr>
-              <a:lstStyle/>
-              <a:p>
-                <a:r>
-                  <a:rPr lang="en-US" sz="900" dirty="0"/>
-                  <a:t>Best slope fit</a:t>
-                </a:r>
-              </a:p>
-            </p:txBody>
-          </p:sp>
-          <p:sp>
-            <p:nvSpPr>
-              <p:cNvPr id="113" name="TextBox 112">
-                <a:extLst>
-                  <a:ext uri="{FF2B5EF4-FFF2-40B4-BE49-F238E27FC236}">
-                    <a16:creationId xmlns:a16="http://schemas.microsoft.com/office/drawing/2014/main" id="{CCA39659-EE67-44CB-CFE6-B493A8A99305}"/>
-                  </a:ext>
-                </a:extLst>
-              </p:cNvPr>
-              <p:cNvSpPr txBox="1"/>
-              <p:nvPr/>
-            </p:nvSpPr>
-            <p:spPr>
-              <a:xfrm>
-                <a:off x="3642316" y="3279952"/>
-                <a:ext cx="1028094" cy="138499"/>
-              </a:xfrm>
-              <a:prstGeom prst="rect">
-                <a:avLst/>
-              </a:prstGeom>
-              <a:noFill/>
-            </p:spPr>
-            <p:txBody>
-              <a:bodyPr wrap="square" lIns="0" tIns="0" rIns="0" bIns="0" rtlCol="0">
-                <a:spAutoFit/>
-              </a:bodyPr>
-              <a:lstStyle/>
-              <a:p>
-                <a:r>
-                  <a:rPr lang="en-US" sz="900" dirty="0"/>
-                  <a:t>Non-fitter (outlier)</a:t>
-                </a:r>
-              </a:p>
-            </p:txBody>
-          </p:sp>
-          <p:cxnSp>
-            <p:nvCxnSpPr>
-              <p:cNvPr id="116" name="Straight Connector 115">
-                <a:extLst>
-                  <a:ext uri="{FF2B5EF4-FFF2-40B4-BE49-F238E27FC236}">
-                    <a16:creationId xmlns:a16="http://schemas.microsoft.com/office/drawing/2014/main" id="{21B399A3-064C-82D0-2FF6-3B7D2164754A}"/>
-                  </a:ext>
-                </a:extLst>
-              </p:cNvPr>
-              <p:cNvCxnSpPr>
-                <a:cxnSpLocks/>
-              </p:cNvCxnSpPr>
-              <p:nvPr/>
-            </p:nvCxnSpPr>
-            <p:spPr>
-              <a:xfrm>
-                <a:off x="93739" y="3371392"/>
-                <a:ext cx="196451" cy="0"/>
-              </a:xfrm>
-              <a:prstGeom prst="line">
-                <a:avLst/>
-              </a:prstGeom>
-              <a:ln w="19050">
-                <a:solidFill>
-                  <a:schemeClr val="tx1"/>
-                </a:solidFill>
-                <a:prstDash val="sysDash"/>
-              </a:ln>
-            </p:spPr>
-            <p:style>
-              <a:lnRef idx="1">
-                <a:schemeClr val="dk1"/>
-              </a:lnRef>
-              <a:fillRef idx="0">
-                <a:schemeClr val="dk1"/>
-              </a:fillRef>
-              <a:effectRef idx="0">
-                <a:schemeClr val="dk1"/>
-              </a:effectRef>
-              <a:fontRef idx="minor">
-                <a:schemeClr val="tx1"/>
-              </a:fontRef>
-            </p:style>
-          </p:cxnSp>
-          <p:sp>
-            <p:nvSpPr>
-              <p:cNvPr id="118" name="TextBox 117">
-                <a:extLst>
-                  <a:ext uri="{FF2B5EF4-FFF2-40B4-BE49-F238E27FC236}">
-                    <a16:creationId xmlns:a16="http://schemas.microsoft.com/office/drawing/2014/main" id="{881B507E-3D6C-60BB-976D-D46DF8A1E07A}"/>
-                  </a:ext>
-                </a:extLst>
-              </p:cNvPr>
-              <p:cNvSpPr txBox="1"/>
-              <p:nvPr/>
-            </p:nvSpPr>
-            <p:spPr>
-              <a:xfrm>
-                <a:off x="316935" y="3287572"/>
-                <a:ext cx="1212482" cy="138499"/>
-              </a:xfrm>
-              <a:prstGeom prst="rect">
-                <a:avLst/>
-              </a:prstGeom>
-              <a:noFill/>
-            </p:spPr>
-            <p:txBody>
-              <a:bodyPr wrap="square" lIns="0" tIns="0" rIns="0" bIns="0" rtlCol="0">
-                <a:spAutoFit/>
-              </a:bodyPr>
-              <a:lstStyle/>
-              <a:p>
-                <a:r>
-                  <a:rPr lang="en-US" sz="900" dirty="0"/>
-                  <a:t>PRR fit</a:t>
-                </a:r>
-              </a:p>
-            </p:txBody>
-          </p:sp>
-          <p:sp>
-            <p:nvSpPr>
-              <p:cNvPr id="27" name="TextBox 26">
-                <a:extLst>
-                  <a:ext uri="{FF2B5EF4-FFF2-40B4-BE49-F238E27FC236}">
-                    <a16:creationId xmlns:a16="http://schemas.microsoft.com/office/drawing/2014/main" id="{210F750C-7C56-5D3D-ABB5-373B3795FDD2}"/>
-                  </a:ext>
-                </a:extLst>
-              </p:cNvPr>
-              <p:cNvSpPr txBox="1"/>
-              <p:nvPr/>
-            </p:nvSpPr>
-            <p:spPr>
-              <a:xfrm>
-                <a:off x="3086056" y="3279952"/>
-                <a:ext cx="426764" cy="138499"/>
-              </a:xfrm>
-              <a:prstGeom prst="rect">
-                <a:avLst/>
-              </a:prstGeom>
-              <a:noFill/>
-            </p:spPr>
-            <p:txBody>
-              <a:bodyPr wrap="square" lIns="0" tIns="0" rIns="0" bIns="0" rtlCol="0">
-                <a:spAutoFit/>
-              </a:bodyPr>
-              <a:lstStyle/>
-              <a:p>
-                <a:r>
-                  <a:rPr lang="en-US" sz="900" dirty="0"/>
-                  <a:t>Poor</a:t>
-                </a:r>
-              </a:p>
-            </p:txBody>
-          </p:sp>
-          <p:sp>
-            <p:nvSpPr>
-              <p:cNvPr id="28" name="TextBox 27">
-                <a:extLst>
-                  <a:ext uri="{FF2B5EF4-FFF2-40B4-BE49-F238E27FC236}">
-                    <a16:creationId xmlns:a16="http://schemas.microsoft.com/office/drawing/2014/main" id="{317C8BE0-6CAF-DC1F-270A-E641A4346857}"/>
-                  </a:ext>
-                </a:extLst>
-              </p:cNvPr>
-              <p:cNvSpPr txBox="1"/>
-              <p:nvPr/>
-            </p:nvSpPr>
-            <p:spPr>
-              <a:xfrm>
-                <a:off x="1912576" y="3279952"/>
-                <a:ext cx="426764" cy="138499"/>
-              </a:xfrm>
-              <a:prstGeom prst="rect">
-                <a:avLst/>
-              </a:prstGeom>
-              <a:noFill/>
-            </p:spPr>
-            <p:txBody>
-              <a:bodyPr wrap="square" lIns="0" tIns="0" rIns="0" bIns="0" rtlCol="0">
-                <a:spAutoFit/>
-              </a:bodyPr>
-              <a:lstStyle/>
-              <a:p>
-                <a:r>
-                  <a:rPr lang="en-US" sz="900" dirty="0"/>
-                  <a:t>General</a:t>
-                </a:r>
-              </a:p>
-            </p:txBody>
-          </p:sp>
-          <p:sp>
-            <p:nvSpPr>
-              <p:cNvPr id="29" name="Oval 28">
-                <a:extLst>
-                  <a:ext uri="{FF2B5EF4-FFF2-40B4-BE49-F238E27FC236}">
-                    <a16:creationId xmlns:a16="http://schemas.microsoft.com/office/drawing/2014/main" id="{6D1D30C5-24FB-BA7C-3636-4B4653B6D461}"/>
-                  </a:ext>
-                </a:extLst>
-              </p:cNvPr>
-              <p:cNvSpPr/>
-              <p:nvPr/>
-            </p:nvSpPr>
-            <p:spPr>
-              <a:xfrm>
-                <a:off x="2915592" y="3315591"/>
-                <a:ext cx="79645" cy="80441"/>
-              </a:xfrm>
-              <a:prstGeom prst="ellipse">
-                <a:avLst/>
-              </a:prstGeom>
-              <a:solidFill>
-                <a:srgbClr val="CC79A7"/>
-              </a:solidFill>
-              <a:ln>
-                <a:noFill/>
-              </a:ln>
-            </p:spPr>
-            <p:style>
-              <a:lnRef idx="2">
-                <a:schemeClr val="accent1">
-                  <a:shade val="15000"/>
-                </a:schemeClr>
-              </a:lnRef>
-              <a:fillRef idx="1">
-                <a:schemeClr val="accent1"/>
-              </a:fillRef>
-              <a:effectRef idx="0">
-                <a:schemeClr val="accent1"/>
-              </a:effectRef>
-              <a:fontRef idx="minor">
-                <a:schemeClr val="lt1"/>
-              </a:fontRef>
-            </p:style>
-            <p:txBody>
-              <a:bodyPr rtlCol="0" anchor="ctr"/>
-              <a:lstStyle/>
-              <a:p>
-                <a:pPr algn="ctr"/>
-                <a:endParaRPr lang="de-DE"/>
-              </a:p>
-            </p:txBody>
-          </p:sp>
-          <p:sp>
-            <p:nvSpPr>
-              <p:cNvPr id="30" name="Oval 29">
-                <a:extLst>
-                  <a:ext uri="{FF2B5EF4-FFF2-40B4-BE49-F238E27FC236}">
-                    <a16:creationId xmlns:a16="http://schemas.microsoft.com/office/drawing/2014/main" id="{959D7A6D-17AF-986F-8050-B7A29540F45F}"/>
-                  </a:ext>
-                </a:extLst>
-              </p:cNvPr>
-              <p:cNvSpPr/>
-              <p:nvPr/>
-            </p:nvSpPr>
-            <p:spPr>
-              <a:xfrm>
-                <a:off x="1798499" y="3317160"/>
-                <a:ext cx="73550" cy="77302"/>
-              </a:xfrm>
-              <a:prstGeom prst="ellipse">
-                <a:avLst/>
-              </a:prstGeom>
-              <a:solidFill>
-                <a:srgbClr val="6BADD2"/>
-              </a:solidFill>
-              <a:ln>
-                <a:solidFill>
-                  <a:srgbClr val="002060"/>
-                </a:solidFill>
-              </a:ln>
-            </p:spPr>
-            <p:style>
-              <a:lnRef idx="2">
-                <a:schemeClr val="accent1">
-                  <a:shade val="15000"/>
-                </a:schemeClr>
-              </a:lnRef>
-              <a:fillRef idx="1">
-                <a:schemeClr val="accent1"/>
-              </a:fillRef>
-              <a:effectRef idx="0">
-                <a:schemeClr val="accent1"/>
-              </a:effectRef>
-              <a:fontRef idx="minor">
-                <a:schemeClr val="lt1"/>
-              </a:fontRef>
-            </p:style>
-            <p:txBody>
-              <a:bodyPr rtlCol="0" anchor="ctr"/>
-              <a:lstStyle/>
-              <a:p>
-                <a:pPr algn="ctr"/>
-                <a:endParaRPr lang="de-DE"/>
-              </a:p>
-            </p:txBody>
-          </p:sp>
-          <p:sp>
-            <p:nvSpPr>
-              <p:cNvPr id="11" name="TextBox 10">
-                <a:extLst>
-                  <a:ext uri="{FF2B5EF4-FFF2-40B4-BE49-F238E27FC236}">
-                    <a16:creationId xmlns:a16="http://schemas.microsoft.com/office/drawing/2014/main" id="{6AAD429A-EBFD-90FB-75B6-ECF9CFA2D43F}"/>
-                  </a:ext>
-                </a:extLst>
-              </p:cNvPr>
-              <p:cNvSpPr txBox="1"/>
-              <p:nvPr/>
-            </p:nvSpPr>
-            <p:spPr>
-              <a:xfrm>
-                <a:off x="2545036" y="3279952"/>
-                <a:ext cx="319608" cy="138499"/>
-              </a:xfrm>
-              <a:prstGeom prst="rect">
-                <a:avLst/>
-              </a:prstGeom>
-              <a:noFill/>
-            </p:spPr>
-            <p:txBody>
-              <a:bodyPr wrap="square" lIns="0" tIns="0" rIns="0" bIns="0" rtlCol="0">
-                <a:spAutoFit/>
-              </a:bodyPr>
-              <a:lstStyle/>
-              <a:p>
-                <a:r>
-                  <a:rPr lang="en-US" sz="900" dirty="0"/>
-                  <a:t>Good</a:t>
-                </a:r>
-              </a:p>
-            </p:txBody>
-          </p:sp>
-          <p:sp>
-            <p:nvSpPr>
-              <p:cNvPr id="12" name="Oval 11">
-                <a:extLst>
-                  <a:ext uri="{FF2B5EF4-FFF2-40B4-BE49-F238E27FC236}">
-                    <a16:creationId xmlns:a16="http://schemas.microsoft.com/office/drawing/2014/main" id="{7949E87D-099F-7639-6B2A-ED253C745ACA}"/>
-                  </a:ext>
-                </a:extLst>
-              </p:cNvPr>
-              <p:cNvSpPr/>
-              <p:nvPr/>
-            </p:nvSpPr>
-            <p:spPr>
-              <a:xfrm>
-                <a:off x="2427514" y="3315591"/>
-                <a:ext cx="80441" cy="80441"/>
-              </a:xfrm>
-              <a:prstGeom prst="ellipse">
-                <a:avLst/>
-              </a:prstGeom>
-              <a:solidFill>
-                <a:srgbClr val="E69F00"/>
-              </a:solidFill>
-              <a:ln>
-                <a:noFill/>
-              </a:ln>
-            </p:spPr>
-            <p:style>
-              <a:lnRef idx="2">
-                <a:schemeClr val="accent1">
-                  <a:shade val="15000"/>
-                </a:schemeClr>
-              </a:lnRef>
-              <a:fillRef idx="1">
-                <a:schemeClr val="accent1"/>
-              </a:fillRef>
-              <a:effectRef idx="0">
-                <a:schemeClr val="accent1"/>
-              </a:effectRef>
-              <a:fontRef idx="minor">
-                <a:schemeClr val="lt1"/>
-              </a:fontRef>
-            </p:style>
-            <p:txBody>
-              <a:bodyPr rtlCol="0" anchor="ctr"/>
-              <a:lstStyle/>
-              <a:p>
-                <a:pPr algn="ctr"/>
-                <a:endParaRPr lang="de-DE" dirty="0"/>
-              </a:p>
-            </p:txBody>
-          </p:sp>
-        </p:grpSp>
+            </a:ln>
+          </p:spPr>
+          <p:style>
+            <a:lnRef idx="2">
+              <a:schemeClr val="accent1">
+                <a:shade val="15000"/>
+              </a:schemeClr>
+            </a:lnRef>
+            <a:fillRef idx="1">
+              <a:schemeClr val="accent1"/>
+            </a:fillRef>
+            <a:effectRef idx="0">
+              <a:schemeClr val="accent1"/>
+            </a:effectRef>
+            <a:fontRef idx="minor">
+              <a:schemeClr val="lt1"/>
+            </a:fontRef>
+          </p:style>
+          <p:txBody>
+            <a:bodyPr rtlCol="0" anchor="ctr"/>
+            <a:lstStyle/>
+            <a:p>
+              <a:pPr algn="ctr"/>
+              <a:endParaRPr lang="de-DE" dirty="0"/>
+            </a:p>
+          </p:txBody>
+        </p:sp>
         <p:pic>
           <p:nvPicPr>
             <p:cNvPr id="24" name="Graphic 23">
@@ -9661,6 +9749,1370 @@
 <file path=ppt/slides/slide3.xml><?xml version="1.0" encoding="utf-8"?>
 <p:sld xmlns:a="http://schemas.openxmlformats.org/drawingml/2006/main" xmlns:r="http://schemas.openxmlformats.org/officeDocument/2006/relationships" xmlns:p="http://schemas.openxmlformats.org/presentationml/2006/main">
   <p:cSld>
+    <p:bg>
+      <p:bgPr>
+        <a:solidFill>
+          <a:schemeClr val="accent1">
+            <a:lumMod val="40000"/>
+            <a:lumOff val="60000"/>
+          </a:schemeClr>
+        </a:solidFill>
+        <a:effectLst/>
+      </p:bgPr>
+    </p:bg>
+    <p:spTree>
+      <p:nvGrpSpPr>
+        <p:cNvPr id="1" name="">
+          <a:extLst>
+            <a:ext uri="{FF2B5EF4-FFF2-40B4-BE49-F238E27FC236}">
+              <a16:creationId xmlns:a16="http://schemas.microsoft.com/office/drawing/2014/main" id="{7055D3BE-6C15-B121-AD9B-72C74355A45E}"/>
+            </a:ext>
+          </a:extLst>
+        </p:cNvPr>
+        <p:cNvGrpSpPr/>
+        <p:nvPr/>
+      </p:nvGrpSpPr>
+      <p:grpSpPr>
+        <a:xfrm>
+          <a:off x="0" y="0"/>
+          <a:ext cx="0" cy="0"/>
+          <a:chOff x="0" y="0"/>
+          <a:chExt cx="0" cy="0"/>
+        </a:xfrm>
+      </p:grpSpPr>
+      <p:sp>
+        <p:nvSpPr>
+          <p:cNvPr id="4" name="Rectangle 3">
+            <a:extLst>
+              <a:ext uri="{FF2B5EF4-FFF2-40B4-BE49-F238E27FC236}">
+                <a16:creationId xmlns:a16="http://schemas.microsoft.com/office/drawing/2014/main" id="{55E6AB88-136A-CA38-AB96-2261B1EA1F53}"/>
+              </a:ext>
+            </a:extLst>
+          </p:cNvPr>
+          <p:cNvSpPr/>
+          <p:nvPr/>
+        </p:nvSpPr>
+        <p:spPr>
+          <a:xfrm>
+            <a:off x="8952000" y="-291155"/>
+            <a:ext cx="3240000" cy="214184"/>
+          </a:xfrm>
+          <a:prstGeom prst="rect">
+            <a:avLst/>
+          </a:prstGeom>
+        </p:spPr>
+        <p:style>
+          <a:lnRef idx="2">
+            <a:schemeClr val="accent1">
+              <a:shade val="15000"/>
+            </a:schemeClr>
+          </a:lnRef>
+          <a:fillRef idx="1">
+            <a:schemeClr val="accent1"/>
+          </a:fillRef>
+          <a:effectRef idx="0">
+            <a:schemeClr val="accent1"/>
+          </a:effectRef>
+          <a:fontRef idx="minor">
+            <a:schemeClr val="lt1"/>
+          </a:fontRef>
+        </p:style>
+        <p:txBody>
+          <a:bodyPr rtlCol="0" anchor="ctr"/>
+          <a:lstStyle/>
+          <a:p>
+            <a:pPr algn="ctr"/>
+            <a:endParaRPr lang="en-DE"/>
+          </a:p>
+        </p:txBody>
+      </p:sp>
+      <p:sp>
+        <p:nvSpPr>
+          <p:cNvPr id="3" name="Rectangle 2">
+            <a:extLst>
+              <a:ext uri="{FF2B5EF4-FFF2-40B4-BE49-F238E27FC236}">
+                <a16:creationId xmlns:a16="http://schemas.microsoft.com/office/drawing/2014/main" id="{04E8A273-23ED-6DAE-5267-64223710EE16}"/>
+              </a:ext>
+            </a:extLst>
+          </p:cNvPr>
+          <p:cNvSpPr/>
+          <p:nvPr/>
+        </p:nvSpPr>
+        <p:spPr>
+          <a:xfrm>
+            <a:off x="0" y="-280140"/>
+            <a:ext cx="6480000" cy="214184"/>
+          </a:xfrm>
+          <a:prstGeom prst="rect">
+            <a:avLst/>
+          </a:prstGeom>
+        </p:spPr>
+        <p:style>
+          <a:lnRef idx="2">
+            <a:schemeClr val="accent1">
+              <a:shade val="15000"/>
+            </a:schemeClr>
+          </a:lnRef>
+          <a:fillRef idx="1">
+            <a:schemeClr val="accent1"/>
+          </a:fillRef>
+          <a:effectRef idx="0">
+            <a:schemeClr val="accent1"/>
+          </a:effectRef>
+          <a:fontRef idx="minor">
+            <a:schemeClr val="lt1"/>
+          </a:fontRef>
+        </p:style>
+        <p:txBody>
+          <a:bodyPr rtlCol="0" anchor="ctr"/>
+          <a:lstStyle/>
+          <a:p>
+            <a:pPr algn="ctr"/>
+            <a:endParaRPr lang="en-DE"/>
+          </a:p>
+        </p:txBody>
+      </p:sp>
+      <p:sp>
+        <p:nvSpPr>
+          <p:cNvPr id="8" name="Rectangle 7">
+            <a:extLst>
+              <a:ext uri="{FF2B5EF4-FFF2-40B4-BE49-F238E27FC236}">
+                <a16:creationId xmlns:a16="http://schemas.microsoft.com/office/drawing/2014/main" id="{8281CBB6-C330-9AF0-318B-FF9E283058DB}"/>
+              </a:ext>
+            </a:extLst>
+          </p:cNvPr>
+          <p:cNvSpPr/>
+          <p:nvPr/>
+        </p:nvSpPr>
+        <p:spPr>
+          <a:xfrm>
+            <a:off x="0" y="5562708"/>
+            <a:ext cx="6480000" cy="1621199"/>
+          </a:xfrm>
+          <a:prstGeom prst="rect">
+            <a:avLst/>
+          </a:prstGeom>
+          <a:solidFill>
+            <a:schemeClr val="bg1"/>
+          </a:solidFill>
+          <a:ln>
+            <a:noFill/>
+          </a:ln>
+        </p:spPr>
+        <p:style>
+          <a:lnRef idx="2">
+            <a:schemeClr val="accent1">
+              <a:shade val="15000"/>
+            </a:schemeClr>
+          </a:lnRef>
+          <a:fillRef idx="1">
+            <a:schemeClr val="accent1"/>
+          </a:fillRef>
+          <a:effectRef idx="0">
+            <a:schemeClr val="accent1"/>
+          </a:effectRef>
+          <a:fontRef idx="minor">
+            <a:schemeClr val="lt1"/>
+          </a:fontRef>
+        </p:style>
+        <p:txBody>
+          <a:bodyPr rtlCol="0" anchor="ctr"/>
+          <a:lstStyle/>
+          <a:p>
+            <a:pPr algn="just"/>
+            <a:r>
+              <a:rPr lang="en-US" sz="1200" b="1" i="1" dirty="0">
+                <a:solidFill>
+                  <a:schemeClr val="tx1"/>
+                </a:solidFill>
+              </a:rPr>
+              <a:t>Figure X. Comparison of proportional recovery rule (PRR) fit and best slope fit across different motor assessments. </a:t>
+            </a:r>
+            <a:r>
+              <a:rPr lang="en-US" sz="1200" i="1" dirty="0">
+                <a:solidFill>
+                  <a:schemeClr val="tx1"/>
+                </a:solidFill>
+              </a:rPr>
+              <a:t>Panels (A–E) display the relationship between initial impairment (ii) and the change observed (co) for five different motor function assessments: (A) Fugl-Meyer Upper Extremity, (B) Fugl-Meyer Lower Extremity, (C) Barthel Index, (D) Modified Rankin Scale (</a:t>
+            </a:r>
+            <a:r>
+              <a:rPr lang="en-US" sz="1200" i="1" dirty="0" err="1">
+                <a:solidFill>
+                  <a:schemeClr val="tx1"/>
+                </a:solidFill>
+              </a:rPr>
+              <a:t>mRS</a:t>
+            </a:r>
+            <a:r>
+              <a:rPr lang="en-US" sz="1200" i="1" dirty="0">
+                <a:solidFill>
+                  <a:schemeClr val="tx1"/>
+                </a:solidFill>
+              </a:rPr>
+              <a:t>), and (E) National Institutes of Health Stroke Scale (NIHSS). Each panel includes two fitted lines: the PRR fit (dashed line), which represents the proportional recovery rule with a fixed 70% recovery slope, and the best slope fit (solid line), which is optimized for the given dataset. Outliers or non-fitters, identified based on the interquartile range (IQR) method using the best slope fit, are marked with a cross.</a:t>
+            </a:r>
+            <a:endParaRPr lang="de-DE" i="1" dirty="0">
+              <a:solidFill>
+                <a:schemeClr val="tx1"/>
+              </a:solidFill>
+            </a:endParaRPr>
+          </a:p>
+        </p:txBody>
+      </p:sp>
+      <p:sp>
+        <p:nvSpPr>
+          <p:cNvPr id="13" name="TextBox 12">
+            <a:extLst>
+              <a:ext uri="{FF2B5EF4-FFF2-40B4-BE49-F238E27FC236}">
+                <a16:creationId xmlns:a16="http://schemas.microsoft.com/office/drawing/2014/main" id="{554CB7F7-4747-879A-AA7C-7D61F92772BD}"/>
+              </a:ext>
+            </a:extLst>
+          </p:cNvPr>
+          <p:cNvSpPr txBox="1"/>
+          <p:nvPr/>
+        </p:nvSpPr>
+        <p:spPr>
+          <a:xfrm>
+            <a:off x="10356846" y="3152001"/>
+            <a:ext cx="430307" cy="276999"/>
+          </a:xfrm>
+          <a:prstGeom prst="rect">
+            <a:avLst/>
+          </a:prstGeom>
+          <a:noFill/>
+        </p:spPr>
+        <p:txBody>
+          <a:bodyPr wrap="square" rtlCol="0">
+            <a:spAutoFit/>
+          </a:bodyPr>
+          <a:lstStyle/>
+          <a:p>
+            <a:r>
+              <a:rPr lang="en-US" sz="1200" b="1" dirty="0"/>
+              <a:t>D</a:t>
+            </a:r>
+            <a:endParaRPr lang="de-DE" sz="1200" b="1" dirty="0"/>
+          </a:p>
+        </p:txBody>
+      </p:sp>
+      <p:sp>
+        <p:nvSpPr>
+          <p:cNvPr id="87" name="TextBox 86">
+            <a:extLst>
+              <a:ext uri="{FF2B5EF4-FFF2-40B4-BE49-F238E27FC236}">
+                <a16:creationId xmlns:a16="http://schemas.microsoft.com/office/drawing/2014/main" id="{3F8E4695-438C-7F7D-8ED6-6646EF0062B5}"/>
+              </a:ext>
+            </a:extLst>
+          </p:cNvPr>
+          <p:cNvSpPr txBox="1"/>
+          <p:nvPr/>
+        </p:nvSpPr>
+        <p:spPr>
+          <a:xfrm>
+            <a:off x="10935351" y="849703"/>
+            <a:ext cx="430307" cy="276999"/>
+          </a:xfrm>
+          <a:prstGeom prst="rect">
+            <a:avLst/>
+          </a:prstGeom>
+          <a:noFill/>
+        </p:spPr>
+        <p:txBody>
+          <a:bodyPr wrap="square" rtlCol="0">
+            <a:spAutoFit/>
+          </a:bodyPr>
+          <a:lstStyle/>
+          <a:p>
+            <a:r>
+              <a:rPr lang="en-US" sz="1200" b="1" dirty="0"/>
+              <a:t>C</a:t>
+            </a:r>
+            <a:endParaRPr lang="de-DE" sz="1200" b="1" dirty="0"/>
+          </a:p>
+        </p:txBody>
+      </p:sp>
+      <p:sp>
+        <p:nvSpPr>
+          <p:cNvPr id="14" name="TextBox 13">
+            <a:extLst>
+              <a:ext uri="{FF2B5EF4-FFF2-40B4-BE49-F238E27FC236}">
+                <a16:creationId xmlns:a16="http://schemas.microsoft.com/office/drawing/2014/main" id="{25673C44-08D3-5A8D-0AD5-12838A167A14}"/>
+              </a:ext>
+            </a:extLst>
+          </p:cNvPr>
+          <p:cNvSpPr txBox="1"/>
+          <p:nvPr/>
+        </p:nvSpPr>
+        <p:spPr>
+          <a:xfrm>
+            <a:off x="8523952" y="3610789"/>
+            <a:ext cx="430307" cy="276999"/>
+          </a:xfrm>
+          <a:prstGeom prst="rect">
+            <a:avLst/>
+          </a:prstGeom>
+          <a:noFill/>
+        </p:spPr>
+        <p:txBody>
+          <a:bodyPr wrap="square" rtlCol="0">
+            <a:spAutoFit/>
+          </a:bodyPr>
+          <a:lstStyle/>
+          <a:p>
+            <a:r>
+              <a:rPr lang="en-US" sz="1200" b="1" dirty="0"/>
+              <a:t>E</a:t>
+            </a:r>
+            <a:endParaRPr lang="de-DE" sz="1200" b="1" dirty="0"/>
+          </a:p>
+        </p:txBody>
+      </p:sp>
+      <p:grpSp>
+        <p:nvGrpSpPr>
+          <p:cNvPr id="121" name="Group 120">
+            <a:extLst>
+              <a:ext uri="{FF2B5EF4-FFF2-40B4-BE49-F238E27FC236}">
+                <a16:creationId xmlns:a16="http://schemas.microsoft.com/office/drawing/2014/main" id="{32CCD5A1-1876-E021-D52F-99FB7B5836F6}"/>
+              </a:ext>
+            </a:extLst>
+          </p:cNvPr>
+          <p:cNvGrpSpPr/>
+          <p:nvPr/>
+        </p:nvGrpSpPr>
+        <p:grpSpPr>
+          <a:xfrm>
+            <a:off x="6925150" y="418816"/>
+            <a:ext cx="1370541" cy="569386"/>
+            <a:chOff x="10826197" y="3880406"/>
+            <a:chExt cx="1846931" cy="569386"/>
+          </a:xfrm>
+        </p:grpSpPr>
+        <p:cxnSp>
+          <p:nvCxnSpPr>
+            <p:cNvPr id="122" name="Straight Connector 121">
+              <a:extLst>
+                <a:ext uri="{FF2B5EF4-FFF2-40B4-BE49-F238E27FC236}">
+                  <a16:creationId xmlns:a16="http://schemas.microsoft.com/office/drawing/2014/main" id="{F09DB30F-07C5-F763-FD28-76F36C5CF370}"/>
+                </a:ext>
+              </a:extLst>
+            </p:cNvPr>
+            <p:cNvCxnSpPr/>
+            <p:nvPr/>
+          </p:nvCxnSpPr>
+          <p:spPr>
+            <a:xfrm>
+              <a:off x="10826198" y="4204029"/>
+              <a:ext cx="251059" cy="0"/>
+            </a:xfrm>
+            <a:prstGeom prst="line">
+              <a:avLst/>
+            </a:prstGeom>
+            <a:ln w="19050">
+              <a:solidFill>
+                <a:schemeClr val="tx1"/>
+              </a:solidFill>
+              <a:prstDash val="sysDash"/>
+            </a:ln>
+          </p:spPr>
+          <p:style>
+            <a:lnRef idx="1">
+              <a:schemeClr val="dk1"/>
+            </a:lnRef>
+            <a:fillRef idx="0">
+              <a:schemeClr val="dk1"/>
+            </a:fillRef>
+            <a:effectRef idx="0">
+              <a:schemeClr val="dk1"/>
+            </a:effectRef>
+            <a:fontRef idx="minor">
+              <a:schemeClr val="tx1"/>
+            </a:fontRef>
+          </p:style>
+        </p:cxnSp>
+        <p:cxnSp>
+          <p:nvCxnSpPr>
+            <p:cNvPr id="123" name="Straight Connector 122">
+              <a:extLst>
+                <a:ext uri="{FF2B5EF4-FFF2-40B4-BE49-F238E27FC236}">
+                  <a16:creationId xmlns:a16="http://schemas.microsoft.com/office/drawing/2014/main" id="{5CED9EBC-3394-F9AC-2385-4D573833A476}"/>
+                </a:ext>
+              </a:extLst>
+            </p:cNvPr>
+            <p:cNvCxnSpPr/>
+            <p:nvPr/>
+          </p:nvCxnSpPr>
+          <p:spPr>
+            <a:xfrm>
+              <a:off x="10826198" y="4033699"/>
+              <a:ext cx="251059" cy="0"/>
+            </a:xfrm>
+            <a:prstGeom prst="line">
+              <a:avLst/>
+            </a:prstGeom>
+            <a:ln w="19050">
+              <a:solidFill>
+                <a:schemeClr val="tx1"/>
+              </a:solidFill>
+            </a:ln>
+          </p:spPr>
+          <p:style>
+            <a:lnRef idx="1">
+              <a:schemeClr val="dk1"/>
+            </a:lnRef>
+            <a:fillRef idx="0">
+              <a:schemeClr val="dk1"/>
+            </a:fillRef>
+            <a:effectRef idx="0">
+              <a:schemeClr val="dk1"/>
+            </a:effectRef>
+            <a:fontRef idx="minor">
+              <a:schemeClr val="tx1"/>
+            </a:fontRef>
+          </p:style>
+        </p:cxnSp>
+        <p:sp>
+          <p:nvSpPr>
+            <p:cNvPr id="124" name="TextBox 123">
+              <a:extLst>
+                <a:ext uri="{FF2B5EF4-FFF2-40B4-BE49-F238E27FC236}">
+                  <a16:creationId xmlns:a16="http://schemas.microsoft.com/office/drawing/2014/main" id="{32A0549B-766F-2791-3C45-623F485D9290}"/>
+                </a:ext>
+              </a:extLst>
+            </p:cNvPr>
+            <p:cNvSpPr txBox="1"/>
+            <p:nvPr/>
+          </p:nvSpPr>
+          <p:spPr>
+            <a:xfrm>
+              <a:off x="11123609" y="3880406"/>
+              <a:ext cx="1549519" cy="553998"/>
+            </a:xfrm>
+            <a:prstGeom prst="rect">
+              <a:avLst/>
+            </a:prstGeom>
+            <a:noFill/>
+          </p:spPr>
+          <p:txBody>
+            <a:bodyPr wrap="square" rtlCol="0">
+              <a:spAutoFit/>
+            </a:bodyPr>
+            <a:lstStyle/>
+            <a:p>
+              <a:r>
+                <a:rPr lang="en-US" sz="1000" dirty="0"/>
+                <a:t>Best slope fit</a:t>
+              </a:r>
+            </a:p>
+            <a:p>
+              <a:r>
+                <a:rPr lang="en-US" sz="1000" dirty="0"/>
+                <a:t>PRR fit</a:t>
+              </a:r>
+            </a:p>
+            <a:p>
+              <a:r>
+                <a:rPr lang="en-US" sz="1000" dirty="0"/>
+                <a:t>Non-fitter (outlier)</a:t>
+              </a:r>
+            </a:p>
+          </p:txBody>
+        </p:sp>
+        <p:sp>
+          <p:nvSpPr>
+            <p:cNvPr id="125" name="TextBox 124">
+              <a:extLst>
+                <a:ext uri="{FF2B5EF4-FFF2-40B4-BE49-F238E27FC236}">
+                  <a16:creationId xmlns:a16="http://schemas.microsoft.com/office/drawing/2014/main" id="{B32BFABA-511C-20B5-DC2F-8AB1E86E8DCB}"/>
+                </a:ext>
+              </a:extLst>
+            </p:cNvPr>
+            <p:cNvSpPr txBox="1"/>
+            <p:nvPr/>
+          </p:nvSpPr>
+          <p:spPr>
+            <a:xfrm>
+              <a:off x="10826197" y="4203571"/>
+              <a:ext cx="251059" cy="246221"/>
+            </a:xfrm>
+            <a:prstGeom prst="rect">
+              <a:avLst/>
+            </a:prstGeom>
+            <a:noFill/>
+          </p:spPr>
+          <p:txBody>
+            <a:bodyPr wrap="square" rtlCol="0">
+              <a:spAutoFit/>
+            </a:bodyPr>
+            <a:lstStyle/>
+            <a:p>
+              <a:r>
+                <a:rPr lang="en-US" sz="1000" dirty="0">
+                  <a:solidFill>
+                    <a:srgbClr val="FF0000"/>
+                  </a:solidFill>
+                </a:rPr>
+                <a:t>x</a:t>
+              </a:r>
+            </a:p>
+          </p:txBody>
+        </p:sp>
+      </p:grpSp>
+      <p:sp>
+        <p:nvSpPr>
+          <p:cNvPr id="132" name="Rectangle 131">
+            <a:extLst>
+              <a:ext uri="{FF2B5EF4-FFF2-40B4-BE49-F238E27FC236}">
+                <a16:creationId xmlns:a16="http://schemas.microsoft.com/office/drawing/2014/main" id="{6B20347E-11A3-267B-471D-B8E376BCB7CB}"/>
+              </a:ext>
+            </a:extLst>
+          </p:cNvPr>
+          <p:cNvSpPr/>
+          <p:nvPr/>
+        </p:nvSpPr>
+        <p:spPr>
+          <a:xfrm>
+            <a:off x="7533352" y="4381155"/>
+            <a:ext cx="3241819" cy="246214"/>
+          </a:xfrm>
+          <a:prstGeom prst="rect">
+            <a:avLst/>
+          </a:prstGeom>
+          <a:solidFill>
+            <a:schemeClr val="tx1">
+              <a:alpha val="15000"/>
+            </a:schemeClr>
+          </a:solidFill>
+          <a:ln w="19050">
+            <a:solidFill>
+              <a:schemeClr val="bg1">
+                <a:lumMod val="65000"/>
+              </a:schemeClr>
+            </a:solidFill>
+          </a:ln>
+        </p:spPr>
+        <p:style>
+          <a:lnRef idx="2">
+            <a:schemeClr val="accent1">
+              <a:shade val="15000"/>
+            </a:schemeClr>
+          </a:lnRef>
+          <a:fillRef idx="1">
+            <a:schemeClr val="accent1"/>
+          </a:fillRef>
+          <a:effectRef idx="0">
+            <a:schemeClr val="accent1"/>
+          </a:effectRef>
+          <a:fontRef idx="minor">
+            <a:schemeClr val="lt1"/>
+          </a:fontRef>
+        </p:style>
+        <p:txBody>
+          <a:bodyPr rtlCol="0" anchor="ctr"/>
+          <a:lstStyle/>
+          <a:p>
+            <a:pPr algn="ctr"/>
+            <a:endParaRPr lang="de-DE"/>
+          </a:p>
+        </p:txBody>
+      </p:sp>
+      <p:grpSp>
+        <p:nvGrpSpPr>
+          <p:cNvPr id="32" name="Group 31">
+            <a:extLst>
+              <a:ext uri="{FF2B5EF4-FFF2-40B4-BE49-F238E27FC236}">
+                <a16:creationId xmlns:a16="http://schemas.microsoft.com/office/drawing/2014/main" id="{27F92705-5DB0-D0A5-E1B7-5C6B163F5C75}"/>
+              </a:ext>
+            </a:extLst>
+          </p:cNvPr>
+          <p:cNvGrpSpPr/>
+          <p:nvPr/>
+        </p:nvGrpSpPr>
+        <p:grpSpPr>
+          <a:xfrm>
+            <a:off x="-546" y="0"/>
+            <a:ext cx="6480546" cy="4792061"/>
+            <a:chOff x="-546" y="0"/>
+            <a:chExt cx="6480546" cy="4792061"/>
+          </a:xfrm>
+        </p:grpSpPr>
+        <p:sp>
+          <p:nvSpPr>
+            <p:cNvPr id="25" name="Rectangle 24">
+              <a:extLst>
+                <a:ext uri="{FF2B5EF4-FFF2-40B4-BE49-F238E27FC236}">
+                  <a16:creationId xmlns:a16="http://schemas.microsoft.com/office/drawing/2014/main" id="{02433715-89F1-53C4-2B2A-8AE39B6EBBF5}"/>
+                </a:ext>
+              </a:extLst>
+            </p:cNvPr>
+            <p:cNvSpPr/>
+            <p:nvPr/>
+          </p:nvSpPr>
+          <p:spPr>
+            <a:xfrm>
+              <a:off x="0" y="0"/>
+              <a:ext cx="6480000" cy="4792061"/>
+            </a:xfrm>
+            <a:prstGeom prst="rect">
+              <a:avLst/>
+            </a:prstGeom>
+            <a:solidFill>
+              <a:schemeClr val="bg1"/>
+            </a:solidFill>
+            <a:ln>
+              <a:noFill/>
+            </a:ln>
+          </p:spPr>
+          <p:style>
+            <a:lnRef idx="2">
+              <a:schemeClr val="accent1">
+                <a:shade val="15000"/>
+              </a:schemeClr>
+            </a:lnRef>
+            <a:fillRef idx="1">
+              <a:schemeClr val="accent1"/>
+            </a:fillRef>
+            <a:effectRef idx="0">
+              <a:schemeClr val="accent1"/>
+            </a:effectRef>
+            <a:fontRef idx="minor">
+              <a:schemeClr val="lt1"/>
+            </a:fontRef>
+          </p:style>
+          <p:txBody>
+            <a:bodyPr rtlCol="0" anchor="ctr"/>
+            <a:lstStyle/>
+            <a:p>
+              <a:pPr algn="ctr"/>
+              <a:endParaRPr lang="de-DE" dirty="0"/>
+            </a:p>
+          </p:txBody>
+        </p:sp>
+        <p:sp>
+          <p:nvSpPr>
+            <p:cNvPr id="114" name="TextBox 113">
+              <a:extLst>
+                <a:ext uri="{FF2B5EF4-FFF2-40B4-BE49-F238E27FC236}">
+                  <a16:creationId xmlns:a16="http://schemas.microsoft.com/office/drawing/2014/main" id="{2F145B04-BC55-8BA1-8D8B-8DF5ADD64C8D}"/>
+                </a:ext>
+              </a:extLst>
+            </p:cNvPr>
+            <p:cNvSpPr txBox="1"/>
+            <p:nvPr/>
+          </p:nvSpPr>
+          <p:spPr>
+            <a:xfrm>
+              <a:off x="4638946" y="4507740"/>
+              <a:ext cx="196451" cy="246221"/>
+            </a:xfrm>
+            <a:prstGeom prst="rect">
+              <a:avLst/>
+            </a:prstGeom>
+            <a:noFill/>
+          </p:spPr>
+          <p:txBody>
+            <a:bodyPr wrap="square" lIns="0" tIns="0" rIns="0" bIns="0" rtlCol="0">
+              <a:spAutoFit/>
+            </a:bodyPr>
+            <a:lstStyle/>
+            <a:p>
+              <a:r>
+                <a:rPr lang="en-US" sz="1600" dirty="0">
+                  <a:solidFill>
+                    <a:srgbClr val="FF0000"/>
+                  </a:solidFill>
+                </a:rPr>
+                <a:t>x</a:t>
+              </a:r>
+            </a:p>
+          </p:txBody>
+        </p:sp>
+        <p:cxnSp>
+          <p:nvCxnSpPr>
+            <p:cNvPr id="66" name="Straight Connector 65">
+              <a:extLst>
+                <a:ext uri="{FF2B5EF4-FFF2-40B4-BE49-F238E27FC236}">
+                  <a16:creationId xmlns:a16="http://schemas.microsoft.com/office/drawing/2014/main" id="{B52D0B18-9F05-4346-4516-470C51B8E19D}"/>
+                </a:ext>
+              </a:extLst>
+            </p:cNvPr>
+            <p:cNvCxnSpPr>
+              <a:cxnSpLocks/>
+            </p:cNvCxnSpPr>
+            <p:nvPr/>
+          </p:nvCxnSpPr>
+          <p:spPr>
+            <a:xfrm>
+              <a:off x="783270" y="4653042"/>
+              <a:ext cx="196451" cy="0"/>
+            </a:xfrm>
+            <a:prstGeom prst="line">
+              <a:avLst/>
+            </a:prstGeom>
+            <a:ln w="19050">
+              <a:solidFill>
+                <a:schemeClr val="tx1"/>
+              </a:solidFill>
+            </a:ln>
+          </p:spPr>
+          <p:style>
+            <a:lnRef idx="1">
+              <a:schemeClr val="dk1"/>
+            </a:lnRef>
+            <a:fillRef idx="0">
+              <a:schemeClr val="dk1"/>
+            </a:fillRef>
+            <a:effectRef idx="0">
+              <a:schemeClr val="dk1"/>
+            </a:effectRef>
+            <a:fontRef idx="minor">
+              <a:schemeClr val="tx1"/>
+            </a:fontRef>
+          </p:style>
+        </p:cxnSp>
+        <p:sp>
+          <p:nvSpPr>
+            <p:cNvPr id="85" name="TextBox 84">
+              <a:extLst>
+                <a:ext uri="{FF2B5EF4-FFF2-40B4-BE49-F238E27FC236}">
+                  <a16:creationId xmlns:a16="http://schemas.microsoft.com/office/drawing/2014/main" id="{CF9C3857-8620-E31D-00E0-39D8145E97C7}"/>
+                </a:ext>
+              </a:extLst>
+            </p:cNvPr>
+            <p:cNvSpPr txBox="1"/>
+            <p:nvPr/>
+          </p:nvSpPr>
+          <p:spPr>
+            <a:xfrm>
+              <a:off x="1018372" y="4569222"/>
+              <a:ext cx="742890" cy="138499"/>
+            </a:xfrm>
+            <a:prstGeom prst="rect">
+              <a:avLst/>
+            </a:prstGeom>
+            <a:noFill/>
+          </p:spPr>
+          <p:txBody>
+            <a:bodyPr wrap="square" lIns="0" tIns="0" rIns="0" bIns="0" rtlCol="0">
+              <a:spAutoFit/>
+            </a:bodyPr>
+            <a:lstStyle/>
+            <a:p>
+              <a:r>
+                <a:rPr lang="en-US" sz="900" dirty="0"/>
+                <a:t>Best slope fit</a:t>
+              </a:r>
+            </a:p>
+          </p:txBody>
+        </p:sp>
+        <p:sp>
+          <p:nvSpPr>
+            <p:cNvPr id="113" name="TextBox 112">
+              <a:extLst>
+                <a:ext uri="{FF2B5EF4-FFF2-40B4-BE49-F238E27FC236}">
+                  <a16:creationId xmlns:a16="http://schemas.microsoft.com/office/drawing/2014/main" id="{78001CE1-A684-A5F5-2CAC-AB94988E7F2D}"/>
+                </a:ext>
+              </a:extLst>
+            </p:cNvPr>
+            <p:cNvSpPr txBox="1"/>
+            <p:nvPr/>
+          </p:nvSpPr>
+          <p:spPr>
+            <a:xfrm>
+              <a:off x="4801812" y="4571029"/>
+              <a:ext cx="1028094" cy="138499"/>
+            </a:xfrm>
+            <a:prstGeom prst="rect">
+              <a:avLst/>
+            </a:prstGeom>
+            <a:noFill/>
+          </p:spPr>
+          <p:txBody>
+            <a:bodyPr wrap="square" lIns="0" tIns="0" rIns="0" bIns="0" rtlCol="0">
+              <a:spAutoFit/>
+            </a:bodyPr>
+            <a:lstStyle/>
+            <a:p>
+              <a:r>
+                <a:rPr lang="en-US" sz="900" dirty="0"/>
+                <a:t>Non-fitter (outlier)</a:t>
+              </a:r>
+            </a:p>
+          </p:txBody>
+        </p:sp>
+        <p:sp>
+          <p:nvSpPr>
+            <p:cNvPr id="118" name="TextBox 117">
+              <a:extLst>
+                <a:ext uri="{FF2B5EF4-FFF2-40B4-BE49-F238E27FC236}">
+                  <a16:creationId xmlns:a16="http://schemas.microsoft.com/office/drawing/2014/main" id="{C165CF6D-5608-5CE0-65C5-FE109F2FE825}"/>
+                </a:ext>
+              </a:extLst>
+            </p:cNvPr>
+            <p:cNvSpPr txBox="1"/>
+            <p:nvPr/>
+          </p:nvSpPr>
+          <p:spPr>
+            <a:xfrm>
+              <a:off x="316935" y="4569222"/>
+              <a:ext cx="1212482" cy="138499"/>
+            </a:xfrm>
+            <a:prstGeom prst="rect">
+              <a:avLst/>
+            </a:prstGeom>
+            <a:noFill/>
+          </p:spPr>
+          <p:txBody>
+            <a:bodyPr wrap="square" lIns="0" tIns="0" rIns="0" bIns="0" rtlCol="0">
+              <a:spAutoFit/>
+            </a:bodyPr>
+            <a:lstStyle/>
+            <a:p>
+              <a:r>
+                <a:rPr lang="en-US" sz="900" dirty="0"/>
+                <a:t>PRR fit</a:t>
+              </a:r>
+            </a:p>
+          </p:txBody>
+        </p:sp>
+        <p:sp>
+          <p:nvSpPr>
+            <p:cNvPr id="27" name="TextBox 26">
+              <a:extLst>
+                <a:ext uri="{FF2B5EF4-FFF2-40B4-BE49-F238E27FC236}">
+                  <a16:creationId xmlns:a16="http://schemas.microsoft.com/office/drawing/2014/main" id="{9DB03461-750C-E05E-D95A-FC78916160FF}"/>
+                </a:ext>
+              </a:extLst>
+            </p:cNvPr>
+            <p:cNvSpPr txBox="1"/>
+            <p:nvPr/>
+          </p:nvSpPr>
+          <p:spPr>
+            <a:xfrm>
+              <a:off x="3661090" y="4561602"/>
+              <a:ext cx="903971" cy="138499"/>
+            </a:xfrm>
+            <a:prstGeom prst="rect">
+              <a:avLst/>
+            </a:prstGeom>
+            <a:noFill/>
+          </p:spPr>
+          <p:txBody>
+            <a:bodyPr wrap="square" lIns="0" tIns="0" rIns="0" bIns="0" rtlCol="0">
+              <a:spAutoFit/>
+            </a:bodyPr>
+            <a:lstStyle/>
+            <a:p>
+              <a:r>
+                <a:rPr lang="en-US" sz="900" dirty="0"/>
+                <a:t>High initial deficit</a:t>
+              </a:r>
+            </a:p>
+          </p:txBody>
+        </p:sp>
+        <p:sp>
+          <p:nvSpPr>
+            <p:cNvPr id="28" name="TextBox 27">
+              <a:extLst>
+                <a:ext uri="{FF2B5EF4-FFF2-40B4-BE49-F238E27FC236}">
+                  <a16:creationId xmlns:a16="http://schemas.microsoft.com/office/drawing/2014/main" id="{442B55D5-E54C-E970-B0FD-358A8CD13D4F}"/>
+                </a:ext>
+              </a:extLst>
+            </p:cNvPr>
+            <p:cNvSpPr txBox="1"/>
+            <p:nvPr/>
+          </p:nvSpPr>
+          <p:spPr>
+            <a:xfrm>
+              <a:off x="1912576" y="4561602"/>
+              <a:ext cx="426764" cy="138499"/>
+            </a:xfrm>
+            <a:prstGeom prst="rect">
+              <a:avLst/>
+            </a:prstGeom>
+            <a:noFill/>
+          </p:spPr>
+          <p:txBody>
+            <a:bodyPr wrap="square" lIns="0" tIns="0" rIns="0" bIns="0" rtlCol="0">
+              <a:spAutoFit/>
+            </a:bodyPr>
+            <a:lstStyle/>
+            <a:p>
+              <a:r>
+                <a:rPr lang="en-US" sz="900" dirty="0"/>
+                <a:t>General</a:t>
+              </a:r>
+            </a:p>
+          </p:txBody>
+        </p:sp>
+        <p:sp>
+          <p:nvSpPr>
+            <p:cNvPr id="29" name="Oval 28">
+              <a:extLst>
+                <a:ext uri="{FF2B5EF4-FFF2-40B4-BE49-F238E27FC236}">
+                  <a16:creationId xmlns:a16="http://schemas.microsoft.com/office/drawing/2014/main" id="{A390E395-B2A2-F688-4F16-B4161A27FA9B}"/>
+                </a:ext>
+              </a:extLst>
+            </p:cNvPr>
+            <p:cNvSpPr/>
+            <p:nvPr/>
+          </p:nvSpPr>
+          <p:spPr>
+            <a:xfrm>
+              <a:off x="3490627" y="4597241"/>
+              <a:ext cx="79645" cy="80441"/>
+            </a:xfrm>
+            <a:prstGeom prst="ellipse">
+              <a:avLst/>
+            </a:prstGeom>
+            <a:solidFill>
+              <a:srgbClr val="CC79A7"/>
+            </a:solidFill>
+            <a:ln>
+              <a:noFill/>
+            </a:ln>
+          </p:spPr>
+          <p:style>
+            <a:lnRef idx="2">
+              <a:schemeClr val="accent1">
+                <a:shade val="15000"/>
+              </a:schemeClr>
+            </a:lnRef>
+            <a:fillRef idx="1">
+              <a:schemeClr val="accent1"/>
+            </a:fillRef>
+            <a:effectRef idx="0">
+              <a:schemeClr val="accent1"/>
+            </a:effectRef>
+            <a:fontRef idx="minor">
+              <a:schemeClr val="lt1"/>
+            </a:fontRef>
+          </p:style>
+          <p:txBody>
+            <a:bodyPr rtlCol="0" anchor="ctr"/>
+            <a:lstStyle/>
+            <a:p>
+              <a:pPr algn="ctr"/>
+              <a:endParaRPr lang="de-DE"/>
+            </a:p>
+          </p:txBody>
+        </p:sp>
+        <p:sp>
+          <p:nvSpPr>
+            <p:cNvPr id="30" name="Oval 29">
+              <a:extLst>
+                <a:ext uri="{FF2B5EF4-FFF2-40B4-BE49-F238E27FC236}">
+                  <a16:creationId xmlns:a16="http://schemas.microsoft.com/office/drawing/2014/main" id="{AC5D1D93-87F6-0D14-8F9E-7DCD918415DD}"/>
+                </a:ext>
+              </a:extLst>
+            </p:cNvPr>
+            <p:cNvSpPr/>
+            <p:nvPr/>
+          </p:nvSpPr>
+          <p:spPr>
+            <a:xfrm>
+              <a:off x="1798499" y="4598810"/>
+              <a:ext cx="73550" cy="77302"/>
+            </a:xfrm>
+            <a:prstGeom prst="ellipse">
+              <a:avLst/>
+            </a:prstGeom>
+            <a:solidFill>
+              <a:srgbClr val="6BADD2"/>
+            </a:solidFill>
+            <a:ln>
+              <a:solidFill>
+                <a:srgbClr val="002060"/>
+              </a:solidFill>
+            </a:ln>
+          </p:spPr>
+          <p:style>
+            <a:lnRef idx="2">
+              <a:schemeClr val="accent1">
+                <a:shade val="15000"/>
+              </a:schemeClr>
+            </a:lnRef>
+            <a:fillRef idx="1">
+              <a:schemeClr val="accent1"/>
+            </a:fillRef>
+            <a:effectRef idx="0">
+              <a:schemeClr val="accent1"/>
+            </a:effectRef>
+            <a:fontRef idx="minor">
+              <a:schemeClr val="lt1"/>
+            </a:fontRef>
+          </p:style>
+          <p:txBody>
+            <a:bodyPr rtlCol="0" anchor="ctr"/>
+            <a:lstStyle/>
+            <a:p>
+              <a:pPr algn="ctr"/>
+              <a:endParaRPr lang="de-DE"/>
+            </a:p>
+          </p:txBody>
+        </p:sp>
+        <p:sp>
+          <p:nvSpPr>
+            <p:cNvPr id="11" name="TextBox 10">
+              <a:extLst>
+                <a:ext uri="{FF2B5EF4-FFF2-40B4-BE49-F238E27FC236}">
+                  <a16:creationId xmlns:a16="http://schemas.microsoft.com/office/drawing/2014/main" id="{E179E0AB-5FC8-350F-9DF5-1EAD3764A3A6}"/>
+                </a:ext>
+              </a:extLst>
+            </p:cNvPr>
+            <p:cNvSpPr txBox="1"/>
+            <p:nvPr/>
+          </p:nvSpPr>
+          <p:spPr>
+            <a:xfrm>
+              <a:off x="2545035" y="4561602"/>
+              <a:ext cx="847656" cy="138499"/>
+            </a:xfrm>
+            <a:prstGeom prst="rect">
+              <a:avLst/>
+            </a:prstGeom>
+            <a:noFill/>
+          </p:spPr>
+          <p:txBody>
+            <a:bodyPr wrap="square" lIns="0" tIns="0" rIns="0" bIns="0" rtlCol="0">
+              <a:spAutoFit/>
+            </a:bodyPr>
+            <a:lstStyle/>
+            <a:p>
+              <a:r>
+                <a:rPr lang="en-US" sz="900" dirty="0"/>
+                <a:t>Low initial deficit</a:t>
+              </a:r>
+            </a:p>
+          </p:txBody>
+        </p:sp>
+        <p:sp>
+          <p:nvSpPr>
+            <p:cNvPr id="12" name="Oval 11">
+              <a:extLst>
+                <a:ext uri="{FF2B5EF4-FFF2-40B4-BE49-F238E27FC236}">
+                  <a16:creationId xmlns:a16="http://schemas.microsoft.com/office/drawing/2014/main" id="{5F65140C-892C-4C6B-08CB-6B1503A072CA}"/>
+                </a:ext>
+              </a:extLst>
+            </p:cNvPr>
+            <p:cNvSpPr/>
+            <p:nvPr/>
+          </p:nvSpPr>
+          <p:spPr>
+            <a:xfrm>
+              <a:off x="2427514" y="4597241"/>
+              <a:ext cx="80441" cy="80441"/>
+            </a:xfrm>
+            <a:prstGeom prst="ellipse">
+              <a:avLst/>
+            </a:prstGeom>
+            <a:solidFill>
+              <a:srgbClr val="E69F00"/>
+            </a:solidFill>
+            <a:ln>
+              <a:noFill/>
+            </a:ln>
+          </p:spPr>
+          <p:style>
+            <a:lnRef idx="2">
+              <a:schemeClr val="accent1">
+                <a:shade val="15000"/>
+              </a:schemeClr>
+            </a:lnRef>
+            <a:fillRef idx="1">
+              <a:schemeClr val="accent1"/>
+            </a:fillRef>
+            <a:effectRef idx="0">
+              <a:schemeClr val="accent1"/>
+            </a:effectRef>
+            <a:fontRef idx="minor">
+              <a:schemeClr val="lt1"/>
+            </a:fontRef>
+          </p:style>
+          <p:txBody>
+            <a:bodyPr rtlCol="0" anchor="ctr"/>
+            <a:lstStyle/>
+            <a:p>
+              <a:pPr algn="ctr"/>
+              <a:endParaRPr lang="de-DE" dirty="0"/>
+            </a:p>
+          </p:txBody>
+        </p:sp>
+        <p:pic>
+          <p:nvPicPr>
+            <p:cNvPr id="23" name="Graphic 22">
+              <a:extLst>
+                <a:ext uri="{FF2B5EF4-FFF2-40B4-BE49-F238E27FC236}">
+                  <a16:creationId xmlns:a16="http://schemas.microsoft.com/office/drawing/2014/main" id="{455315B5-3F91-1624-A9E3-246BB19F7683}"/>
+                </a:ext>
+              </a:extLst>
+            </p:cNvPr>
+            <p:cNvPicPr>
+              <a:picLocks noChangeAspect="1"/>
+            </p:cNvPicPr>
+            <p:nvPr/>
+          </p:nvPicPr>
+          <p:blipFill>
+            <a:blip r:embed="rId3">
+              <a:extLst>
+                <a:ext uri="{96DAC541-7B7A-43D3-8B79-37D633B846F1}">
+                  <asvg:svgBlip xmlns:asvg="http://schemas.microsoft.com/office/drawing/2016/SVG/main" r:embed="rId4"/>
+                </a:ext>
+              </a:extLst>
+            </a:blip>
+            <a:stretch>
+              <a:fillRect/>
+            </a:stretch>
+          </p:blipFill>
+          <p:spPr>
+            <a:xfrm>
+              <a:off x="-546" y="2623204"/>
+              <a:ext cx="6477000" cy="1800225"/>
+            </a:xfrm>
+            <a:prstGeom prst="rect">
+              <a:avLst/>
+            </a:prstGeom>
+          </p:spPr>
+        </p:pic>
+        <p:pic>
+          <p:nvPicPr>
+            <p:cNvPr id="19" name="Graphic 18">
+              <a:extLst>
+                <a:ext uri="{FF2B5EF4-FFF2-40B4-BE49-F238E27FC236}">
+                  <a16:creationId xmlns:a16="http://schemas.microsoft.com/office/drawing/2014/main" id="{A940F883-CB99-C592-2C01-57410E0D6D39}"/>
+                </a:ext>
+              </a:extLst>
+            </p:cNvPr>
+            <p:cNvPicPr>
+              <a:picLocks noChangeAspect="1"/>
+            </p:cNvPicPr>
+            <p:nvPr/>
+          </p:nvPicPr>
+          <p:blipFill>
+            <a:blip r:embed="rId5">
+              <a:extLst>
+                <a:ext uri="{96DAC541-7B7A-43D3-8B79-37D633B846F1}">
+                  <asvg:svgBlip xmlns:asvg="http://schemas.microsoft.com/office/drawing/2016/SVG/main" r:embed="rId6"/>
+                </a:ext>
+              </a:extLst>
+            </a:blip>
+            <a:srcRect b="9076"/>
+            <a:stretch/>
+          </p:blipFill>
+          <p:spPr>
+            <a:xfrm>
+              <a:off x="-273" y="1309381"/>
+              <a:ext cx="6477000" cy="1636828"/>
+            </a:xfrm>
+            <a:prstGeom prst="rect">
+              <a:avLst/>
+            </a:prstGeom>
+          </p:spPr>
+        </p:pic>
+        <p:pic>
+          <p:nvPicPr>
+            <p:cNvPr id="17" name="Graphic 16">
+              <a:extLst>
+                <a:ext uri="{FF2B5EF4-FFF2-40B4-BE49-F238E27FC236}">
+                  <a16:creationId xmlns:a16="http://schemas.microsoft.com/office/drawing/2014/main" id="{534F4BDD-09FB-32BC-18DD-8896973ACFD5}"/>
+                </a:ext>
+              </a:extLst>
+            </p:cNvPr>
+            <p:cNvPicPr>
+              <a:picLocks noChangeAspect="1"/>
+            </p:cNvPicPr>
+            <p:nvPr/>
+          </p:nvPicPr>
+          <p:blipFill>
+            <a:blip r:embed="rId7">
+              <a:extLst>
+                <a:ext uri="{96DAC541-7B7A-43D3-8B79-37D633B846F1}">
+                  <asvg:svgBlip xmlns:asvg="http://schemas.microsoft.com/office/drawing/2016/SVG/main" r:embed="rId8"/>
+                </a:ext>
+              </a:extLst>
+            </a:blip>
+            <a:srcRect b="11185"/>
+            <a:stretch/>
+          </p:blipFill>
+          <p:spPr>
+            <a:xfrm>
+              <a:off x="0" y="4478"/>
+              <a:ext cx="6477000" cy="1598865"/>
+            </a:xfrm>
+            <a:prstGeom prst="rect">
+              <a:avLst/>
+            </a:prstGeom>
+          </p:spPr>
+        </p:pic>
+        <p:cxnSp>
+          <p:nvCxnSpPr>
+            <p:cNvPr id="116" name="Straight Connector 115">
+              <a:extLst>
+                <a:ext uri="{FF2B5EF4-FFF2-40B4-BE49-F238E27FC236}">
+                  <a16:creationId xmlns:a16="http://schemas.microsoft.com/office/drawing/2014/main" id="{571E8EE9-7B66-DE78-BE84-1DA09455D68C}"/>
+                </a:ext>
+              </a:extLst>
+            </p:cNvPr>
+            <p:cNvCxnSpPr>
+              <a:cxnSpLocks/>
+            </p:cNvCxnSpPr>
+            <p:nvPr/>
+          </p:nvCxnSpPr>
+          <p:spPr>
+            <a:xfrm>
+              <a:off x="93739" y="4653042"/>
+              <a:ext cx="196451" cy="0"/>
+            </a:xfrm>
+            <a:prstGeom prst="line">
+              <a:avLst/>
+            </a:prstGeom>
+            <a:ln w="19050">
+              <a:solidFill>
+                <a:schemeClr val="tx1"/>
+              </a:solidFill>
+              <a:prstDash val="sysDash"/>
+            </a:ln>
+          </p:spPr>
+          <p:style>
+            <a:lnRef idx="1">
+              <a:schemeClr val="dk1"/>
+            </a:lnRef>
+            <a:fillRef idx="0">
+              <a:schemeClr val="dk1"/>
+            </a:fillRef>
+            <a:effectRef idx="0">
+              <a:schemeClr val="dk1"/>
+            </a:effectRef>
+            <a:fontRef idx="minor">
+              <a:schemeClr val="tx1"/>
+            </a:fontRef>
+          </p:style>
+        </p:cxnSp>
+        <p:sp>
+          <p:nvSpPr>
+            <p:cNvPr id="88" name="TextBox 87">
+              <a:extLst>
+                <a:ext uri="{FF2B5EF4-FFF2-40B4-BE49-F238E27FC236}">
+                  <a16:creationId xmlns:a16="http://schemas.microsoft.com/office/drawing/2014/main" id="{7BAE05B6-A6A3-30AE-F174-D53706731742}"/>
+                </a:ext>
+              </a:extLst>
+            </p:cNvPr>
+            <p:cNvSpPr txBox="1"/>
+            <p:nvPr/>
+          </p:nvSpPr>
+          <p:spPr>
+            <a:xfrm>
+              <a:off x="-273" y="12856"/>
+              <a:ext cx="430307" cy="184666"/>
+            </a:xfrm>
+            <a:prstGeom prst="rect">
+              <a:avLst/>
+            </a:prstGeom>
+            <a:noFill/>
+          </p:spPr>
+          <p:txBody>
+            <a:bodyPr wrap="square" lIns="0" tIns="0" rIns="0" bIns="0" rtlCol="0">
+              <a:spAutoFit/>
+            </a:bodyPr>
+            <a:lstStyle/>
+            <a:p>
+              <a:r>
+                <a:rPr lang="en-US" sz="1200" b="1" dirty="0"/>
+                <a:t>A</a:t>
+              </a:r>
+              <a:endParaRPr lang="de-DE" sz="1200" b="1" dirty="0"/>
+            </a:p>
+          </p:txBody>
+        </p:sp>
+        <p:sp>
+          <p:nvSpPr>
+            <p:cNvPr id="89" name="TextBox 88">
+              <a:extLst>
+                <a:ext uri="{FF2B5EF4-FFF2-40B4-BE49-F238E27FC236}">
+                  <a16:creationId xmlns:a16="http://schemas.microsoft.com/office/drawing/2014/main" id="{17A3FBFF-0884-21C8-EB95-DA38A13DEA5B}"/>
+                </a:ext>
+              </a:extLst>
+            </p:cNvPr>
+            <p:cNvSpPr txBox="1"/>
+            <p:nvPr/>
+          </p:nvSpPr>
+          <p:spPr>
+            <a:xfrm>
+              <a:off x="-273" y="2761542"/>
+              <a:ext cx="430307" cy="184666"/>
+            </a:xfrm>
+            <a:prstGeom prst="rect">
+              <a:avLst/>
+            </a:prstGeom>
+            <a:noFill/>
+          </p:spPr>
+          <p:txBody>
+            <a:bodyPr wrap="square" lIns="0" tIns="0" rIns="0" bIns="0" rtlCol="0">
+              <a:spAutoFit/>
+            </a:bodyPr>
+            <a:lstStyle/>
+            <a:p>
+              <a:r>
+                <a:rPr lang="en-US" sz="1200" b="1" dirty="0"/>
+                <a:t>C</a:t>
+              </a:r>
+              <a:endParaRPr lang="de-DE" sz="1200" b="1" dirty="0"/>
+            </a:p>
+          </p:txBody>
+        </p:sp>
+        <p:sp>
+          <p:nvSpPr>
+            <p:cNvPr id="21" name="TextBox 20">
+              <a:extLst>
+                <a:ext uri="{FF2B5EF4-FFF2-40B4-BE49-F238E27FC236}">
+                  <a16:creationId xmlns:a16="http://schemas.microsoft.com/office/drawing/2014/main" id="{27203222-0809-D5D0-5C72-7A78DD2CBE40}"/>
+                </a:ext>
+              </a:extLst>
+            </p:cNvPr>
+            <p:cNvSpPr txBox="1"/>
+            <p:nvPr/>
+          </p:nvSpPr>
+          <p:spPr>
+            <a:xfrm>
+              <a:off x="-273" y="1375804"/>
+              <a:ext cx="430307" cy="184666"/>
+            </a:xfrm>
+            <a:prstGeom prst="rect">
+              <a:avLst/>
+            </a:prstGeom>
+            <a:noFill/>
+          </p:spPr>
+          <p:txBody>
+            <a:bodyPr wrap="square" lIns="0" tIns="0" rIns="0" bIns="0" rtlCol="0">
+              <a:spAutoFit/>
+            </a:bodyPr>
+            <a:lstStyle/>
+            <a:p>
+              <a:r>
+                <a:rPr lang="en-US" sz="1200" b="1" dirty="0"/>
+                <a:t>B</a:t>
+              </a:r>
+              <a:endParaRPr lang="de-DE" sz="1200" b="1" dirty="0"/>
+            </a:p>
+          </p:txBody>
+        </p:sp>
+      </p:grpSp>
+    </p:spTree>
+    <p:extLst>
+      <p:ext uri="{BB962C8B-B14F-4D97-AF65-F5344CB8AC3E}">
+        <p14:creationId xmlns:p14="http://schemas.microsoft.com/office/powerpoint/2010/main" val="2135668613"/>
+      </p:ext>
+    </p:extLst>
+  </p:cSld>
+  <p:clrMapOvr>
+    <a:masterClrMapping/>
+  </p:clrMapOvr>
+</p:sld>
+</file>
+
+<file path=ppt/slides/slide4.xml><?xml version="1.0" encoding="utf-8"?>
+<p:sld xmlns:a="http://schemas.openxmlformats.org/drawingml/2006/main" xmlns:r="http://schemas.openxmlformats.org/officeDocument/2006/relationships" xmlns:p="http://schemas.openxmlformats.org/presentationml/2006/main">
+  <p:cSld>
     <p:spTree>
       <p:nvGrpSpPr>
         <p:cNvPr id="1" name="">
@@ -9801,7 +11253,7 @@
         </p:blipFill>
         <p:spPr>
           <a:xfrm>
-            <a:off x="-1404482" y="4297601"/>
+            <a:off x="1973718" y="3992801"/>
             <a:ext cx="6477000" cy="1800225"/>
           </a:xfrm>
           <a:prstGeom prst="rect">
@@ -9822,7 +11274,7 @@
 </p:sld>
 </file>
 
-<file path=ppt/slides/slide4.xml><?xml version="1.0" encoding="utf-8"?>
+<file path=ppt/slides/slide5.xml><?xml version="1.0" encoding="utf-8"?>
 <p:sld xmlns:a="http://schemas.openxmlformats.org/drawingml/2006/main" xmlns:r="http://schemas.openxmlformats.org/officeDocument/2006/relationships" xmlns:p="http://schemas.openxmlformats.org/presentationml/2006/main">
   <p:cSld>
     <p:spTree>
@@ -10542,7 +11994,7 @@
 </p:sld>
 </file>
 
-<file path=ppt/slides/slide5.xml><?xml version="1.0" encoding="utf-8"?>
+<file path=ppt/slides/slide6.xml><?xml version="1.0" encoding="utf-8"?>
 <p:sld xmlns:a="http://schemas.openxmlformats.org/drawingml/2006/main" xmlns:r="http://schemas.openxmlformats.org/officeDocument/2006/relationships" xmlns:p="http://schemas.openxmlformats.org/presentationml/2006/main">
   <p:cSld>
     <p:spTree>

</xml_diff>